<commit_message>
On Windows-->updated introduction. added fig1.
</commit_message>
<xml_diff>
--- a/outputs/04_outputs_figures/figure1-raw.pptx
+++ b/outputs/04_outputs_figures/figure1-raw.pptx
@@ -3527,84 +3527,12 @@
           <a:chExt cx="0" cy="0"/>
         </a:xfrm>
       </p:grpSpPr>
-      <p:sp>
-        <p:nvSpPr>
-          <p:cNvPr id="19" name="TextBox 18">
+      <p:grpSp>
+        <p:nvGrpSpPr>
+          <p:cNvPr id="2" name="Group 1">
             <a:extLst>
               <a:ext uri="{FF2B5EF4-FFF2-40B4-BE49-F238E27FC236}">
-                <a16:creationId xmlns:a16="http://schemas.microsoft.com/office/drawing/2014/main" id="{17439FFD-286E-89A1-5B48-58589713B64E}"/>
-              </a:ext>
-            </a:extLst>
-          </p:cNvPr>
-          <p:cNvSpPr txBox="1"/>
-          <p:nvPr/>
-        </p:nvSpPr>
-        <p:spPr>
-          <a:xfrm>
-            <a:off x="193040" y="264160"/>
-            <a:ext cx="467360" cy="369332"/>
-          </a:xfrm>
-          <a:prstGeom prst="rect">
-            <a:avLst/>
-          </a:prstGeom>
-          <a:noFill/>
-        </p:spPr>
-        <p:txBody>
-          <a:bodyPr wrap="square" rtlCol="0">
-            <a:spAutoFit/>
-          </a:bodyPr>
-          <a:lstStyle/>
-          <a:p>
-            <a:r>
-              <a:rPr lang="en-US" b="1" dirty="0"/>
-              <a:t>A</a:t>
-            </a:r>
-            <a:endParaRPr lang="en-CA" b="1" dirty="0"/>
-          </a:p>
-        </p:txBody>
-      </p:sp>
-      <p:sp>
-        <p:nvSpPr>
-          <p:cNvPr id="20" name="TextBox 19">
-            <a:extLst>
-              <a:ext uri="{FF2B5EF4-FFF2-40B4-BE49-F238E27FC236}">
-                <a16:creationId xmlns:a16="http://schemas.microsoft.com/office/drawing/2014/main" id="{6A8E238F-C766-55F9-5203-2A89085BD3D6}"/>
-              </a:ext>
-            </a:extLst>
-          </p:cNvPr>
-          <p:cNvSpPr txBox="1"/>
-          <p:nvPr/>
-        </p:nvSpPr>
-        <p:spPr>
-          <a:xfrm>
-            <a:off x="4780649" y="264160"/>
-            <a:ext cx="467360" cy="369332"/>
-          </a:xfrm>
-          <a:prstGeom prst="rect">
-            <a:avLst/>
-          </a:prstGeom>
-          <a:noFill/>
-        </p:spPr>
-        <p:txBody>
-          <a:bodyPr wrap="square" rtlCol="0">
-            <a:spAutoFit/>
-          </a:bodyPr>
-          <a:lstStyle/>
-          <a:p>
-            <a:r>
-              <a:rPr lang="en-US" b="1" dirty="0"/>
-              <a:t>B</a:t>
-            </a:r>
-            <a:endParaRPr lang="en-CA" b="1" dirty="0"/>
-          </a:p>
-        </p:txBody>
-      </p:sp>
-      <p:grpSp>
-        <p:nvGrpSpPr>
-          <p:cNvPr id="26" name="Group 25">
-            <a:extLst>
-              <a:ext uri="{FF2B5EF4-FFF2-40B4-BE49-F238E27FC236}">
-                <a16:creationId xmlns:a16="http://schemas.microsoft.com/office/drawing/2014/main" id="{CDE7C73D-6260-7802-C850-CA45E90E93A8}"/>
+                <a16:creationId xmlns:a16="http://schemas.microsoft.com/office/drawing/2014/main" id="{9EE393AE-C935-DCBD-29C7-24CDAE244557}"/>
               </a:ext>
             </a:extLst>
           </p:cNvPr>
@@ -3613,186 +3541,18 @@
         </p:nvGrpSpPr>
         <p:grpSpPr>
           <a:xfrm>
-            <a:off x="877152" y="1008333"/>
-            <a:ext cx="2858335" cy="2596758"/>
-            <a:chOff x="877152" y="998173"/>
-            <a:chExt cx="2858335" cy="3490589"/>
+            <a:off x="193040" y="264160"/>
+            <a:ext cx="8869680" cy="6553283"/>
+            <a:chOff x="193040" y="264160"/>
+            <a:chExt cx="8869680" cy="6553283"/>
           </a:xfrm>
         </p:grpSpPr>
-        <p:pic>
-          <p:nvPicPr>
-            <p:cNvPr id="9" name="Picture 8">
+        <p:sp>
+          <p:nvSpPr>
+            <p:cNvPr id="19" name="TextBox 18">
               <a:extLst>
                 <a:ext uri="{FF2B5EF4-FFF2-40B4-BE49-F238E27FC236}">
-                  <a16:creationId xmlns:a16="http://schemas.microsoft.com/office/drawing/2014/main" id="{5D812663-9AE9-F98F-7B7E-820530A55A10}"/>
-                </a:ext>
-              </a:extLst>
-            </p:cNvPr>
-            <p:cNvPicPr>
-              <a:picLocks noChangeAspect="1"/>
-            </p:cNvPicPr>
-            <p:nvPr/>
-          </p:nvPicPr>
-          <p:blipFill>
-            <a:blip r:embed="rId3"/>
-            <a:srcRect l="17412" t="5658" r="16163" b="7880"/>
-            <a:stretch/>
-          </p:blipFill>
-          <p:spPr>
-            <a:xfrm>
-              <a:off x="1270000" y="998173"/>
-              <a:ext cx="2052320" cy="2430828"/>
-            </a:xfrm>
-            <a:prstGeom prst="rect">
-              <a:avLst/>
-            </a:prstGeom>
-          </p:spPr>
-        </p:pic>
-        <p:pic>
-          <p:nvPicPr>
-            <p:cNvPr id="12" name="Picture 11">
-              <a:extLst>
-                <a:ext uri="{FF2B5EF4-FFF2-40B4-BE49-F238E27FC236}">
-                  <a16:creationId xmlns:a16="http://schemas.microsoft.com/office/drawing/2014/main" id="{4F417F86-7720-29F4-E072-DCDB0E0E8CA9}"/>
-                </a:ext>
-              </a:extLst>
-            </p:cNvPr>
-            <p:cNvPicPr>
-              <a:picLocks noChangeAspect="1"/>
-            </p:cNvPicPr>
-            <p:nvPr/>
-          </p:nvPicPr>
-          <p:blipFill>
-            <a:blip r:embed="rId3"/>
-            <a:srcRect l="17412" t="5658" r="16163" b="7880"/>
-            <a:stretch/>
-          </p:blipFill>
-          <p:spPr>
-            <a:xfrm>
-              <a:off x="1524000" y="2311400"/>
-              <a:ext cx="904977" cy="1071881"/>
-            </a:xfrm>
-            <a:prstGeom prst="rect">
-              <a:avLst/>
-            </a:prstGeom>
-          </p:spPr>
-        </p:pic>
-        <p:pic>
-          <p:nvPicPr>
-            <p:cNvPr id="13" name="Picture 12">
-              <a:extLst>
-                <a:ext uri="{FF2B5EF4-FFF2-40B4-BE49-F238E27FC236}">
-                  <a16:creationId xmlns:a16="http://schemas.microsoft.com/office/drawing/2014/main" id="{D86D258D-2422-188A-AA04-AC0A06C2ACA5}"/>
-                </a:ext>
-              </a:extLst>
-            </p:cNvPr>
-            <p:cNvPicPr>
-              <a:picLocks noChangeAspect="1"/>
-            </p:cNvPicPr>
-            <p:nvPr/>
-          </p:nvPicPr>
-          <p:blipFill>
-            <a:blip r:embed="rId3"/>
-            <a:srcRect l="17412" t="5658" r="16163" b="7880"/>
-            <a:stretch/>
-          </p:blipFill>
-          <p:spPr>
-            <a:xfrm>
-              <a:off x="1823351" y="2311399"/>
-              <a:ext cx="904977" cy="1071881"/>
-            </a:xfrm>
-            <a:prstGeom prst="rect">
-              <a:avLst/>
-            </a:prstGeom>
-          </p:spPr>
-        </p:pic>
-        <p:pic>
-          <p:nvPicPr>
-            <p:cNvPr id="14" name="Picture 13">
-              <a:extLst>
-                <a:ext uri="{FF2B5EF4-FFF2-40B4-BE49-F238E27FC236}">
-                  <a16:creationId xmlns:a16="http://schemas.microsoft.com/office/drawing/2014/main" id="{D4493013-26A4-B90F-A000-D57C6A702CBF}"/>
-                </a:ext>
-              </a:extLst>
-            </p:cNvPr>
-            <p:cNvPicPr>
-              <a:picLocks noChangeAspect="1"/>
-            </p:cNvPicPr>
-            <p:nvPr/>
-          </p:nvPicPr>
-          <p:blipFill>
-            <a:blip r:embed="rId3"/>
-            <a:srcRect l="17412" t="5658" r="16163" b="7880"/>
-            <a:stretch/>
-          </p:blipFill>
-          <p:spPr>
-            <a:xfrm>
-              <a:off x="2139930" y="2311400"/>
-              <a:ext cx="904977" cy="1071881"/>
-            </a:xfrm>
-            <a:prstGeom prst="rect">
-              <a:avLst/>
-            </a:prstGeom>
-          </p:spPr>
-        </p:pic>
-        <p:sp>
-          <p:nvSpPr>
-            <p:cNvPr id="21" name="Right Brace 20">
-              <a:extLst>
-                <a:ext uri="{FF2B5EF4-FFF2-40B4-BE49-F238E27FC236}">
-                  <a16:creationId xmlns:a16="http://schemas.microsoft.com/office/drawing/2014/main" id="{10694201-DA9C-3721-BF39-2EE6A31CF584}"/>
-                </a:ext>
-              </a:extLst>
-            </p:cNvPr>
-            <p:cNvSpPr/>
-            <p:nvPr/>
-          </p:nvSpPr>
-          <p:spPr>
-            <a:xfrm rot="5400000">
-              <a:off x="2142489" y="2621279"/>
-              <a:ext cx="307341" cy="2052320"/>
-            </a:xfrm>
-            <a:prstGeom prst="rightBrace">
-              <a:avLst>
-                <a:gd name="adj1" fmla="val 0"/>
-                <a:gd name="adj2" fmla="val 50000"/>
-              </a:avLst>
-            </a:prstGeom>
-            <a:ln>
-              <a:solidFill>
-                <a:srgbClr val="7030A0"/>
-              </a:solidFill>
-            </a:ln>
-          </p:spPr>
-          <p:style>
-            <a:lnRef idx="2">
-              <a:schemeClr val="accent1"/>
-            </a:lnRef>
-            <a:fillRef idx="0">
-              <a:schemeClr val="accent1"/>
-            </a:fillRef>
-            <a:effectRef idx="1">
-              <a:schemeClr val="accent1"/>
-            </a:effectRef>
-            <a:fontRef idx="minor">
-              <a:schemeClr val="tx1"/>
-            </a:fontRef>
-          </p:style>
-          <p:txBody>
-            <a:bodyPr rtlCol="0" anchor="ctr"/>
-            <a:lstStyle/>
-            <a:p>
-              <a:pPr algn="ctr"/>
-              <a:endParaRPr lang="en-CA"/>
-            </a:p>
-          </p:txBody>
-        </p:sp>
-        <p:sp>
-          <p:nvSpPr>
-            <p:cNvPr id="23" name="TextBox 22">
-              <a:extLst>
-                <a:ext uri="{FF2B5EF4-FFF2-40B4-BE49-F238E27FC236}">
-                  <a16:creationId xmlns:a16="http://schemas.microsoft.com/office/drawing/2014/main" id="{8EACD0A7-48EA-D19C-08D6-1A10035B5A06}"/>
+                  <a16:creationId xmlns:a16="http://schemas.microsoft.com/office/drawing/2014/main" id="{17439FFD-286E-89A1-5B48-58589713B64E}"/>
                 </a:ext>
               </a:extLst>
             </p:cNvPr>
@@ -3801,8 +3561,8 @@
           </p:nvSpPr>
           <p:spPr>
             <a:xfrm>
-              <a:off x="877152" y="3868187"/>
-              <a:ext cx="2858335" cy="620575"/>
+              <a:off x="193040" y="264160"/>
+              <a:ext cx="467360" cy="369332"/>
             </a:xfrm>
             <a:prstGeom prst="rect">
               <a:avLst/>
@@ -3815,188 +3575,20 @@
             </a:bodyPr>
             <a:lstStyle/>
             <a:p>
-              <a:pPr algn="ctr"/>
               <a:r>
-                <a:rPr lang="en-US" sz="1200" dirty="0"/>
-                <a:t>Narrow population variance</a:t>
+                <a:rPr lang="en-US" b="1" dirty="0"/>
+                <a:t>A</a:t>
               </a:r>
-            </a:p>
-            <a:p>
-              <a:pPr algn="ctr"/>
-              <a:r>
-                <a:rPr lang="en-US" sz="1200" dirty="0"/>
-                <a:t>same IIV</a:t>
-              </a:r>
-              <a:endParaRPr lang="en-CA" sz="1200" dirty="0"/>
-            </a:p>
-          </p:txBody>
-        </p:sp>
-      </p:grpSp>
-      <p:grpSp>
-        <p:nvGrpSpPr>
-          <p:cNvPr id="32" name="Group 31">
-            <a:extLst>
-              <a:ext uri="{FF2B5EF4-FFF2-40B4-BE49-F238E27FC236}">
-                <a16:creationId xmlns:a16="http://schemas.microsoft.com/office/drawing/2014/main" id="{4CE0B162-CD9D-2D67-15F1-7A0B1499AD1A}"/>
-              </a:ext>
-            </a:extLst>
-          </p:cNvPr>
-          <p:cNvGrpSpPr/>
-          <p:nvPr/>
-        </p:nvGrpSpPr>
-        <p:grpSpPr>
-          <a:xfrm>
-            <a:off x="4653280" y="1008333"/>
-            <a:ext cx="4409440" cy="2598550"/>
-            <a:chOff x="4653280" y="998173"/>
-            <a:chExt cx="4409440" cy="3485200"/>
-          </a:xfrm>
-        </p:grpSpPr>
-        <p:pic>
-          <p:nvPicPr>
-            <p:cNvPr id="15" name="Picture 14">
-              <a:extLst>
-                <a:ext uri="{FF2B5EF4-FFF2-40B4-BE49-F238E27FC236}">
-                  <a16:creationId xmlns:a16="http://schemas.microsoft.com/office/drawing/2014/main" id="{57DBB4A8-5F5C-5C09-42C0-8F718B052C94}"/>
-                </a:ext>
-              </a:extLst>
-            </p:cNvPr>
-            <p:cNvPicPr>
-              <a:picLocks noChangeAspect="1"/>
-            </p:cNvPicPr>
-            <p:nvPr/>
-          </p:nvPicPr>
-          <p:blipFill>
-            <a:blip r:embed="rId3"/>
-            <a:srcRect l="17621" t="5658" r="16588" b="7880"/>
-            <a:stretch/>
-          </p:blipFill>
-          <p:spPr>
-            <a:xfrm>
-              <a:off x="5034649" y="2167866"/>
-              <a:ext cx="2286000" cy="1215414"/>
-            </a:xfrm>
-            <a:prstGeom prst="rect">
-              <a:avLst/>
-            </a:prstGeom>
-          </p:spPr>
-        </p:pic>
-        <p:pic>
-          <p:nvPicPr>
-            <p:cNvPr id="17" name="Picture 16">
-              <a:extLst>
-                <a:ext uri="{FF2B5EF4-FFF2-40B4-BE49-F238E27FC236}">
-                  <a16:creationId xmlns:a16="http://schemas.microsoft.com/office/drawing/2014/main" id="{80412A94-F395-646F-7D1C-E82470B5A69F}"/>
-                </a:ext>
-              </a:extLst>
-            </p:cNvPr>
-            <p:cNvPicPr>
-              <a:picLocks noChangeAspect="1"/>
-            </p:cNvPicPr>
-            <p:nvPr/>
-          </p:nvPicPr>
-          <p:blipFill>
-            <a:blip r:embed="rId3"/>
-            <a:srcRect l="17621" t="5658" r="16588" b="7880"/>
-            <a:stretch/>
-          </p:blipFill>
-          <p:spPr>
-            <a:xfrm>
-              <a:off x="5689600" y="2167866"/>
-              <a:ext cx="2286000" cy="1215414"/>
-            </a:xfrm>
-            <a:prstGeom prst="rect">
-              <a:avLst/>
-            </a:prstGeom>
-          </p:spPr>
-        </p:pic>
-        <p:pic>
-          <p:nvPicPr>
-            <p:cNvPr id="18" name="Picture 17">
-              <a:extLst>
-                <a:ext uri="{FF2B5EF4-FFF2-40B4-BE49-F238E27FC236}">
-                  <a16:creationId xmlns:a16="http://schemas.microsoft.com/office/drawing/2014/main" id="{EDF0C340-464C-587C-CB1A-5FBF6D6E683C}"/>
-                </a:ext>
-              </a:extLst>
-            </p:cNvPr>
-            <p:cNvPicPr>
-              <a:picLocks noChangeAspect="1"/>
-            </p:cNvPicPr>
-            <p:nvPr/>
-          </p:nvPicPr>
-          <p:blipFill>
-            <a:blip r:embed="rId3"/>
-            <a:srcRect l="17621" t="5658" r="16588" b="7880"/>
-            <a:stretch/>
-          </p:blipFill>
-          <p:spPr>
-            <a:xfrm>
-              <a:off x="6350000" y="2167866"/>
-              <a:ext cx="2286000" cy="1215414"/>
-            </a:xfrm>
-            <a:prstGeom prst="rect">
-              <a:avLst/>
-            </a:prstGeom>
-          </p:spPr>
-        </p:pic>
-        <p:sp>
-          <p:nvSpPr>
-            <p:cNvPr id="22" name="Right Brace 21">
-              <a:extLst>
-                <a:ext uri="{FF2B5EF4-FFF2-40B4-BE49-F238E27FC236}">
-                  <a16:creationId xmlns:a16="http://schemas.microsoft.com/office/drawing/2014/main" id="{30D4FAC7-0193-1710-772D-69805F210EC1}"/>
-                </a:ext>
-              </a:extLst>
-            </p:cNvPr>
-            <p:cNvSpPr/>
-            <p:nvPr/>
-          </p:nvSpPr>
-          <p:spPr>
-            <a:xfrm rot="5400000">
-              <a:off x="6678930" y="1641586"/>
-              <a:ext cx="307341" cy="3999391"/>
-            </a:xfrm>
-            <a:prstGeom prst="rightBrace">
-              <a:avLst>
-                <a:gd name="adj1" fmla="val 0"/>
-                <a:gd name="adj2" fmla="val 50000"/>
-              </a:avLst>
-            </a:prstGeom>
-            <a:ln>
-              <a:solidFill>
-                <a:srgbClr val="7030A0"/>
-              </a:solidFill>
-            </a:ln>
-          </p:spPr>
-          <p:style>
-            <a:lnRef idx="2">
-              <a:schemeClr val="accent1"/>
-            </a:lnRef>
-            <a:fillRef idx="0">
-              <a:schemeClr val="accent1"/>
-            </a:fillRef>
-            <a:effectRef idx="1">
-              <a:schemeClr val="accent1"/>
-            </a:effectRef>
-            <a:fontRef idx="minor">
-              <a:schemeClr val="tx1"/>
-            </a:fontRef>
-          </p:style>
-          <p:txBody>
-            <a:bodyPr rtlCol="0" anchor="ctr"/>
-            <a:lstStyle/>
-            <a:p>
-              <a:pPr algn="ctr"/>
-              <a:endParaRPr lang="en-CA"/>
+              <a:endParaRPr lang="en-CA" b="1" dirty="0"/>
             </a:p>
           </p:txBody>
         </p:sp>
         <p:sp>
           <p:nvSpPr>
-            <p:cNvPr id="24" name="TextBox 23">
+            <p:cNvPr id="20" name="TextBox 19">
               <a:extLst>
                 <a:ext uri="{FF2B5EF4-FFF2-40B4-BE49-F238E27FC236}">
-                  <a16:creationId xmlns:a16="http://schemas.microsoft.com/office/drawing/2014/main" id="{02B2033F-9B60-C0C6-0DCB-2FDE000EFD21}"/>
+                  <a16:creationId xmlns:a16="http://schemas.microsoft.com/office/drawing/2014/main" id="{6A8E238F-C766-55F9-5203-2A89085BD3D6}"/>
                 </a:ext>
               </a:extLst>
             </p:cNvPr>
@@ -4005,8 +3597,8 @@
           </p:nvSpPr>
           <p:spPr>
             <a:xfrm>
-              <a:off x="5418672" y="3864183"/>
-              <a:ext cx="2858335" cy="619190"/>
+              <a:off x="4780649" y="264160"/>
+              <a:ext cx="467360" cy="369332"/>
             </a:xfrm>
             <a:prstGeom prst="rect">
               <a:avLst/>
@@ -4019,298 +3611,486 @@
             </a:bodyPr>
             <a:lstStyle/>
             <a:p>
-              <a:pPr algn="ctr"/>
               <a:r>
-                <a:rPr lang="en-US" sz="1200" dirty="0"/>
-                <a:t>Wide population variance</a:t>
+                <a:rPr lang="en-US" b="1" dirty="0"/>
+                <a:t>B</a:t>
               </a:r>
-            </a:p>
-            <a:p>
-              <a:pPr algn="ctr"/>
-              <a:r>
-                <a:rPr lang="en-US" sz="1200" dirty="0"/>
-                <a:t>same IIV</a:t>
-              </a:r>
-              <a:endParaRPr lang="en-CA" sz="1200" dirty="0"/>
+              <a:endParaRPr lang="en-CA" b="1" dirty="0"/>
             </a:p>
           </p:txBody>
         </p:sp>
-        <p:pic>
-          <p:nvPicPr>
-            <p:cNvPr id="11" name="Picture 10">
+        <p:grpSp>
+          <p:nvGrpSpPr>
+            <p:cNvPr id="26" name="Group 25">
               <a:extLst>
                 <a:ext uri="{FF2B5EF4-FFF2-40B4-BE49-F238E27FC236}">
-                  <a16:creationId xmlns:a16="http://schemas.microsoft.com/office/drawing/2014/main" id="{8E418795-11AD-9440-5185-0E83D09D5595}"/>
+                  <a16:creationId xmlns:a16="http://schemas.microsoft.com/office/drawing/2014/main" id="{CDE7C73D-6260-7802-C850-CA45E90E93A8}"/>
                 </a:ext>
               </a:extLst>
             </p:cNvPr>
-            <p:cNvPicPr>
-              <a:picLocks noChangeAspect="1"/>
-            </p:cNvPicPr>
+            <p:cNvGrpSpPr/>
             <p:nvPr/>
-          </p:nvPicPr>
-          <p:blipFill>
-            <a:blip r:embed="rId3"/>
-            <a:srcRect l="18791" t="5658" r="17758" b="7880"/>
-            <a:stretch/>
-          </p:blipFill>
-          <p:spPr>
+          </p:nvGrpSpPr>
+          <p:grpSpPr>
             <a:xfrm>
-              <a:off x="4653280" y="998173"/>
-              <a:ext cx="4409440" cy="2430829"/>
+              <a:off x="877152" y="1008333"/>
+              <a:ext cx="2858335" cy="2596758"/>
+              <a:chOff x="877152" y="998173"/>
+              <a:chExt cx="2858335" cy="3490589"/>
             </a:xfrm>
-            <a:prstGeom prst="rect">
-              <a:avLst/>
-            </a:prstGeom>
-          </p:spPr>
-        </p:pic>
-      </p:grpSp>
-      <p:sp>
-        <p:nvSpPr>
-          <p:cNvPr id="28" name="TextBox 27">
-            <a:extLst>
-              <a:ext uri="{FF2B5EF4-FFF2-40B4-BE49-F238E27FC236}">
-                <a16:creationId xmlns:a16="http://schemas.microsoft.com/office/drawing/2014/main" id="{2E8CF036-F568-BF99-F996-37B9CCFE3B0E}"/>
-              </a:ext>
-            </a:extLst>
-          </p:cNvPr>
-          <p:cNvSpPr txBox="1"/>
-          <p:nvPr/>
-        </p:nvSpPr>
-        <p:spPr>
-          <a:xfrm>
-            <a:off x="374354" y="601395"/>
-            <a:ext cx="3804445" cy="323165"/>
-          </a:xfrm>
-          <a:prstGeom prst="rect">
-            <a:avLst/>
-          </a:prstGeom>
-          <a:noFill/>
-        </p:spPr>
-        <p:txBody>
-          <a:bodyPr wrap="square" rtlCol="0">
-            <a:spAutoFit/>
-          </a:bodyPr>
-          <a:lstStyle/>
-          <a:p>
-            <a:pPr algn="ctr"/>
-            <a:r>
-              <a:rPr lang="en-US" sz="1500" b="1" dirty="0"/>
-              <a:t>All predators encounter similar prey</a:t>
-            </a:r>
-            <a:endParaRPr lang="en-CA" sz="1500" b="1" dirty="0"/>
-          </a:p>
-        </p:txBody>
-      </p:sp>
-      <p:sp>
-        <p:nvSpPr>
-          <p:cNvPr id="29" name="TextBox 28">
-            <a:extLst>
-              <a:ext uri="{FF2B5EF4-FFF2-40B4-BE49-F238E27FC236}">
-                <a16:creationId xmlns:a16="http://schemas.microsoft.com/office/drawing/2014/main" id="{BBE0C67D-1769-FBD9-608C-27E9F129AD6A}"/>
-              </a:ext>
-            </a:extLst>
-          </p:cNvPr>
-          <p:cNvSpPr txBox="1"/>
-          <p:nvPr/>
-        </p:nvSpPr>
-        <p:spPr>
-          <a:xfrm>
-            <a:off x="4930377" y="602642"/>
-            <a:ext cx="3804445" cy="323165"/>
-          </a:xfrm>
-          <a:prstGeom prst="rect">
-            <a:avLst/>
-          </a:prstGeom>
-          <a:noFill/>
-        </p:spPr>
-        <p:txBody>
-          <a:bodyPr wrap="square" rtlCol="0">
-            <a:spAutoFit/>
-          </a:bodyPr>
-          <a:lstStyle/>
-          <a:p>
-            <a:pPr algn="ctr"/>
-            <a:r>
-              <a:rPr lang="en-US" sz="1500" b="1" dirty="0"/>
-              <a:t>All predators encounter diverse prey</a:t>
-            </a:r>
-            <a:endParaRPr lang="en-CA" sz="1500" b="1" dirty="0"/>
-          </a:p>
-        </p:txBody>
-      </p:sp>
-      <p:sp>
-        <p:nvSpPr>
-          <p:cNvPr id="47" name="TextBox 46">
-            <a:extLst>
-              <a:ext uri="{FF2B5EF4-FFF2-40B4-BE49-F238E27FC236}">
-                <a16:creationId xmlns:a16="http://schemas.microsoft.com/office/drawing/2014/main" id="{2A1640B7-6740-9510-7B9E-7FAF3021AE17}"/>
-              </a:ext>
-            </a:extLst>
-          </p:cNvPr>
-          <p:cNvSpPr txBox="1"/>
-          <p:nvPr/>
-        </p:nvSpPr>
-        <p:spPr>
-          <a:xfrm>
-            <a:off x="205978" y="3464560"/>
-            <a:ext cx="467360" cy="369332"/>
-          </a:xfrm>
-          <a:prstGeom prst="rect">
-            <a:avLst/>
-          </a:prstGeom>
-          <a:noFill/>
-        </p:spPr>
-        <p:txBody>
-          <a:bodyPr wrap="square" rtlCol="0">
-            <a:spAutoFit/>
-          </a:bodyPr>
-          <a:lstStyle/>
-          <a:p>
-            <a:r>
-              <a:rPr lang="en-US" b="1" dirty="0"/>
-              <a:t>C</a:t>
-            </a:r>
-            <a:endParaRPr lang="en-CA" b="1" dirty="0"/>
-          </a:p>
-        </p:txBody>
-      </p:sp>
-      <p:grpSp>
-        <p:nvGrpSpPr>
-          <p:cNvPr id="58" name="Group 57">
-            <a:extLst>
-              <a:ext uri="{FF2B5EF4-FFF2-40B4-BE49-F238E27FC236}">
-                <a16:creationId xmlns:a16="http://schemas.microsoft.com/office/drawing/2014/main" id="{4195557A-A629-5D94-3C44-B1EA2E7BCF4D}"/>
-              </a:ext>
-            </a:extLst>
-          </p:cNvPr>
-          <p:cNvGrpSpPr/>
-          <p:nvPr/>
-        </p:nvGrpSpPr>
-        <p:grpSpPr>
-          <a:xfrm>
-            <a:off x="1499540" y="3833262"/>
-            <a:ext cx="6127098" cy="2984181"/>
-            <a:chOff x="1336980" y="3589422"/>
-            <a:chExt cx="6127098" cy="2984181"/>
-          </a:xfrm>
-        </p:grpSpPr>
-        <p:pic>
-          <p:nvPicPr>
-            <p:cNvPr id="49" name="Picture 48">
+          </p:grpSpPr>
+          <p:pic>
+            <p:nvPicPr>
+              <p:cNvPr id="9" name="Picture 8">
+                <a:extLst>
+                  <a:ext uri="{FF2B5EF4-FFF2-40B4-BE49-F238E27FC236}">
+                    <a16:creationId xmlns:a16="http://schemas.microsoft.com/office/drawing/2014/main" id="{5D812663-9AE9-F98F-7B7E-820530A55A10}"/>
+                  </a:ext>
+                </a:extLst>
+              </p:cNvPr>
+              <p:cNvPicPr>
+                <a:picLocks noChangeAspect="1"/>
+              </p:cNvPicPr>
+              <p:nvPr/>
+            </p:nvPicPr>
+            <p:blipFill>
+              <a:blip r:embed="rId3"/>
+              <a:srcRect l="17412" t="5658" r="16163" b="7880"/>
+              <a:stretch/>
+            </p:blipFill>
+            <p:spPr>
+              <a:xfrm>
+                <a:off x="1270000" y="998173"/>
+                <a:ext cx="2052320" cy="2430828"/>
+              </a:xfrm>
+              <a:prstGeom prst="rect">
+                <a:avLst/>
+              </a:prstGeom>
+            </p:spPr>
+          </p:pic>
+          <p:pic>
+            <p:nvPicPr>
+              <p:cNvPr id="12" name="Picture 11">
+                <a:extLst>
+                  <a:ext uri="{FF2B5EF4-FFF2-40B4-BE49-F238E27FC236}">
+                    <a16:creationId xmlns:a16="http://schemas.microsoft.com/office/drawing/2014/main" id="{4F417F86-7720-29F4-E072-DCDB0E0E8CA9}"/>
+                  </a:ext>
+                </a:extLst>
+              </p:cNvPr>
+              <p:cNvPicPr>
+                <a:picLocks noChangeAspect="1"/>
+              </p:cNvPicPr>
+              <p:nvPr/>
+            </p:nvPicPr>
+            <p:blipFill>
+              <a:blip r:embed="rId3"/>
+              <a:srcRect l="17412" t="5658" r="16163" b="7880"/>
+              <a:stretch/>
+            </p:blipFill>
+            <p:spPr>
+              <a:xfrm>
+                <a:off x="1524000" y="2311400"/>
+                <a:ext cx="904977" cy="1071881"/>
+              </a:xfrm>
+              <a:prstGeom prst="rect">
+                <a:avLst/>
+              </a:prstGeom>
+            </p:spPr>
+          </p:pic>
+          <p:pic>
+            <p:nvPicPr>
+              <p:cNvPr id="13" name="Picture 12">
+                <a:extLst>
+                  <a:ext uri="{FF2B5EF4-FFF2-40B4-BE49-F238E27FC236}">
+                    <a16:creationId xmlns:a16="http://schemas.microsoft.com/office/drawing/2014/main" id="{D86D258D-2422-188A-AA04-AC0A06C2ACA5}"/>
+                  </a:ext>
+                </a:extLst>
+              </p:cNvPr>
+              <p:cNvPicPr>
+                <a:picLocks noChangeAspect="1"/>
+              </p:cNvPicPr>
+              <p:nvPr/>
+            </p:nvPicPr>
+            <p:blipFill>
+              <a:blip r:embed="rId3"/>
+              <a:srcRect l="17412" t="5658" r="16163" b="7880"/>
+              <a:stretch/>
+            </p:blipFill>
+            <p:spPr>
+              <a:xfrm>
+                <a:off x="1823351" y="2311399"/>
+                <a:ext cx="904977" cy="1071881"/>
+              </a:xfrm>
+              <a:prstGeom prst="rect">
+                <a:avLst/>
+              </a:prstGeom>
+            </p:spPr>
+          </p:pic>
+          <p:pic>
+            <p:nvPicPr>
+              <p:cNvPr id="14" name="Picture 13">
+                <a:extLst>
+                  <a:ext uri="{FF2B5EF4-FFF2-40B4-BE49-F238E27FC236}">
+                    <a16:creationId xmlns:a16="http://schemas.microsoft.com/office/drawing/2014/main" id="{D4493013-26A4-B90F-A000-D57C6A702CBF}"/>
+                  </a:ext>
+                </a:extLst>
+              </p:cNvPr>
+              <p:cNvPicPr>
+                <a:picLocks noChangeAspect="1"/>
+              </p:cNvPicPr>
+              <p:nvPr/>
+            </p:nvPicPr>
+            <p:blipFill>
+              <a:blip r:embed="rId3"/>
+              <a:srcRect l="17412" t="5658" r="16163" b="7880"/>
+              <a:stretch/>
+            </p:blipFill>
+            <p:spPr>
+              <a:xfrm>
+                <a:off x="2139930" y="2311400"/>
+                <a:ext cx="904977" cy="1071881"/>
+              </a:xfrm>
+              <a:prstGeom prst="rect">
+                <a:avLst/>
+              </a:prstGeom>
+            </p:spPr>
+          </p:pic>
+          <p:sp>
+            <p:nvSpPr>
+              <p:cNvPr id="21" name="Right Brace 20">
+                <a:extLst>
+                  <a:ext uri="{FF2B5EF4-FFF2-40B4-BE49-F238E27FC236}">
+                    <a16:creationId xmlns:a16="http://schemas.microsoft.com/office/drawing/2014/main" id="{10694201-DA9C-3721-BF39-2EE6A31CF584}"/>
+                  </a:ext>
+                </a:extLst>
+              </p:cNvPr>
+              <p:cNvSpPr/>
+              <p:nvPr/>
+            </p:nvSpPr>
+            <p:spPr>
+              <a:xfrm rot="5400000">
+                <a:off x="2142489" y="2621279"/>
+                <a:ext cx="307341" cy="2052320"/>
+              </a:xfrm>
+              <a:prstGeom prst="rightBrace">
+                <a:avLst>
+                  <a:gd name="adj1" fmla="val 0"/>
+                  <a:gd name="adj2" fmla="val 50000"/>
+                </a:avLst>
+              </a:prstGeom>
+              <a:ln>
+                <a:solidFill>
+                  <a:srgbClr val="7030A0"/>
+                </a:solidFill>
+              </a:ln>
+            </p:spPr>
+            <p:style>
+              <a:lnRef idx="2">
+                <a:schemeClr val="accent1"/>
+              </a:lnRef>
+              <a:fillRef idx="0">
+                <a:schemeClr val="accent1"/>
+              </a:fillRef>
+              <a:effectRef idx="1">
+                <a:schemeClr val="accent1"/>
+              </a:effectRef>
+              <a:fontRef idx="minor">
+                <a:schemeClr val="tx1"/>
+              </a:fontRef>
+            </p:style>
+            <p:txBody>
+              <a:bodyPr rtlCol="0" anchor="ctr"/>
+              <a:lstStyle/>
+              <a:p>
+                <a:pPr algn="ctr"/>
+                <a:endParaRPr lang="en-CA"/>
+              </a:p>
+            </p:txBody>
+          </p:sp>
+          <p:sp>
+            <p:nvSpPr>
+              <p:cNvPr id="23" name="TextBox 22">
+                <a:extLst>
+                  <a:ext uri="{FF2B5EF4-FFF2-40B4-BE49-F238E27FC236}">
+                    <a16:creationId xmlns:a16="http://schemas.microsoft.com/office/drawing/2014/main" id="{8EACD0A7-48EA-D19C-08D6-1A10035B5A06}"/>
+                  </a:ext>
+                </a:extLst>
+              </p:cNvPr>
+              <p:cNvSpPr txBox="1"/>
+              <p:nvPr/>
+            </p:nvSpPr>
+            <p:spPr>
+              <a:xfrm>
+                <a:off x="877152" y="3868187"/>
+                <a:ext cx="2858335" cy="620575"/>
+              </a:xfrm>
+              <a:prstGeom prst="rect">
+                <a:avLst/>
+              </a:prstGeom>
+              <a:noFill/>
+            </p:spPr>
+            <p:txBody>
+              <a:bodyPr wrap="square" rtlCol="0">
+                <a:spAutoFit/>
+              </a:bodyPr>
+              <a:lstStyle/>
+              <a:p>
+                <a:pPr algn="ctr"/>
+                <a:r>
+                  <a:rPr lang="en-US" sz="1200" dirty="0"/>
+                  <a:t>Narrow population variance</a:t>
+                </a:r>
+              </a:p>
+              <a:p>
+                <a:pPr algn="ctr"/>
+                <a:r>
+                  <a:rPr lang="en-US" sz="1200" dirty="0"/>
+                  <a:t>same IIV</a:t>
+                </a:r>
+                <a:endParaRPr lang="en-CA" sz="1200" dirty="0"/>
+              </a:p>
+            </p:txBody>
+          </p:sp>
+        </p:grpSp>
+        <p:grpSp>
+          <p:nvGrpSpPr>
+            <p:cNvPr id="32" name="Group 31">
               <a:extLst>
                 <a:ext uri="{FF2B5EF4-FFF2-40B4-BE49-F238E27FC236}">
-                  <a16:creationId xmlns:a16="http://schemas.microsoft.com/office/drawing/2014/main" id="{4BFE767A-41C0-A0AD-260E-18B466E48CA7}"/>
+                  <a16:creationId xmlns:a16="http://schemas.microsoft.com/office/drawing/2014/main" id="{4CE0B162-CD9D-2D67-15F1-7A0B1499AD1A}"/>
                 </a:ext>
               </a:extLst>
             </p:cNvPr>
-            <p:cNvPicPr>
-              <a:picLocks noChangeAspect="1"/>
-            </p:cNvPicPr>
+            <p:cNvGrpSpPr/>
             <p:nvPr/>
-          </p:nvPicPr>
-          <p:blipFill>
-            <a:blip r:embed="rId3"/>
-            <a:srcRect l="17621" t="5658" r="16588" b="7880"/>
-            <a:stretch/>
-          </p:blipFill>
-          <p:spPr>
+          </p:nvGrpSpPr>
+          <p:grpSpPr>
             <a:xfrm>
-              <a:off x="2602579" y="4847171"/>
-              <a:ext cx="2286000" cy="906207"/>
+              <a:off x="4653280" y="1008333"/>
+              <a:ext cx="4409440" cy="2598550"/>
+              <a:chOff x="4653280" y="998173"/>
+              <a:chExt cx="4409440" cy="3485200"/>
             </a:xfrm>
-            <a:prstGeom prst="rect">
-              <a:avLst/>
-            </a:prstGeom>
-          </p:spPr>
-        </p:pic>
-        <p:pic>
-          <p:nvPicPr>
-            <p:cNvPr id="51" name="Picture 50">
+          </p:grpSpPr>
+          <p:pic>
+            <p:nvPicPr>
+              <p:cNvPr id="15" name="Picture 14">
+                <a:extLst>
+                  <a:ext uri="{FF2B5EF4-FFF2-40B4-BE49-F238E27FC236}">
+                    <a16:creationId xmlns:a16="http://schemas.microsoft.com/office/drawing/2014/main" id="{57DBB4A8-5F5C-5C09-42C0-8F718B052C94}"/>
+                  </a:ext>
+                </a:extLst>
+              </p:cNvPr>
+              <p:cNvPicPr>
+                <a:picLocks noChangeAspect="1"/>
+              </p:cNvPicPr>
+              <p:nvPr/>
+            </p:nvPicPr>
+            <p:blipFill>
+              <a:blip r:embed="rId3"/>
+              <a:srcRect l="17621" t="5658" r="16588" b="7880"/>
+              <a:stretch/>
+            </p:blipFill>
+            <p:spPr>
+              <a:xfrm>
+                <a:off x="5034649" y="2167866"/>
+                <a:ext cx="2286000" cy="1215414"/>
+              </a:xfrm>
+              <a:prstGeom prst="rect">
+                <a:avLst/>
+              </a:prstGeom>
+            </p:spPr>
+          </p:pic>
+          <p:pic>
+            <p:nvPicPr>
+              <p:cNvPr id="17" name="Picture 16">
+                <a:extLst>
+                  <a:ext uri="{FF2B5EF4-FFF2-40B4-BE49-F238E27FC236}">
+                    <a16:creationId xmlns:a16="http://schemas.microsoft.com/office/drawing/2014/main" id="{80412A94-F395-646F-7D1C-E82470B5A69F}"/>
+                  </a:ext>
+                </a:extLst>
+              </p:cNvPr>
+              <p:cNvPicPr>
+                <a:picLocks noChangeAspect="1"/>
+              </p:cNvPicPr>
+              <p:nvPr/>
+            </p:nvPicPr>
+            <p:blipFill>
+              <a:blip r:embed="rId3"/>
+              <a:srcRect l="17621" t="5658" r="16588" b="7880"/>
+              <a:stretch/>
+            </p:blipFill>
+            <p:spPr>
+              <a:xfrm>
+                <a:off x="5689600" y="2167866"/>
+                <a:ext cx="2286000" cy="1215414"/>
+              </a:xfrm>
+              <a:prstGeom prst="rect">
+                <a:avLst/>
+              </a:prstGeom>
+            </p:spPr>
+          </p:pic>
+          <p:pic>
+            <p:nvPicPr>
+              <p:cNvPr id="18" name="Picture 17">
+                <a:extLst>
+                  <a:ext uri="{FF2B5EF4-FFF2-40B4-BE49-F238E27FC236}">
+                    <a16:creationId xmlns:a16="http://schemas.microsoft.com/office/drawing/2014/main" id="{EDF0C340-464C-587C-CB1A-5FBF6D6E683C}"/>
+                  </a:ext>
+                </a:extLst>
+              </p:cNvPr>
+              <p:cNvPicPr>
+                <a:picLocks noChangeAspect="1"/>
+              </p:cNvPicPr>
+              <p:nvPr/>
+            </p:nvPicPr>
+            <p:blipFill>
+              <a:blip r:embed="rId3"/>
+              <a:srcRect l="17621" t="5658" r="16588" b="7880"/>
+              <a:stretch/>
+            </p:blipFill>
+            <p:spPr>
+              <a:xfrm>
+                <a:off x="6350000" y="2167866"/>
+                <a:ext cx="2286000" cy="1215414"/>
+              </a:xfrm>
+              <a:prstGeom prst="rect">
+                <a:avLst/>
+              </a:prstGeom>
+            </p:spPr>
+          </p:pic>
+          <p:sp>
+            <p:nvSpPr>
+              <p:cNvPr id="22" name="Right Brace 21">
+                <a:extLst>
+                  <a:ext uri="{FF2B5EF4-FFF2-40B4-BE49-F238E27FC236}">
+                    <a16:creationId xmlns:a16="http://schemas.microsoft.com/office/drawing/2014/main" id="{30D4FAC7-0193-1710-772D-69805F210EC1}"/>
+                  </a:ext>
+                </a:extLst>
+              </p:cNvPr>
+              <p:cNvSpPr/>
+              <p:nvPr/>
+            </p:nvSpPr>
+            <p:spPr>
+              <a:xfrm rot="5400000">
+                <a:off x="6678930" y="1641586"/>
+                <a:ext cx="307341" cy="3999391"/>
+              </a:xfrm>
+              <a:prstGeom prst="rightBrace">
+                <a:avLst>
+                  <a:gd name="adj1" fmla="val 0"/>
+                  <a:gd name="adj2" fmla="val 50000"/>
+                </a:avLst>
+              </a:prstGeom>
+              <a:ln>
+                <a:solidFill>
+                  <a:srgbClr val="7030A0"/>
+                </a:solidFill>
+              </a:ln>
+            </p:spPr>
+            <p:style>
+              <a:lnRef idx="2">
+                <a:schemeClr val="accent1"/>
+              </a:lnRef>
+              <a:fillRef idx="0">
+                <a:schemeClr val="accent1"/>
+              </a:fillRef>
+              <a:effectRef idx="1">
+                <a:schemeClr val="accent1"/>
+              </a:effectRef>
+              <a:fontRef idx="minor">
+                <a:schemeClr val="tx1"/>
+              </a:fontRef>
+            </p:style>
+            <p:txBody>
+              <a:bodyPr rtlCol="0" anchor="ctr"/>
+              <a:lstStyle/>
+              <a:p>
+                <a:pPr algn="ctr"/>
+                <a:endParaRPr lang="en-CA"/>
+              </a:p>
+            </p:txBody>
+          </p:sp>
+          <p:sp>
+            <p:nvSpPr>
+              <p:cNvPr id="24" name="TextBox 23">
+                <a:extLst>
+                  <a:ext uri="{FF2B5EF4-FFF2-40B4-BE49-F238E27FC236}">
+                    <a16:creationId xmlns:a16="http://schemas.microsoft.com/office/drawing/2014/main" id="{02B2033F-9B60-C0C6-0DCB-2FDE000EFD21}"/>
+                  </a:ext>
+                </a:extLst>
+              </p:cNvPr>
+              <p:cNvSpPr txBox="1"/>
+              <p:nvPr/>
+            </p:nvSpPr>
+            <p:spPr>
+              <a:xfrm>
+                <a:off x="5418672" y="3864183"/>
+                <a:ext cx="2858335" cy="619190"/>
+              </a:xfrm>
+              <a:prstGeom prst="rect">
+                <a:avLst/>
+              </a:prstGeom>
+              <a:noFill/>
+            </p:spPr>
+            <p:txBody>
+              <a:bodyPr wrap="square" rtlCol="0">
+                <a:spAutoFit/>
+              </a:bodyPr>
+              <a:lstStyle/>
+              <a:p>
+                <a:pPr algn="ctr"/>
+                <a:r>
+                  <a:rPr lang="en-US" sz="1200" dirty="0"/>
+                  <a:t>Wide population variance</a:t>
+                </a:r>
+              </a:p>
+              <a:p>
+                <a:pPr algn="ctr"/>
+                <a:r>
+                  <a:rPr lang="en-US" sz="1200" dirty="0"/>
+                  <a:t>same IIV</a:t>
+                </a:r>
+                <a:endParaRPr lang="en-CA" sz="1200" dirty="0"/>
+              </a:p>
+            </p:txBody>
+          </p:sp>
+          <p:pic>
+            <p:nvPicPr>
+              <p:cNvPr id="11" name="Picture 10">
+                <a:extLst>
+                  <a:ext uri="{FF2B5EF4-FFF2-40B4-BE49-F238E27FC236}">
+                    <a16:creationId xmlns:a16="http://schemas.microsoft.com/office/drawing/2014/main" id="{8E418795-11AD-9440-5185-0E83D09D5595}"/>
+                  </a:ext>
+                </a:extLst>
+              </p:cNvPr>
+              <p:cNvPicPr>
+                <a:picLocks noChangeAspect="1"/>
+              </p:cNvPicPr>
+              <p:nvPr/>
+            </p:nvPicPr>
+            <p:blipFill>
+              <a:blip r:embed="rId3"/>
+              <a:srcRect l="18791" t="5658" r="17758" b="7880"/>
+              <a:stretch/>
+            </p:blipFill>
+            <p:spPr>
+              <a:xfrm>
+                <a:off x="4653280" y="998173"/>
+                <a:ext cx="4409440" cy="2430829"/>
+              </a:xfrm>
+              <a:prstGeom prst="rect">
+                <a:avLst/>
+              </a:prstGeom>
+            </p:spPr>
+          </p:pic>
+        </p:grpSp>
+        <p:sp>
+          <p:nvSpPr>
+            <p:cNvPr id="28" name="TextBox 27">
               <a:extLst>
                 <a:ext uri="{FF2B5EF4-FFF2-40B4-BE49-F238E27FC236}">
-                  <a16:creationId xmlns:a16="http://schemas.microsoft.com/office/drawing/2014/main" id="{385255D5-3B22-17CF-9009-0D1FA94EA34B}"/>
-                </a:ext>
-              </a:extLst>
-            </p:cNvPr>
-            <p:cNvPicPr>
-              <a:picLocks noChangeAspect="1"/>
-            </p:cNvPicPr>
-            <p:nvPr/>
-          </p:nvPicPr>
-          <p:blipFill>
-            <a:blip r:embed="rId3"/>
-            <a:srcRect l="17621" t="5658" r="16588" b="7880"/>
-            <a:stretch/>
-          </p:blipFill>
-          <p:spPr>
-            <a:xfrm>
-              <a:off x="2910095" y="4864216"/>
-              <a:ext cx="3267554" cy="906207"/>
-            </a:xfrm>
-            <a:prstGeom prst="rect">
-              <a:avLst/>
-            </a:prstGeom>
-          </p:spPr>
-        </p:pic>
-        <p:sp>
-          <p:nvSpPr>
-            <p:cNvPr id="52" name="Right Brace 51">
-              <a:extLst>
-                <a:ext uri="{FF2B5EF4-FFF2-40B4-BE49-F238E27FC236}">
-                  <a16:creationId xmlns:a16="http://schemas.microsoft.com/office/drawing/2014/main" id="{D6A57C26-E801-7288-36BF-DF61896AE016}"/>
-                </a:ext>
-              </a:extLst>
-            </p:cNvPr>
-            <p:cNvSpPr/>
-            <p:nvPr/>
-          </p:nvSpPr>
-          <p:spPr>
-            <a:xfrm rot="5400000">
-              <a:off x="4285954" y="3946048"/>
-              <a:ext cx="229152" cy="3999391"/>
-            </a:xfrm>
-            <a:prstGeom prst="rightBrace">
-              <a:avLst>
-                <a:gd name="adj1" fmla="val 0"/>
-                <a:gd name="adj2" fmla="val 50000"/>
-              </a:avLst>
-            </a:prstGeom>
-            <a:ln>
-              <a:solidFill>
-                <a:srgbClr val="7030A0"/>
-              </a:solidFill>
-            </a:ln>
-          </p:spPr>
-          <p:style>
-            <a:lnRef idx="2">
-              <a:schemeClr val="accent1"/>
-            </a:lnRef>
-            <a:fillRef idx="0">
-              <a:schemeClr val="accent1"/>
-            </a:fillRef>
-            <a:effectRef idx="1">
-              <a:schemeClr val="accent1"/>
-            </a:effectRef>
-            <a:fontRef idx="minor">
-              <a:schemeClr val="tx1"/>
-            </a:fontRef>
-          </p:style>
-          <p:txBody>
-            <a:bodyPr rtlCol="0" anchor="ctr"/>
-            <a:lstStyle/>
-            <a:p>
-              <a:pPr algn="ctr"/>
-              <a:endParaRPr lang="en-CA"/>
-            </a:p>
-          </p:txBody>
-        </p:sp>
-        <p:sp>
-          <p:nvSpPr>
-            <p:cNvPr id="53" name="TextBox 52">
-              <a:extLst>
-                <a:ext uri="{FF2B5EF4-FFF2-40B4-BE49-F238E27FC236}">
-                  <a16:creationId xmlns:a16="http://schemas.microsoft.com/office/drawing/2014/main" id="{67B5597B-E939-840D-0547-131F3A1BA29C}"/>
+                  <a16:creationId xmlns:a16="http://schemas.microsoft.com/office/drawing/2014/main" id="{2E8CF036-F568-BF99-F996-37B9CCFE3B0E}"/>
                 </a:ext>
               </a:extLst>
             </p:cNvPr>
@@ -4319,139 +4099,8 @@
           </p:nvSpPr>
           <p:spPr>
             <a:xfrm>
-              <a:off x="2986602" y="6111938"/>
-              <a:ext cx="2858335" cy="461665"/>
-            </a:xfrm>
-            <a:prstGeom prst="rect">
-              <a:avLst/>
-            </a:prstGeom>
-            <a:noFill/>
-          </p:spPr>
-          <p:txBody>
-            <a:bodyPr wrap="square" rtlCol="0">
-              <a:spAutoFit/>
-            </a:bodyPr>
-            <a:lstStyle/>
-            <a:p>
-              <a:pPr algn="ctr"/>
-              <a:r>
-                <a:rPr lang="en-US" sz="1200" dirty="0"/>
-                <a:t>Wide population variance</a:t>
-              </a:r>
-            </a:p>
-            <a:p>
-              <a:pPr algn="ctr"/>
-              <a:r>
-                <a:rPr lang="en-US" sz="1200" dirty="0"/>
-                <a:t>Differences in IIV</a:t>
-              </a:r>
-              <a:endParaRPr lang="en-CA" sz="1200" dirty="0"/>
-            </a:p>
-          </p:txBody>
-        </p:sp>
-        <p:pic>
-          <p:nvPicPr>
-            <p:cNvPr id="55" name="Picture 54">
-              <a:extLst>
-                <a:ext uri="{FF2B5EF4-FFF2-40B4-BE49-F238E27FC236}">
-                  <a16:creationId xmlns:a16="http://schemas.microsoft.com/office/drawing/2014/main" id="{C1A89140-8A83-0481-D8E8-916937E93223}"/>
-                </a:ext>
-              </a:extLst>
-            </p:cNvPr>
-            <p:cNvPicPr>
-              <a:picLocks noChangeAspect="1"/>
-            </p:cNvPicPr>
-            <p:nvPr/>
-          </p:nvPicPr>
-          <p:blipFill>
-            <a:blip r:embed="rId3"/>
-            <a:srcRect l="17412" t="5658" r="16163" b="7880"/>
-            <a:stretch/>
-          </p:blipFill>
-          <p:spPr>
-            <a:xfrm>
-              <a:off x="3492461" y="4874892"/>
-              <a:ext cx="602020" cy="878486"/>
-            </a:xfrm>
-            <a:prstGeom prst="rect">
-              <a:avLst/>
-            </a:prstGeom>
-          </p:spPr>
-        </p:pic>
-        <p:pic>
-          <p:nvPicPr>
-            <p:cNvPr id="56" name="Picture 55">
-              <a:extLst>
-                <a:ext uri="{FF2B5EF4-FFF2-40B4-BE49-F238E27FC236}">
-                  <a16:creationId xmlns:a16="http://schemas.microsoft.com/office/drawing/2014/main" id="{AE41A9A8-DACB-1FEE-D33B-F4CF96373E91}"/>
-                </a:ext>
-              </a:extLst>
-            </p:cNvPr>
-            <p:cNvPicPr>
-              <a:picLocks noChangeAspect="1"/>
-            </p:cNvPicPr>
-            <p:nvPr/>
-          </p:nvPicPr>
-          <p:blipFill>
-            <a:blip r:embed="rId3"/>
-            <a:srcRect l="17412" t="5658" r="16163" b="7880"/>
-            <a:stretch/>
-          </p:blipFill>
-          <p:spPr>
-            <a:xfrm>
-              <a:off x="4400530" y="4864216"/>
-              <a:ext cx="1123448" cy="878486"/>
-            </a:xfrm>
-            <a:prstGeom prst="rect">
-              <a:avLst/>
-            </a:prstGeom>
-          </p:spPr>
-        </p:pic>
-        <p:pic>
-          <p:nvPicPr>
-            <p:cNvPr id="54" name="Picture 53">
-              <a:extLst>
-                <a:ext uri="{FF2B5EF4-FFF2-40B4-BE49-F238E27FC236}">
-                  <a16:creationId xmlns:a16="http://schemas.microsoft.com/office/drawing/2014/main" id="{1087CFD4-6954-418B-818B-0A90B941562C}"/>
-                </a:ext>
-              </a:extLst>
-            </p:cNvPr>
-            <p:cNvPicPr>
-              <a:picLocks noChangeAspect="1"/>
-            </p:cNvPicPr>
-            <p:nvPr/>
-          </p:nvPicPr>
-          <p:blipFill>
-            <a:blip r:embed="rId3"/>
-            <a:srcRect l="17621" t="5658" r="16588" b="7880"/>
-            <a:stretch/>
-          </p:blipFill>
-          <p:spPr>
-            <a:xfrm>
-              <a:off x="2139930" y="3975053"/>
-              <a:ext cx="4572000" cy="1812415"/>
-            </a:xfrm>
-            <a:prstGeom prst="rect">
-              <a:avLst/>
-            </a:prstGeom>
-          </p:spPr>
-        </p:pic>
-        <p:sp>
-          <p:nvSpPr>
-            <p:cNvPr id="57" name="TextBox 56">
-              <a:extLst>
-                <a:ext uri="{FF2B5EF4-FFF2-40B4-BE49-F238E27FC236}">
-                  <a16:creationId xmlns:a16="http://schemas.microsoft.com/office/drawing/2014/main" id="{4172C3A8-3EAA-7B7B-8D69-E9F86403EA28}"/>
-                </a:ext>
-              </a:extLst>
-            </p:cNvPr>
-            <p:cNvSpPr txBox="1"/>
-            <p:nvPr/>
-          </p:nvSpPr>
-          <p:spPr>
-            <a:xfrm>
-              <a:off x="1336980" y="3589422"/>
-              <a:ext cx="6127098" cy="323165"/>
+              <a:off x="374354" y="601395"/>
+              <a:ext cx="3804445" cy="323165"/>
             </a:xfrm>
             <a:prstGeom prst="rect">
               <a:avLst/>
@@ -4467,12 +4116,384 @@
               <a:pPr algn="ctr"/>
               <a:r>
                 <a:rPr lang="en-US" sz="1500" b="1" dirty="0"/>
-                <a:t>Some predators encounter similar prey, others encounter diverse prey</a:t>
+                <a:t>All predators encounter similar prey</a:t>
               </a:r>
               <a:endParaRPr lang="en-CA" sz="1500" b="1" dirty="0"/>
             </a:p>
           </p:txBody>
         </p:sp>
+        <p:sp>
+          <p:nvSpPr>
+            <p:cNvPr id="29" name="TextBox 28">
+              <a:extLst>
+                <a:ext uri="{FF2B5EF4-FFF2-40B4-BE49-F238E27FC236}">
+                  <a16:creationId xmlns:a16="http://schemas.microsoft.com/office/drawing/2014/main" id="{BBE0C67D-1769-FBD9-608C-27E9F129AD6A}"/>
+                </a:ext>
+              </a:extLst>
+            </p:cNvPr>
+            <p:cNvSpPr txBox="1"/>
+            <p:nvPr/>
+          </p:nvSpPr>
+          <p:spPr>
+            <a:xfrm>
+              <a:off x="4930377" y="602642"/>
+              <a:ext cx="3804445" cy="323165"/>
+            </a:xfrm>
+            <a:prstGeom prst="rect">
+              <a:avLst/>
+            </a:prstGeom>
+            <a:noFill/>
+          </p:spPr>
+          <p:txBody>
+            <a:bodyPr wrap="square" rtlCol="0">
+              <a:spAutoFit/>
+            </a:bodyPr>
+            <a:lstStyle/>
+            <a:p>
+              <a:pPr algn="ctr"/>
+              <a:r>
+                <a:rPr lang="en-US" sz="1500" b="1" dirty="0"/>
+                <a:t>All predators encounter diverse prey</a:t>
+              </a:r>
+              <a:endParaRPr lang="en-CA" sz="1500" b="1" dirty="0"/>
+            </a:p>
+          </p:txBody>
+        </p:sp>
+        <p:sp>
+          <p:nvSpPr>
+            <p:cNvPr id="47" name="TextBox 46">
+              <a:extLst>
+                <a:ext uri="{FF2B5EF4-FFF2-40B4-BE49-F238E27FC236}">
+                  <a16:creationId xmlns:a16="http://schemas.microsoft.com/office/drawing/2014/main" id="{2A1640B7-6740-9510-7B9E-7FAF3021AE17}"/>
+                </a:ext>
+              </a:extLst>
+            </p:cNvPr>
+            <p:cNvSpPr txBox="1"/>
+            <p:nvPr/>
+          </p:nvSpPr>
+          <p:spPr>
+            <a:xfrm>
+              <a:off x="205978" y="3464560"/>
+              <a:ext cx="467360" cy="369332"/>
+            </a:xfrm>
+            <a:prstGeom prst="rect">
+              <a:avLst/>
+            </a:prstGeom>
+            <a:noFill/>
+          </p:spPr>
+          <p:txBody>
+            <a:bodyPr wrap="square" rtlCol="0">
+              <a:spAutoFit/>
+            </a:bodyPr>
+            <a:lstStyle/>
+            <a:p>
+              <a:r>
+                <a:rPr lang="en-US" b="1" dirty="0"/>
+                <a:t>C</a:t>
+              </a:r>
+              <a:endParaRPr lang="en-CA" b="1" dirty="0"/>
+            </a:p>
+          </p:txBody>
+        </p:sp>
+        <p:grpSp>
+          <p:nvGrpSpPr>
+            <p:cNvPr id="58" name="Group 57">
+              <a:extLst>
+                <a:ext uri="{FF2B5EF4-FFF2-40B4-BE49-F238E27FC236}">
+                  <a16:creationId xmlns:a16="http://schemas.microsoft.com/office/drawing/2014/main" id="{4195557A-A629-5D94-3C44-B1EA2E7BCF4D}"/>
+                </a:ext>
+              </a:extLst>
+            </p:cNvPr>
+            <p:cNvGrpSpPr/>
+            <p:nvPr/>
+          </p:nvGrpSpPr>
+          <p:grpSpPr>
+            <a:xfrm>
+              <a:off x="1499540" y="3833262"/>
+              <a:ext cx="6127098" cy="2984181"/>
+              <a:chOff x="1336980" y="3589422"/>
+              <a:chExt cx="6127098" cy="2984181"/>
+            </a:xfrm>
+          </p:grpSpPr>
+          <p:pic>
+            <p:nvPicPr>
+              <p:cNvPr id="49" name="Picture 48">
+                <a:extLst>
+                  <a:ext uri="{FF2B5EF4-FFF2-40B4-BE49-F238E27FC236}">
+                    <a16:creationId xmlns:a16="http://schemas.microsoft.com/office/drawing/2014/main" id="{4BFE767A-41C0-A0AD-260E-18B466E48CA7}"/>
+                  </a:ext>
+                </a:extLst>
+              </p:cNvPr>
+              <p:cNvPicPr>
+                <a:picLocks noChangeAspect="1"/>
+              </p:cNvPicPr>
+              <p:nvPr/>
+            </p:nvPicPr>
+            <p:blipFill>
+              <a:blip r:embed="rId3"/>
+              <a:srcRect l="17621" t="5658" r="16588" b="7880"/>
+              <a:stretch/>
+            </p:blipFill>
+            <p:spPr>
+              <a:xfrm>
+                <a:off x="2602579" y="4847171"/>
+                <a:ext cx="2286000" cy="906207"/>
+              </a:xfrm>
+              <a:prstGeom prst="rect">
+                <a:avLst/>
+              </a:prstGeom>
+            </p:spPr>
+          </p:pic>
+          <p:pic>
+            <p:nvPicPr>
+              <p:cNvPr id="51" name="Picture 50">
+                <a:extLst>
+                  <a:ext uri="{FF2B5EF4-FFF2-40B4-BE49-F238E27FC236}">
+                    <a16:creationId xmlns:a16="http://schemas.microsoft.com/office/drawing/2014/main" id="{385255D5-3B22-17CF-9009-0D1FA94EA34B}"/>
+                  </a:ext>
+                </a:extLst>
+              </p:cNvPr>
+              <p:cNvPicPr>
+                <a:picLocks noChangeAspect="1"/>
+              </p:cNvPicPr>
+              <p:nvPr/>
+            </p:nvPicPr>
+            <p:blipFill>
+              <a:blip r:embed="rId3"/>
+              <a:srcRect l="17621" t="5658" r="16588" b="7880"/>
+              <a:stretch/>
+            </p:blipFill>
+            <p:spPr>
+              <a:xfrm>
+                <a:off x="2910095" y="4864216"/>
+                <a:ext cx="3267554" cy="906207"/>
+              </a:xfrm>
+              <a:prstGeom prst="rect">
+                <a:avLst/>
+              </a:prstGeom>
+            </p:spPr>
+          </p:pic>
+          <p:sp>
+            <p:nvSpPr>
+              <p:cNvPr id="52" name="Right Brace 51">
+                <a:extLst>
+                  <a:ext uri="{FF2B5EF4-FFF2-40B4-BE49-F238E27FC236}">
+                    <a16:creationId xmlns:a16="http://schemas.microsoft.com/office/drawing/2014/main" id="{D6A57C26-E801-7288-36BF-DF61896AE016}"/>
+                  </a:ext>
+                </a:extLst>
+              </p:cNvPr>
+              <p:cNvSpPr/>
+              <p:nvPr/>
+            </p:nvSpPr>
+            <p:spPr>
+              <a:xfrm rot="5400000">
+                <a:off x="4285954" y="3946048"/>
+                <a:ext cx="229152" cy="3999391"/>
+              </a:xfrm>
+              <a:prstGeom prst="rightBrace">
+                <a:avLst>
+                  <a:gd name="adj1" fmla="val 0"/>
+                  <a:gd name="adj2" fmla="val 50000"/>
+                </a:avLst>
+              </a:prstGeom>
+              <a:ln>
+                <a:solidFill>
+                  <a:srgbClr val="7030A0"/>
+                </a:solidFill>
+              </a:ln>
+            </p:spPr>
+            <p:style>
+              <a:lnRef idx="2">
+                <a:schemeClr val="accent1"/>
+              </a:lnRef>
+              <a:fillRef idx="0">
+                <a:schemeClr val="accent1"/>
+              </a:fillRef>
+              <a:effectRef idx="1">
+                <a:schemeClr val="accent1"/>
+              </a:effectRef>
+              <a:fontRef idx="minor">
+                <a:schemeClr val="tx1"/>
+              </a:fontRef>
+            </p:style>
+            <p:txBody>
+              <a:bodyPr rtlCol="0" anchor="ctr"/>
+              <a:lstStyle/>
+              <a:p>
+                <a:pPr algn="ctr"/>
+                <a:endParaRPr lang="en-CA"/>
+              </a:p>
+            </p:txBody>
+          </p:sp>
+          <p:sp>
+            <p:nvSpPr>
+              <p:cNvPr id="53" name="TextBox 52">
+                <a:extLst>
+                  <a:ext uri="{FF2B5EF4-FFF2-40B4-BE49-F238E27FC236}">
+                    <a16:creationId xmlns:a16="http://schemas.microsoft.com/office/drawing/2014/main" id="{67B5597B-E939-840D-0547-131F3A1BA29C}"/>
+                  </a:ext>
+                </a:extLst>
+              </p:cNvPr>
+              <p:cNvSpPr txBox="1"/>
+              <p:nvPr/>
+            </p:nvSpPr>
+            <p:spPr>
+              <a:xfrm>
+                <a:off x="2986602" y="6111938"/>
+                <a:ext cx="2858335" cy="461665"/>
+              </a:xfrm>
+              <a:prstGeom prst="rect">
+                <a:avLst/>
+              </a:prstGeom>
+              <a:noFill/>
+            </p:spPr>
+            <p:txBody>
+              <a:bodyPr wrap="square" rtlCol="0">
+                <a:spAutoFit/>
+              </a:bodyPr>
+              <a:lstStyle/>
+              <a:p>
+                <a:pPr algn="ctr"/>
+                <a:r>
+                  <a:rPr lang="en-US" sz="1200" dirty="0"/>
+                  <a:t>Wide population variance</a:t>
+                </a:r>
+              </a:p>
+              <a:p>
+                <a:pPr algn="ctr"/>
+                <a:r>
+                  <a:rPr lang="en-US" sz="1200" dirty="0"/>
+                  <a:t>Differences in IIV</a:t>
+                </a:r>
+                <a:endParaRPr lang="en-CA" sz="1200" dirty="0"/>
+              </a:p>
+            </p:txBody>
+          </p:sp>
+          <p:pic>
+            <p:nvPicPr>
+              <p:cNvPr id="55" name="Picture 54">
+                <a:extLst>
+                  <a:ext uri="{FF2B5EF4-FFF2-40B4-BE49-F238E27FC236}">
+                    <a16:creationId xmlns:a16="http://schemas.microsoft.com/office/drawing/2014/main" id="{C1A89140-8A83-0481-D8E8-916937E93223}"/>
+                  </a:ext>
+                </a:extLst>
+              </p:cNvPr>
+              <p:cNvPicPr>
+                <a:picLocks noChangeAspect="1"/>
+              </p:cNvPicPr>
+              <p:nvPr/>
+            </p:nvPicPr>
+            <p:blipFill>
+              <a:blip r:embed="rId3"/>
+              <a:srcRect l="17412" t="5658" r="16163" b="7880"/>
+              <a:stretch/>
+            </p:blipFill>
+            <p:spPr>
+              <a:xfrm>
+                <a:off x="3492461" y="4874892"/>
+                <a:ext cx="602020" cy="878486"/>
+              </a:xfrm>
+              <a:prstGeom prst="rect">
+                <a:avLst/>
+              </a:prstGeom>
+            </p:spPr>
+          </p:pic>
+          <p:pic>
+            <p:nvPicPr>
+              <p:cNvPr id="56" name="Picture 55">
+                <a:extLst>
+                  <a:ext uri="{FF2B5EF4-FFF2-40B4-BE49-F238E27FC236}">
+                    <a16:creationId xmlns:a16="http://schemas.microsoft.com/office/drawing/2014/main" id="{AE41A9A8-DACB-1FEE-D33B-F4CF96373E91}"/>
+                  </a:ext>
+                </a:extLst>
+              </p:cNvPr>
+              <p:cNvPicPr>
+                <a:picLocks noChangeAspect="1"/>
+              </p:cNvPicPr>
+              <p:nvPr/>
+            </p:nvPicPr>
+            <p:blipFill>
+              <a:blip r:embed="rId3"/>
+              <a:srcRect l="17412" t="5658" r="16163" b="7880"/>
+              <a:stretch/>
+            </p:blipFill>
+            <p:spPr>
+              <a:xfrm>
+                <a:off x="4400530" y="4864216"/>
+                <a:ext cx="1123448" cy="878486"/>
+              </a:xfrm>
+              <a:prstGeom prst="rect">
+                <a:avLst/>
+              </a:prstGeom>
+            </p:spPr>
+          </p:pic>
+          <p:pic>
+            <p:nvPicPr>
+              <p:cNvPr id="54" name="Picture 53">
+                <a:extLst>
+                  <a:ext uri="{FF2B5EF4-FFF2-40B4-BE49-F238E27FC236}">
+                    <a16:creationId xmlns:a16="http://schemas.microsoft.com/office/drawing/2014/main" id="{1087CFD4-6954-418B-818B-0A90B941562C}"/>
+                  </a:ext>
+                </a:extLst>
+              </p:cNvPr>
+              <p:cNvPicPr>
+                <a:picLocks noChangeAspect="1"/>
+              </p:cNvPicPr>
+              <p:nvPr/>
+            </p:nvPicPr>
+            <p:blipFill>
+              <a:blip r:embed="rId3"/>
+              <a:srcRect l="17621" t="5658" r="16588" b="7880"/>
+              <a:stretch/>
+            </p:blipFill>
+            <p:spPr>
+              <a:xfrm>
+                <a:off x="2139930" y="3975053"/>
+                <a:ext cx="4572000" cy="1812415"/>
+              </a:xfrm>
+              <a:prstGeom prst="rect">
+                <a:avLst/>
+              </a:prstGeom>
+            </p:spPr>
+          </p:pic>
+          <p:sp>
+            <p:nvSpPr>
+              <p:cNvPr id="57" name="TextBox 56">
+                <a:extLst>
+                  <a:ext uri="{FF2B5EF4-FFF2-40B4-BE49-F238E27FC236}">
+                    <a16:creationId xmlns:a16="http://schemas.microsoft.com/office/drawing/2014/main" id="{4172C3A8-3EAA-7B7B-8D69-E9F86403EA28}"/>
+                  </a:ext>
+                </a:extLst>
+              </p:cNvPr>
+              <p:cNvSpPr txBox="1"/>
+              <p:nvPr/>
+            </p:nvSpPr>
+            <p:spPr>
+              <a:xfrm>
+                <a:off x="1336980" y="3589422"/>
+                <a:ext cx="6127098" cy="323165"/>
+              </a:xfrm>
+              <a:prstGeom prst="rect">
+                <a:avLst/>
+              </a:prstGeom>
+              <a:noFill/>
+            </p:spPr>
+            <p:txBody>
+              <a:bodyPr wrap="square" rtlCol="0">
+                <a:spAutoFit/>
+              </a:bodyPr>
+              <a:lstStyle/>
+              <a:p>
+                <a:pPr algn="ctr"/>
+                <a:r>
+                  <a:rPr lang="en-US" sz="1500" b="1" dirty="0"/>
+                  <a:t>Some predators encounter similar prey, others encounter diverse prey</a:t>
+                </a:r>
+                <a:endParaRPr lang="en-CA" sz="1500" b="1" dirty="0"/>
+              </a:p>
+            </p:txBody>
+          </p:sp>
+        </p:grpSp>
       </p:grpSp>
     </p:spTree>
   </p:cSld>

</xml_diff>

<commit_message>
Windows --> added plot to fig1c
</commit_message>
<xml_diff>
--- a/outputs/04_outputs_figures/figure1-raw.pptx
+++ b/outputs/04_outputs_figures/figure1-raw.pptx
@@ -110,12 +110,12 @@
   <p:extLst>
     <p:ext uri="{EFAFB233-063F-42B5-8137-9DF3F51BA10A}">
       <p15:sldGuideLst xmlns:p15="http://schemas.microsoft.com/office/powerpoint/2012/main">
-        <p15:guide id="1" orient="horz" pos="2160" userDrawn="1">
+        <p15:guide id="1" orient="horz" pos="2376" userDrawn="1">
           <p15:clr>
             <a:srgbClr val="A4A3A4"/>
           </p15:clr>
         </p15:guide>
-        <p15:guide id="2" pos="2880" userDrawn="1">
+        <p15:guide id="2" pos="1440" userDrawn="1">
           <p15:clr>
             <a:srgbClr val="A4A3A4"/>
           </p15:clr>
@@ -3529,10 +3529,10 @@
       </p:grpSpPr>
       <p:grpSp>
         <p:nvGrpSpPr>
-          <p:cNvPr id="37" name="Group 36">
+          <p:cNvPr id="59" name="Group 58">
             <a:extLst>
               <a:ext uri="{FF2B5EF4-FFF2-40B4-BE49-F238E27FC236}">
-                <a16:creationId xmlns:a16="http://schemas.microsoft.com/office/drawing/2014/main" id="{1789EB0B-3E06-4E57-5C49-AAFE96E1BBF2}"/>
+                <a16:creationId xmlns:a16="http://schemas.microsoft.com/office/drawing/2014/main" id="{49CF956D-1F29-85C4-5B60-2B2207331138}"/>
               </a:ext>
             </a:extLst>
           </p:cNvPr>
@@ -3541,10 +3541,10 @@
         </p:nvGrpSpPr>
         <p:grpSpPr>
           <a:xfrm>
-            <a:off x="193040" y="-40640"/>
-            <a:ext cx="8869680" cy="6951309"/>
-            <a:chOff x="193040" y="-40640"/>
-            <a:chExt cx="8869680" cy="6951309"/>
+            <a:off x="193040" y="-81280"/>
+            <a:ext cx="8869680" cy="6991949"/>
+            <a:chOff x="193040" y="-81280"/>
+            <a:chExt cx="8869680" cy="6991949"/>
           </a:xfrm>
         </p:grpSpPr>
         <p:grpSp>
@@ -3561,7 +3561,7 @@
           </p:nvGrpSpPr>
           <p:grpSpPr>
             <a:xfrm>
-              <a:off x="193040" y="-40640"/>
+              <a:off x="193040" y="-81280"/>
               <a:ext cx="8869680" cy="3527389"/>
               <a:chOff x="193040" y="264160"/>
               <a:chExt cx="8869680" cy="3527389"/>
@@ -3611,7 +3611,7 @@
             <p:spPr>
               <a:xfrm>
                 <a:off x="193040" y="264160"/>
-                <a:ext cx="467360" cy="369332"/>
+                <a:ext cx="467360" cy="307777"/>
               </a:xfrm>
               <a:prstGeom prst="rect">
                 <a:avLst/>
@@ -3625,12 +3625,12 @@
               <a:lstStyle/>
               <a:p>
                 <a:r>
-                  <a:rPr lang="en-US" b="1" dirty="0">
+                  <a:rPr lang="en-US" sz="1400" b="1" dirty="0">
                     <a:latin typeface="Aptos Display" panose="020B0004020202020204" pitchFamily="34" charset="0"/>
                   </a:rPr>
                   <a:t>A</a:t>
                 </a:r>
-                <a:endParaRPr lang="en-CA" b="1" dirty="0">
+                <a:endParaRPr lang="en-CA" sz="1400" b="1" dirty="0">
                   <a:latin typeface="Aptos Display" panose="020B0004020202020204" pitchFamily="34" charset="0"/>
                 </a:endParaRPr>
               </a:p>
@@ -3651,7 +3651,7 @@
             <p:spPr>
               <a:xfrm>
                 <a:off x="4780649" y="264160"/>
-                <a:ext cx="467360" cy="369332"/>
+                <a:ext cx="467360" cy="307777"/>
               </a:xfrm>
               <a:prstGeom prst="rect">
                 <a:avLst/>
@@ -3665,12 +3665,12 @@
               <a:lstStyle/>
               <a:p>
                 <a:r>
-                  <a:rPr lang="en-US" b="1" dirty="0">
+                  <a:rPr lang="en-US" sz="1400" b="1" dirty="0">
                     <a:latin typeface="Aptos Display" panose="020B0004020202020204" pitchFamily="34" charset="0"/>
                   </a:rPr>
                   <a:t>B</a:t>
                 </a:r>
-                <a:endParaRPr lang="en-CA" b="1" dirty="0">
+                <a:endParaRPr lang="en-CA" sz="1400" b="1" dirty="0">
                   <a:latin typeface="Aptos Display" panose="020B0004020202020204" pitchFamily="34" charset="0"/>
                 </a:endParaRPr>
               </a:p>
@@ -3884,7 +3884,7 @@
                 <a:lstStyle/>
                 <a:p>
                   <a:pPr algn="ctr"/>
-                  <a:endParaRPr lang="en-CA"/>
+                  <a:endParaRPr lang="en-CA" dirty="0"/>
                 </a:p>
               </p:txBody>
             </p:sp>
@@ -4185,7 +4185,7 @@
             <p:spPr>
               <a:xfrm>
                 <a:off x="374354" y="601395"/>
-                <a:ext cx="3804445" cy="323165"/>
+                <a:ext cx="3804445" cy="307777"/>
               </a:xfrm>
               <a:prstGeom prst="rect">
                 <a:avLst/>
@@ -4200,12 +4200,12 @@
               <a:p>
                 <a:pPr algn="ctr"/>
                 <a:r>
-                  <a:rPr lang="en-US" sz="1500" b="1" dirty="0">
+                  <a:rPr lang="en-US" sz="1400" b="1" dirty="0">
                     <a:latin typeface="Aptos Display" panose="020B0004020202020204" pitchFamily="34" charset="0"/>
                   </a:rPr>
                   <a:t>All predators encounter similar prey</a:t>
                 </a:r>
-                <a:endParaRPr lang="en-CA" sz="1500" b="1" dirty="0">
+                <a:endParaRPr lang="en-CA" sz="1400" b="1" dirty="0">
                   <a:latin typeface="Aptos Display" panose="020B0004020202020204" pitchFamily="34" charset="0"/>
                 </a:endParaRPr>
               </a:p>
@@ -4226,7 +4226,7 @@
             <p:spPr>
               <a:xfrm>
                 <a:off x="4930377" y="602642"/>
-                <a:ext cx="3804445" cy="323165"/>
+                <a:ext cx="3804445" cy="307777"/>
               </a:xfrm>
               <a:prstGeom prst="rect">
                 <a:avLst/>
@@ -4241,12 +4241,12 @@
               <a:p>
                 <a:pPr algn="ctr"/>
                 <a:r>
-                  <a:rPr lang="en-US" sz="1500" b="1" dirty="0">
+                  <a:rPr lang="en-US" sz="1400" b="1" dirty="0">
                     <a:latin typeface="Aptos Display" panose="020B0004020202020204" pitchFamily="34" charset="0"/>
                   </a:rPr>
                   <a:t>All predators encounter diverse prey</a:t>
                 </a:r>
-                <a:endParaRPr lang="en-CA" sz="1500" b="1" dirty="0">
+                <a:endParaRPr lang="en-CA" sz="1400" b="1" dirty="0">
                   <a:latin typeface="Aptos Display" panose="020B0004020202020204" pitchFamily="34" charset="0"/>
                 </a:endParaRPr>
               </a:p>
@@ -4535,12 +4535,93 @@
             </p:style>
           </p:cxnSp>
         </p:grpSp>
+        <p:sp>
+          <p:nvSpPr>
+            <p:cNvPr id="47" name="TextBox 46">
+              <a:extLst>
+                <a:ext uri="{FF2B5EF4-FFF2-40B4-BE49-F238E27FC236}">
+                  <a16:creationId xmlns:a16="http://schemas.microsoft.com/office/drawing/2014/main" id="{2A1640B7-6740-9510-7B9E-7FAF3021AE17}"/>
+                </a:ext>
+              </a:extLst>
+            </p:cNvPr>
+            <p:cNvSpPr txBox="1"/>
+            <p:nvPr/>
+          </p:nvSpPr>
+          <p:spPr>
+            <a:xfrm>
+              <a:off x="205978" y="3362960"/>
+              <a:ext cx="467360" cy="307777"/>
+            </a:xfrm>
+            <a:prstGeom prst="rect">
+              <a:avLst/>
+            </a:prstGeom>
+            <a:noFill/>
+          </p:spPr>
+          <p:txBody>
+            <a:bodyPr wrap="square" rtlCol="0">
+              <a:spAutoFit/>
+            </a:bodyPr>
+            <a:lstStyle/>
+            <a:p>
+              <a:r>
+                <a:rPr lang="en-US" sz="1400" b="1" dirty="0">
+                  <a:latin typeface="Aptos Display" panose="020B0004020202020204" pitchFamily="34" charset="0"/>
+                </a:rPr>
+                <a:t>C</a:t>
+              </a:r>
+              <a:endParaRPr lang="en-CA" sz="1400" b="1" dirty="0">
+                <a:latin typeface="Aptos Display" panose="020B0004020202020204" pitchFamily="34" charset="0"/>
+              </a:endParaRPr>
+            </a:p>
+          </p:txBody>
+        </p:sp>
+        <p:sp>
+          <p:nvSpPr>
+            <p:cNvPr id="57" name="TextBox 56">
+              <a:extLst>
+                <a:ext uri="{FF2B5EF4-FFF2-40B4-BE49-F238E27FC236}">
+                  <a16:creationId xmlns:a16="http://schemas.microsoft.com/office/drawing/2014/main" id="{4172C3A8-3EAA-7B7B-8D69-E9F86403EA28}"/>
+                </a:ext>
+              </a:extLst>
+            </p:cNvPr>
+            <p:cNvSpPr txBox="1"/>
+            <p:nvPr/>
+          </p:nvSpPr>
+          <p:spPr>
+            <a:xfrm>
+              <a:off x="1509700" y="3691022"/>
+              <a:ext cx="6127098" cy="307777"/>
+            </a:xfrm>
+            <a:prstGeom prst="rect">
+              <a:avLst/>
+            </a:prstGeom>
+            <a:noFill/>
+          </p:spPr>
+          <p:txBody>
+            <a:bodyPr wrap="square" rtlCol="0">
+              <a:spAutoFit/>
+            </a:bodyPr>
+            <a:lstStyle/>
+            <a:p>
+              <a:pPr algn="ctr"/>
+              <a:r>
+                <a:rPr lang="en-US" sz="1400" b="1" dirty="0">
+                  <a:latin typeface="Aptos Display" panose="020B0004020202020204" pitchFamily="34" charset="0"/>
+                </a:rPr>
+                <a:t>Some predators encounter similar prey, others encounter diverse prey</a:t>
+              </a:r>
+              <a:endParaRPr lang="en-CA" sz="1400" b="1" dirty="0">
+                <a:latin typeface="Aptos Display" panose="020B0004020202020204" pitchFamily="34" charset="0"/>
+              </a:endParaRPr>
+            </a:p>
+          </p:txBody>
+        </p:sp>
         <p:grpSp>
           <p:nvGrpSpPr>
-            <p:cNvPr id="35" name="Group 34">
+            <p:cNvPr id="43" name="Group 42">
               <a:extLst>
                 <a:ext uri="{FF2B5EF4-FFF2-40B4-BE49-F238E27FC236}">
-                  <a16:creationId xmlns:a16="http://schemas.microsoft.com/office/drawing/2014/main" id="{17B9F922-5865-3310-7CB4-3EB8273791F0}"/>
+                  <a16:creationId xmlns:a16="http://schemas.microsoft.com/office/drawing/2014/main" id="{8E0861C1-4231-15DC-5540-8C586D016155}"/>
                 </a:ext>
               </a:extLst>
             </p:cNvPr>
@@ -4549,18 +4630,173 @@
           </p:nvGrpSpPr>
           <p:grpSpPr>
             <a:xfrm>
-              <a:off x="205978" y="3474720"/>
-              <a:ext cx="7420660" cy="3435949"/>
-              <a:chOff x="205978" y="3464560"/>
-              <a:chExt cx="7420660" cy="3435949"/>
+              <a:off x="375920" y="3729168"/>
+              <a:ext cx="7761272" cy="3181501"/>
+              <a:chOff x="91440" y="3729168"/>
+              <a:chExt cx="7761272" cy="3181501"/>
             </a:xfrm>
           </p:grpSpPr>
+          <p:pic>
+            <p:nvPicPr>
+              <p:cNvPr id="54" name="Picture 53">
+                <a:extLst>
+                  <a:ext uri="{FF2B5EF4-FFF2-40B4-BE49-F238E27FC236}">
+                    <a16:creationId xmlns:a16="http://schemas.microsoft.com/office/drawing/2014/main" id="{1087CFD4-6954-418B-818B-0A90B941562C}"/>
+                  </a:ext>
+                </a:extLst>
+              </p:cNvPr>
+              <p:cNvPicPr>
+                <a:picLocks noChangeAspect="1"/>
+              </p:cNvPicPr>
+              <p:nvPr/>
+            </p:nvPicPr>
+            <p:blipFill>
+              <a:blip r:embed="rId3"/>
+              <a:srcRect l="18699" t="5658" r="18141" b="7880"/>
+              <a:stretch/>
+            </p:blipFill>
+            <p:spPr>
+              <a:xfrm>
+                <a:off x="91440" y="4127453"/>
+                <a:ext cx="4389120" cy="1812415"/>
+              </a:xfrm>
+              <a:prstGeom prst="rect">
+                <a:avLst/>
+              </a:prstGeom>
+            </p:spPr>
+          </p:pic>
+          <p:pic>
+            <p:nvPicPr>
+              <p:cNvPr id="51" name="Picture 50">
+                <a:extLst>
+                  <a:ext uri="{FF2B5EF4-FFF2-40B4-BE49-F238E27FC236}">
+                    <a16:creationId xmlns:a16="http://schemas.microsoft.com/office/drawing/2014/main" id="{385255D5-3B22-17CF-9009-0D1FA94EA34B}"/>
+                  </a:ext>
+                </a:extLst>
+              </p:cNvPr>
+              <p:cNvPicPr>
+                <a:picLocks noChangeAspect="1"/>
+              </p:cNvPicPr>
+              <p:nvPr/>
+            </p:nvPicPr>
+            <p:blipFill>
+              <a:blip r:embed="rId3">
+                <a:duotone>
+                  <a:prstClr val="black"/>
+                  <a:schemeClr val="accent4">
+                    <a:tint val="45000"/>
+                    <a:satMod val="400000"/>
+                  </a:schemeClr>
+                </a:duotone>
+              </a:blip>
+              <a:srcRect l="17621" t="5658" r="16588" b="7880"/>
+              <a:stretch/>
+            </p:blipFill>
+            <p:spPr>
+              <a:xfrm>
+                <a:off x="786655" y="5016616"/>
+                <a:ext cx="3267554" cy="906207"/>
+              </a:xfrm>
+              <a:prstGeom prst="rect">
+                <a:avLst/>
+              </a:prstGeom>
+            </p:spPr>
+          </p:pic>
+          <p:pic>
+            <p:nvPicPr>
+              <p:cNvPr id="49" name="Picture 48">
+                <a:extLst>
+                  <a:ext uri="{FF2B5EF4-FFF2-40B4-BE49-F238E27FC236}">
+                    <a16:creationId xmlns:a16="http://schemas.microsoft.com/office/drawing/2014/main" id="{4BFE767A-41C0-A0AD-260E-18B466E48CA7}"/>
+                  </a:ext>
+                </a:extLst>
+              </p:cNvPr>
+              <p:cNvPicPr>
+                <a:picLocks noChangeAspect="1"/>
+              </p:cNvPicPr>
+              <p:nvPr/>
+            </p:nvPicPr>
+            <p:blipFill>
+              <a:blip r:embed="rId3">
+                <a:duotone>
+                  <a:prstClr val="black"/>
+                  <a:schemeClr val="accent1">
+                    <a:tint val="45000"/>
+                    <a:satMod val="400000"/>
+                  </a:schemeClr>
+                </a:duotone>
+              </a:blip>
+              <a:srcRect l="17621" t="5658" r="16588" b="7880"/>
+              <a:stretch/>
+            </p:blipFill>
+            <p:spPr>
+              <a:xfrm>
+                <a:off x="702659" y="5009730"/>
+                <a:ext cx="1806861" cy="906208"/>
+              </a:xfrm>
+              <a:prstGeom prst="rect">
+                <a:avLst/>
+              </a:prstGeom>
+            </p:spPr>
+          </p:pic>
           <p:sp>
             <p:nvSpPr>
-              <p:cNvPr id="47" name="TextBox 46">
+              <p:cNvPr id="52" name="Right Brace 51">
                 <a:extLst>
                   <a:ext uri="{FF2B5EF4-FFF2-40B4-BE49-F238E27FC236}">
-                    <a16:creationId xmlns:a16="http://schemas.microsoft.com/office/drawing/2014/main" id="{2A1640B7-6740-9510-7B9E-7FAF3021AE17}"/>
+                    <a16:creationId xmlns:a16="http://schemas.microsoft.com/office/drawing/2014/main" id="{D6A57C26-E801-7288-36BF-DF61896AE016}"/>
+                  </a:ext>
+                </a:extLst>
+              </p:cNvPr>
+              <p:cNvSpPr/>
+              <p:nvPr/>
+            </p:nvSpPr>
+            <p:spPr>
+              <a:xfrm rot="5400000">
+                <a:off x="2162514" y="4098448"/>
+                <a:ext cx="229152" cy="3999391"/>
+              </a:xfrm>
+              <a:prstGeom prst="rightBrace">
+                <a:avLst>
+                  <a:gd name="adj1" fmla="val 0"/>
+                  <a:gd name="adj2" fmla="val 50000"/>
+                </a:avLst>
+              </a:prstGeom>
+              <a:ln>
+                <a:solidFill>
+                  <a:srgbClr val="7030A0"/>
+                </a:solidFill>
+              </a:ln>
+            </p:spPr>
+            <p:style>
+              <a:lnRef idx="2">
+                <a:schemeClr val="accent1"/>
+              </a:lnRef>
+              <a:fillRef idx="0">
+                <a:schemeClr val="accent1"/>
+              </a:fillRef>
+              <a:effectRef idx="1">
+                <a:schemeClr val="accent1"/>
+              </a:effectRef>
+              <a:fontRef idx="minor">
+                <a:schemeClr val="tx1"/>
+              </a:fontRef>
+            </p:style>
+            <p:txBody>
+              <a:bodyPr rtlCol="0" anchor="ctr"/>
+              <a:lstStyle/>
+              <a:p>
+                <a:pPr algn="ctr"/>
+                <a:endParaRPr lang="en-CA"/>
+              </a:p>
+            </p:txBody>
+          </p:sp>
+          <p:sp>
+            <p:nvSpPr>
+              <p:cNvPr id="53" name="TextBox 52">
+                <a:extLst>
+                  <a:ext uri="{FF2B5EF4-FFF2-40B4-BE49-F238E27FC236}">
+                    <a16:creationId xmlns:a16="http://schemas.microsoft.com/office/drawing/2014/main" id="{67B5597B-E939-840D-0547-131F3A1BA29C}"/>
                   </a:ext>
                 </a:extLst>
               </p:cNvPr>
@@ -4569,8 +4805,8 @@
             </p:nvSpPr>
             <p:spPr>
               <a:xfrm>
-                <a:off x="205978" y="3464560"/>
-                <a:ext cx="467360" cy="369332"/>
+                <a:off x="863162" y="6264338"/>
+                <a:ext cx="2858335" cy="646331"/>
               </a:xfrm>
               <a:prstGeom prst="rect">
                 <a:avLst/>
@@ -4583,24 +4819,221 @@
               </a:bodyPr>
               <a:lstStyle/>
               <a:p>
+                <a:pPr algn="ctr"/>
                 <a:r>
-                  <a:rPr lang="en-US" b="1" dirty="0">
+                  <a:rPr lang="en-US" sz="1200" dirty="0">
                     <a:latin typeface="Aptos Display" panose="020B0004020202020204" pitchFamily="34" charset="0"/>
                   </a:rPr>
-                  <a:t>C</a:t>
+                  <a:t>Wide population variance</a:t>
                 </a:r>
-                <a:endParaRPr lang="en-CA" b="1" dirty="0">
+              </a:p>
+              <a:p>
+                <a:pPr algn="ctr"/>
+                <a:r>
+                  <a:rPr lang="en-US" sz="1200" dirty="0">
+                    <a:latin typeface="Aptos Display" panose="020B0004020202020204" pitchFamily="34" charset="0"/>
+                  </a:rPr>
+                  <a:t>Different means (tactics)</a:t>
+                </a:r>
+              </a:p>
+              <a:p>
+                <a:pPr algn="ctr"/>
+                <a:r>
+                  <a:rPr lang="en-US" sz="1200" dirty="0">
+                    <a:latin typeface="Aptos Display" panose="020B0004020202020204" pitchFamily="34" charset="0"/>
+                  </a:rPr>
+                  <a:t>Differences in IIV (specialisation)</a:t>
+                </a:r>
+                <a:endParaRPr lang="en-CA" sz="1200" dirty="0">
                   <a:latin typeface="Aptos Display" panose="020B0004020202020204" pitchFamily="34" charset="0"/>
                 </a:endParaRPr>
               </a:p>
             </p:txBody>
           </p:sp>
+          <p:pic>
+            <p:nvPicPr>
+              <p:cNvPr id="3" name="Picture 2">
+                <a:extLst>
+                  <a:ext uri="{FF2B5EF4-FFF2-40B4-BE49-F238E27FC236}">
+                    <a16:creationId xmlns:a16="http://schemas.microsoft.com/office/drawing/2014/main" id="{73557525-E920-BB5F-A22D-5ED7E53CE9A2}"/>
+                  </a:ext>
+                </a:extLst>
+              </p:cNvPr>
+              <p:cNvPicPr>
+                <a:picLocks noChangeAspect="1"/>
+              </p:cNvPicPr>
+              <p:nvPr/>
+            </p:nvPicPr>
+            <p:blipFill>
+              <a:blip r:embed="rId3">
+                <a:duotone>
+                  <a:prstClr val="black"/>
+                  <a:schemeClr val="accent2">
+                    <a:tint val="45000"/>
+                    <a:satMod val="400000"/>
+                  </a:schemeClr>
+                </a:duotone>
+              </a:blip>
+              <a:srcRect l="17621" t="5658" r="16588" b="7880"/>
+              <a:stretch/>
+            </p:blipFill>
+            <p:spPr>
+              <a:xfrm>
+                <a:off x="2748649" y="5009730"/>
+                <a:ext cx="660047" cy="906207"/>
+              </a:xfrm>
+              <a:prstGeom prst="rect">
+                <a:avLst/>
+              </a:prstGeom>
+            </p:spPr>
+          </p:pic>
+          <p:cxnSp>
+            <p:nvCxnSpPr>
+              <p:cNvPr id="27" name="Straight Connector 26">
+                <a:extLst>
+                  <a:ext uri="{FF2B5EF4-FFF2-40B4-BE49-F238E27FC236}">
+                    <a16:creationId xmlns:a16="http://schemas.microsoft.com/office/drawing/2014/main" id="{AEDA58B1-85F6-0F04-30F1-4A1A5ABFC7A6}"/>
+                  </a:ext>
+                </a:extLst>
+              </p:cNvPr>
+              <p:cNvCxnSpPr>
+                <a:cxnSpLocks/>
+              </p:cNvCxnSpPr>
+              <p:nvPr/>
+            </p:nvCxnSpPr>
+            <p:spPr>
+              <a:xfrm>
+                <a:off x="1587703" y="5055656"/>
+                <a:ext cx="0" cy="842879"/>
+              </a:xfrm>
+              <a:prstGeom prst="line">
+                <a:avLst/>
+              </a:prstGeom>
+              <a:ln w="19050">
+                <a:solidFill>
+                  <a:schemeClr val="tx2">
+                    <a:lumMod val="60000"/>
+                    <a:lumOff val="40000"/>
+                  </a:schemeClr>
+                </a:solidFill>
+                <a:prstDash val="sysDash"/>
+              </a:ln>
+            </p:spPr>
+            <p:style>
+              <a:lnRef idx="2">
+                <a:schemeClr val="accent1"/>
+              </a:lnRef>
+              <a:fillRef idx="0">
+                <a:schemeClr val="accent1"/>
+              </a:fillRef>
+              <a:effectRef idx="1">
+                <a:schemeClr val="accent1"/>
+              </a:effectRef>
+              <a:fontRef idx="minor">
+                <a:schemeClr val="tx1"/>
+              </a:fontRef>
+            </p:style>
+          </p:cxnSp>
+          <p:cxnSp>
+            <p:nvCxnSpPr>
+              <p:cNvPr id="30" name="Straight Connector 29">
+                <a:extLst>
+                  <a:ext uri="{FF2B5EF4-FFF2-40B4-BE49-F238E27FC236}">
+                    <a16:creationId xmlns:a16="http://schemas.microsoft.com/office/drawing/2014/main" id="{002BCB19-1097-FB68-62B7-0214745B7775}"/>
+                  </a:ext>
+                </a:extLst>
+              </p:cNvPr>
+              <p:cNvCxnSpPr>
+                <a:cxnSpLocks/>
+              </p:cNvCxnSpPr>
+              <p:nvPr/>
+            </p:nvCxnSpPr>
+            <p:spPr>
+              <a:xfrm>
+                <a:off x="2415374" y="5055656"/>
+                <a:ext cx="0" cy="842879"/>
+              </a:xfrm>
+              <a:prstGeom prst="line">
+                <a:avLst/>
+              </a:prstGeom>
+              <a:ln w="19050">
+                <a:solidFill>
+                  <a:schemeClr val="accent4">
+                    <a:lumMod val="60000"/>
+                    <a:lumOff val="40000"/>
+                  </a:schemeClr>
+                </a:solidFill>
+                <a:prstDash val="sysDash"/>
+              </a:ln>
+            </p:spPr>
+            <p:style>
+              <a:lnRef idx="2">
+                <a:schemeClr val="accent1"/>
+              </a:lnRef>
+              <a:fillRef idx="0">
+                <a:schemeClr val="accent1"/>
+              </a:fillRef>
+              <a:effectRef idx="1">
+                <a:schemeClr val="accent1"/>
+              </a:effectRef>
+              <a:fontRef idx="minor">
+                <a:schemeClr val="tx1"/>
+              </a:fontRef>
+            </p:style>
+          </p:cxnSp>
+          <p:cxnSp>
+            <p:nvCxnSpPr>
+              <p:cNvPr id="31" name="Straight Connector 30">
+                <a:extLst>
+                  <a:ext uri="{FF2B5EF4-FFF2-40B4-BE49-F238E27FC236}">
+                    <a16:creationId xmlns:a16="http://schemas.microsoft.com/office/drawing/2014/main" id="{E1627D63-D5F2-14E3-F8F1-7BF8E6234D9F}"/>
+                  </a:ext>
+                </a:extLst>
+              </p:cNvPr>
+              <p:cNvCxnSpPr>
+                <a:cxnSpLocks/>
+              </p:cNvCxnSpPr>
+              <p:nvPr/>
+            </p:nvCxnSpPr>
+            <p:spPr>
+              <a:xfrm>
+                <a:off x="3078848" y="5069784"/>
+                <a:ext cx="0" cy="842879"/>
+              </a:xfrm>
+              <a:prstGeom prst="line">
+                <a:avLst/>
+              </a:prstGeom>
+              <a:ln w="19050">
+                <a:solidFill>
+                  <a:schemeClr val="accent2">
+                    <a:lumMod val="60000"/>
+                    <a:lumOff val="40000"/>
+                  </a:schemeClr>
+                </a:solidFill>
+                <a:prstDash val="sysDash"/>
+              </a:ln>
+            </p:spPr>
+            <p:style>
+              <a:lnRef idx="2">
+                <a:schemeClr val="accent1"/>
+              </a:lnRef>
+              <a:fillRef idx="0">
+                <a:schemeClr val="accent1"/>
+              </a:fillRef>
+              <a:effectRef idx="1">
+                <a:schemeClr val="accent1"/>
+              </a:effectRef>
+              <a:fontRef idx="minor">
+                <a:schemeClr val="tx1"/>
+              </a:fontRef>
+            </p:style>
+          </p:cxnSp>
           <p:grpSp>
             <p:nvGrpSpPr>
-              <p:cNvPr id="33" name="Group 32">
+              <p:cNvPr id="41" name="Group 40">
                 <a:extLst>
                   <a:ext uri="{FF2B5EF4-FFF2-40B4-BE49-F238E27FC236}">
-                    <a16:creationId xmlns:a16="http://schemas.microsoft.com/office/drawing/2014/main" id="{8A157BBE-55EF-131A-20EF-D858050895B7}"/>
+                    <a16:creationId xmlns:a16="http://schemas.microsoft.com/office/drawing/2014/main" id="{F81EB96E-1D85-879F-BC16-9D091041EEFC}"/>
                   </a:ext>
                 </a:extLst>
               </p:cNvPr>
@@ -4609,18 +5042,18 @@
             </p:nvGrpSpPr>
             <p:grpSpPr>
               <a:xfrm>
-                <a:off x="1499540" y="3731662"/>
-                <a:ext cx="6127098" cy="3168847"/>
-                <a:chOff x="1499540" y="3833262"/>
-                <a:chExt cx="6127098" cy="3168847"/>
+                <a:off x="4994377" y="3729168"/>
+                <a:ext cx="2858335" cy="2858335"/>
+                <a:chOff x="4994377" y="3729168"/>
+                <a:chExt cx="2858335" cy="2858335"/>
               </a:xfrm>
             </p:grpSpPr>
             <p:pic>
               <p:nvPicPr>
-                <p:cNvPr id="54" name="Picture 53">
+                <p:cNvPr id="38" name="Picture 37" descr="A dotted diagram with a line&#10;&#10;AI-generated content may be incorrect.">
                   <a:extLst>
                     <a:ext uri="{FF2B5EF4-FFF2-40B4-BE49-F238E27FC236}">
-                      <a16:creationId xmlns:a16="http://schemas.microsoft.com/office/drawing/2014/main" id="{1087CFD4-6954-418B-818B-0A90B941562C}"/>
+                      <a16:creationId xmlns:a16="http://schemas.microsoft.com/office/drawing/2014/main" id="{937CA3B4-F935-287B-25A8-AB93B725FB57}"/>
                     </a:ext>
                   </a:extLst>
                 </p:cNvPr>
@@ -4630,88 +5063,15 @@
                 <p:nvPr/>
               </p:nvPicPr>
               <p:blipFill>
-                <a:blip r:embed="rId3"/>
-                <a:srcRect l="17621" t="5658" r="16588" b="7880"/>
-                <a:stretch/>
+                <a:blip r:embed="rId4"/>
+                <a:stretch>
+                  <a:fillRect/>
+                </a:stretch>
               </p:blipFill>
               <p:spPr>
                 <a:xfrm>
-                  <a:off x="2302490" y="4218893"/>
-                  <a:ext cx="4572000" cy="1812415"/>
-                </a:xfrm>
-                <a:prstGeom prst="rect">
-                  <a:avLst/>
-                </a:prstGeom>
-              </p:spPr>
-            </p:pic>
-            <p:pic>
-              <p:nvPicPr>
-                <p:cNvPr id="51" name="Picture 50">
-                  <a:extLst>
-                    <a:ext uri="{FF2B5EF4-FFF2-40B4-BE49-F238E27FC236}">
-                      <a16:creationId xmlns:a16="http://schemas.microsoft.com/office/drawing/2014/main" id="{385255D5-3B22-17CF-9009-0D1FA94EA34B}"/>
-                    </a:ext>
-                  </a:extLst>
-                </p:cNvPr>
-                <p:cNvPicPr>
-                  <a:picLocks noChangeAspect="1"/>
-                </p:cNvPicPr>
-                <p:nvPr/>
-              </p:nvPicPr>
-              <p:blipFill>
-                <a:blip r:embed="rId3">
-                  <a:duotone>
-                    <a:prstClr val="black"/>
-                    <a:schemeClr val="accent4">
-                      <a:tint val="45000"/>
-                      <a:satMod val="400000"/>
-                    </a:schemeClr>
-                  </a:duotone>
-                </a:blip>
-                <a:srcRect l="17621" t="5658" r="16588" b="7880"/>
-                <a:stretch/>
-              </p:blipFill>
-              <p:spPr>
-                <a:xfrm>
-                  <a:off x="3072655" y="5108056"/>
-                  <a:ext cx="3267554" cy="906207"/>
-                </a:xfrm>
-                <a:prstGeom prst="rect">
-                  <a:avLst/>
-                </a:prstGeom>
-              </p:spPr>
-            </p:pic>
-            <p:pic>
-              <p:nvPicPr>
-                <p:cNvPr id="49" name="Picture 48">
-                  <a:extLst>
-                    <a:ext uri="{FF2B5EF4-FFF2-40B4-BE49-F238E27FC236}">
-                      <a16:creationId xmlns:a16="http://schemas.microsoft.com/office/drawing/2014/main" id="{4BFE767A-41C0-A0AD-260E-18B466E48CA7}"/>
-                    </a:ext>
-                  </a:extLst>
-                </p:cNvPr>
-                <p:cNvPicPr>
-                  <a:picLocks noChangeAspect="1"/>
-                </p:cNvPicPr>
-                <p:nvPr/>
-              </p:nvPicPr>
-              <p:blipFill>
-                <a:blip r:embed="rId3">
-                  <a:duotone>
-                    <a:prstClr val="black"/>
-                    <a:schemeClr val="accent1">
-                      <a:tint val="45000"/>
-                      <a:satMod val="400000"/>
-                    </a:schemeClr>
-                  </a:duotone>
-                </a:blip>
-                <a:srcRect l="17621" t="5658" r="16588" b="7880"/>
-                <a:stretch/>
-              </p:blipFill>
-              <p:spPr>
-                <a:xfrm>
-                  <a:off x="2988659" y="5101170"/>
-                  <a:ext cx="1806861" cy="906208"/>
+                  <a:off x="5412688" y="4127454"/>
+                  <a:ext cx="2027014" cy="2027014"/>
                 </a:xfrm>
                 <a:prstGeom prst="rect">
                   <a:avLst/>
@@ -4720,62 +5080,10 @@
             </p:pic>
             <p:sp>
               <p:nvSpPr>
-                <p:cNvPr id="52" name="Right Brace 51">
+                <p:cNvPr id="39" name="TextBox 38">
                   <a:extLst>
                     <a:ext uri="{FF2B5EF4-FFF2-40B4-BE49-F238E27FC236}">
-                      <a16:creationId xmlns:a16="http://schemas.microsoft.com/office/drawing/2014/main" id="{D6A57C26-E801-7288-36BF-DF61896AE016}"/>
-                    </a:ext>
-                  </a:extLst>
-                </p:cNvPr>
-                <p:cNvSpPr/>
-                <p:nvPr/>
-              </p:nvSpPr>
-              <p:spPr>
-                <a:xfrm rot="5400000">
-                  <a:off x="4448514" y="4189888"/>
-                  <a:ext cx="229152" cy="3999391"/>
-                </a:xfrm>
-                <a:prstGeom prst="rightBrace">
-                  <a:avLst>
-                    <a:gd name="adj1" fmla="val 0"/>
-                    <a:gd name="adj2" fmla="val 50000"/>
-                  </a:avLst>
-                </a:prstGeom>
-                <a:ln>
-                  <a:solidFill>
-                    <a:srgbClr val="7030A0"/>
-                  </a:solidFill>
-                </a:ln>
-              </p:spPr>
-              <p:style>
-                <a:lnRef idx="2">
-                  <a:schemeClr val="accent1"/>
-                </a:lnRef>
-                <a:fillRef idx="0">
-                  <a:schemeClr val="accent1"/>
-                </a:fillRef>
-                <a:effectRef idx="1">
-                  <a:schemeClr val="accent1"/>
-                </a:effectRef>
-                <a:fontRef idx="minor">
-                  <a:schemeClr val="tx1"/>
-                </a:fontRef>
-              </p:style>
-              <p:txBody>
-                <a:bodyPr rtlCol="0" anchor="ctr"/>
-                <a:lstStyle/>
-                <a:p>
-                  <a:pPr algn="ctr"/>
-                  <a:endParaRPr lang="en-CA"/>
-                </a:p>
-              </p:txBody>
-            </p:sp>
-            <p:sp>
-              <p:nvSpPr>
-                <p:cNvPr id="53" name="TextBox 52">
-                  <a:extLst>
-                    <a:ext uri="{FF2B5EF4-FFF2-40B4-BE49-F238E27FC236}">
-                      <a16:creationId xmlns:a16="http://schemas.microsoft.com/office/drawing/2014/main" id="{67B5597B-E939-840D-0547-131F3A1BA29C}"/>
+                      <a16:creationId xmlns:a16="http://schemas.microsoft.com/office/drawing/2014/main" id="{E2346356-5021-FC7D-C700-17E90A386CD0}"/>
                     </a:ext>
                   </a:extLst>
                 </p:cNvPr>
@@ -4784,8 +5092,8 @@
               </p:nvSpPr>
               <p:spPr>
                 <a:xfrm>
-                  <a:off x="3149162" y="6355778"/>
-                  <a:ext cx="2858335" cy="646331"/>
+                  <a:off x="4994377" y="6170406"/>
+                  <a:ext cx="2858335" cy="276999"/>
                 </a:xfrm>
                 <a:prstGeom prst="rect">
                   <a:avLst/>
@@ -4803,25 +5111,7 @@
                     <a:rPr lang="en-US" sz="1200" dirty="0">
                       <a:latin typeface="Aptos Display" panose="020B0004020202020204" pitchFamily="34" charset="0"/>
                     </a:rPr>
-                    <a:t>Wide population variance</a:t>
-                  </a:r>
-                </a:p>
-                <a:p>
-                  <a:pPr algn="ctr"/>
-                  <a:r>
-                    <a:rPr lang="en-US" sz="1200" dirty="0">
-                      <a:latin typeface="Aptos Display" panose="020B0004020202020204" pitchFamily="34" charset="0"/>
-                    </a:rPr>
-                    <a:t>Different means (tactics)</a:t>
-                  </a:r>
-                </a:p>
-                <a:p>
-                  <a:pPr algn="ctr"/>
-                  <a:r>
-                    <a:rPr lang="en-US" sz="1200" dirty="0">
-                      <a:latin typeface="Aptos Display" panose="020B0004020202020204" pitchFamily="34" charset="0"/>
-                    </a:rPr>
-                    <a:t>Differences in IIV (specialisation)</a:t>
+                    <a:t>IIV (specialisation)</a:t>
                   </a:r>
                   <a:endParaRPr lang="en-CA" sz="1200" dirty="0">
                     <a:latin typeface="Aptos Display" panose="020B0004020202020204" pitchFamily="34" charset="0"/>
@@ -4831,10 +5121,10 @@
             </p:sp>
             <p:sp>
               <p:nvSpPr>
-                <p:cNvPr id="57" name="TextBox 56">
+                <p:cNvPr id="40" name="TextBox 39">
                   <a:extLst>
                     <a:ext uri="{FF2B5EF4-FFF2-40B4-BE49-F238E27FC236}">
-                      <a16:creationId xmlns:a16="http://schemas.microsoft.com/office/drawing/2014/main" id="{4172C3A8-3EAA-7B7B-8D69-E9F86403EA28}"/>
+                      <a16:creationId xmlns:a16="http://schemas.microsoft.com/office/drawing/2014/main" id="{DC1FC199-B256-3953-FA82-194D01BC8E86}"/>
                     </a:ext>
                   </a:extLst>
                 </p:cNvPr>
@@ -4842,9 +5132,9 @@
                 <p:nvPr/>
               </p:nvSpPr>
               <p:spPr>
-                <a:xfrm>
-                  <a:off x="1499540" y="3833262"/>
-                  <a:ext cx="6127098" cy="323165"/>
+                <a:xfrm rot="16200000">
+                  <a:off x="3826490" y="5019836"/>
+                  <a:ext cx="2858335" cy="276999"/>
                 </a:xfrm>
                 <a:prstGeom prst="rect">
                   <a:avLst/>
@@ -4859,197 +5149,137 @@
                 <a:p>
                   <a:pPr algn="ctr"/>
                   <a:r>
-                    <a:rPr lang="en-US" sz="1500" b="1" dirty="0">
+                    <a:rPr lang="en-US" sz="1200" dirty="0">
                       <a:latin typeface="Aptos Display" panose="020B0004020202020204" pitchFamily="34" charset="0"/>
                     </a:rPr>
-                    <a:t>Some predators encounter similar prey, others encounter diverse prey</a:t>
+                    <a:t>Hunting success</a:t>
                   </a:r>
-                  <a:endParaRPr lang="en-CA" sz="1500" b="1" dirty="0">
+                  <a:endParaRPr lang="en-CA" sz="1200" dirty="0">
                     <a:latin typeface="Aptos Display" panose="020B0004020202020204" pitchFamily="34" charset="0"/>
                   </a:endParaRPr>
                 </a:p>
               </p:txBody>
             </p:sp>
-            <p:pic>
-              <p:nvPicPr>
-                <p:cNvPr id="3" name="Picture 2">
-                  <a:extLst>
-                    <a:ext uri="{FF2B5EF4-FFF2-40B4-BE49-F238E27FC236}">
-                      <a16:creationId xmlns:a16="http://schemas.microsoft.com/office/drawing/2014/main" id="{73557525-E920-BB5F-A22D-5ED7E53CE9A2}"/>
-                    </a:ext>
-                  </a:extLst>
-                </p:cNvPr>
-                <p:cNvPicPr>
-                  <a:picLocks noChangeAspect="1"/>
-                </p:cNvPicPr>
-                <p:nvPr/>
-              </p:nvPicPr>
-              <p:blipFill>
-                <a:blip r:embed="rId3">
-                  <a:duotone>
-                    <a:prstClr val="black"/>
-                    <a:schemeClr val="accent2">
-                      <a:tint val="45000"/>
-                      <a:satMod val="400000"/>
-                    </a:schemeClr>
-                  </a:duotone>
-                </a:blip>
-                <a:srcRect l="17621" t="5658" r="16588" b="7880"/>
-                <a:stretch/>
-              </p:blipFill>
-              <p:spPr>
-                <a:xfrm>
-                  <a:off x="5034649" y="5101170"/>
-                  <a:ext cx="660047" cy="906207"/>
-                </a:xfrm>
-                <a:prstGeom prst="rect">
-                  <a:avLst/>
-                </a:prstGeom>
-              </p:spPr>
-            </p:pic>
-            <p:cxnSp>
-              <p:nvCxnSpPr>
-                <p:cNvPr id="27" name="Straight Connector 26">
-                  <a:extLst>
-                    <a:ext uri="{FF2B5EF4-FFF2-40B4-BE49-F238E27FC236}">
-                      <a16:creationId xmlns:a16="http://schemas.microsoft.com/office/drawing/2014/main" id="{AEDA58B1-85F6-0F04-30F1-4A1A5ABFC7A6}"/>
-                    </a:ext>
-                  </a:extLst>
-                </p:cNvPr>
-                <p:cNvCxnSpPr>
-                  <a:cxnSpLocks/>
-                </p:cNvCxnSpPr>
-                <p:nvPr/>
-              </p:nvCxnSpPr>
-              <p:spPr>
-                <a:xfrm>
-                  <a:off x="3873703" y="5147096"/>
-                  <a:ext cx="0" cy="842879"/>
-                </a:xfrm>
-                <a:prstGeom prst="line">
-                  <a:avLst/>
-                </a:prstGeom>
-                <a:ln w="19050">
-                  <a:solidFill>
-                    <a:schemeClr val="tx2">
-                      <a:lumMod val="60000"/>
-                      <a:lumOff val="40000"/>
-                    </a:schemeClr>
-                  </a:solidFill>
-                  <a:prstDash val="sysDash"/>
-                </a:ln>
-              </p:spPr>
-              <p:style>
-                <a:lnRef idx="2">
-                  <a:schemeClr val="accent1"/>
-                </a:lnRef>
-                <a:fillRef idx="0">
-                  <a:schemeClr val="accent1"/>
-                </a:fillRef>
-                <a:effectRef idx="1">
-                  <a:schemeClr val="accent1"/>
-                </a:effectRef>
-                <a:fontRef idx="minor">
-                  <a:schemeClr val="tx1"/>
-                </a:fontRef>
-              </p:style>
-            </p:cxnSp>
-            <p:cxnSp>
-              <p:nvCxnSpPr>
-                <p:cNvPr id="30" name="Straight Connector 29">
-                  <a:extLst>
-                    <a:ext uri="{FF2B5EF4-FFF2-40B4-BE49-F238E27FC236}">
-                      <a16:creationId xmlns:a16="http://schemas.microsoft.com/office/drawing/2014/main" id="{002BCB19-1097-FB68-62B7-0214745B7775}"/>
-                    </a:ext>
-                  </a:extLst>
-                </p:cNvPr>
-                <p:cNvCxnSpPr>
-                  <a:cxnSpLocks/>
-                </p:cNvCxnSpPr>
-                <p:nvPr/>
-              </p:nvCxnSpPr>
-              <p:spPr>
-                <a:xfrm>
-                  <a:off x="4701374" y="5147096"/>
-                  <a:ext cx="0" cy="842879"/>
-                </a:xfrm>
-                <a:prstGeom prst="line">
-                  <a:avLst/>
-                </a:prstGeom>
-                <a:ln w="19050">
-                  <a:solidFill>
-                    <a:schemeClr val="accent4">
-                      <a:lumMod val="60000"/>
-                      <a:lumOff val="40000"/>
-                    </a:schemeClr>
-                  </a:solidFill>
-                  <a:prstDash val="sysDash"/>
-                </a:ln>
-              </p:spPr>
-              <p:style>
-                <a:lnRef idx="2">
-                  <a:schemeClr val="accent1"/>
-                </a:lnRef>
-                <a:fillRef idx="0">
-                  <a:schemeClr val="accent1"/>
-                </a:fillRef>
-                <a:effectRef idx="1">
-                  <a:schemeClr val="accent1"/>
-                </a:effectRef>
-                <a:fontRef idx="minor">
-                  <a:schemeClr val="tx1"/>
-                </a:fontRef>
-              </p:style>
-            </p:cxnSp>
-            <p:cxnSp>
-              <p:nvCxnSpPr>
-                <p:cNvPr id="31" name="Straight Connector 30">
-                  <a:extLst>
-                    <a:ext uri="{FF2B5EF4-FFF2-40B4-BE49-F238E27FC236}">
-                      <a16:creationId xmlns:a16="http://schemas.microsoft.com/office/drawing/2014/main" id="{E1627D63-D5F2-14E3-F8F1-7BF8E6234D9F}"/>
-                    </a:ext>
-                  </a:extLst>
-                </p:cNvPr>
-                <p:cNvCxnSpPr>
-                  <a:cxnSpLocks/>
-                </p:cNvCxnSpPr>
-                <p:nvPr/>
-              </p:nvCxnSpPr>
-              <p:spPr>
-                <a:xfrm>
-                  <a:off x="5364848" y="5161224"/>
-                  <a:ext cx="0" cy="842879"/>
-                </a:xfrm>
-                <a:prstGeom prst="line">
-                  <a:avLst/>
-                </a:prstGeom>
-                <a:ln w="19050">
-                  <a:solidFill>
-                    <a:schemeClr val="accent2">
-                      <a:lumMod val="60000"/>
-                      <a:lumOff val="40000"/>
-                    </a:schemeClr>
-                  </a:solidFill>
-                  <a:prstDash val="sysDash"/>
-                </a:ln>
-              </p:spPr>
-              <p:style>
-                <a:lnRef idx="2">
-                  <a:schemeClr val="accent1"/>
-                </a:lnRef>
-                <a:fillRef idx="0">
-                  <a:schemeClr val="accent1"/>
-                </a:fillRef>
-                <a:effectRef idx="1">
-                  <a:schemeClr val="accent1"/>
-                </a:effectRef>
-                <a:fontRef idx="minor">
-                  <a:schemeClr val="tx1"/>
-                </a:fontRef>
-              </p:style>
-            </p:cxnSp>
           </p:grpSp>
         </p:grpSp>
+        <p:cxnSp>
+          <p:nvCxnSpPr>
+            <p:cNvPr id="45" name="Straight Arrow Connector 44">
+              <a:extLst>
+                <a:ext uri="{FF2B5EF4-FFF2-40B4-BE49-F238E27FC236}">
+                  <a16:creationId xmlns:a16="http://schemas.microsoft.com/office/drawing/2014/main" id="{8A7DCE8E-82FF-2B81-B3C4-5BBEE197D115}"/>
+                </a:ext>
+              </a:extLst>
+            </p:cNvPr>
+            <p:cNvCxnSpPr/>
+            <p:nvPr/>
+          </p:nvCxnSpPr>
+          <p:spPr>
+            <a:xfrm>
+              <a:off x="3901440" y="5080000"/>
+              <a:ext cx="1346569" cy="0"/>
+            </a:xfrm>
+            <a:prstGeom prst="straightConnector1">
+              <a:avLst/>
+            </a:prstGeom>
+            <a:ln w="76200">
+              <a:solidFill>
+                <a:srgbClr val="7030A0"/>
+              </a:solidFill>
+              <a:tailEnd type="triangle"/>
+            </a:ln>
+          </p:spPr>
+          <p:style>
+            <a:lnRef idx="2">
+              <a:schemeClr val="accent1"/>
+            </a:lnRef>
+            <a:fillRef idx="0">
+              <a:schemeClr val="accent1"/>
+            </a:fillRef>
+            <a:effectRef idx="1">
+              <a:schemeClr val="accent1"/>
+            </a:effectRef>
+            <a:fontRef idx="minor">
+              <a:schemeClr val="tx1"/>
+            </a:fontRef>
+          </p:style>
+        </p:cxnSp>
+        <p:sp>
+          <p:nvSpPr>
+            <p:cNvPr id="46" name="TextBox 45">
+              <a:extLst>
+                <a:ext uri="{FF2B5EF4-FFF2-40B4-BE49-F238E27FC236}">
+                  <a16:creationId xmlns:a16="http://schemas.microsoft.com/office/drawing/2014/main" id="{E6CBFAEC-A23A-8C04-DB8E-9ECEC9F4B44D}"/>
+                </a:ext>
+              </a:extLst>
+            </p:cNvPr>
+            <p:cNvSpPr txBox="1"/>
+            <p:nvPr/>
+          </p:nvSpPr>
+          <p:spPr>
+            <a:xfrm>
+              <a:off x="7724182" y="4289659"/>
+              <a:ext cx="1225490" cy="646331"/>
+            </a:xfrm>
+            <a:prstGeom prst="rect">
+              <a:avLst/>
+            </a:prstGeom>
+            <a:noFill/>
+          </p:spPr>
+          <p:txBody>
+            <a:bodyPr wrap="square" rtlCol="0">
+              <a:spAutoFit/>
+            </a:bodyPr>
+            <a:lstStyle/>
+            <a:p>
+              <a:pPr algn="ctr"/>
+              <a:r>
+                <a:rPr lang="en-US" sz="1200" dirty="0">
+                  <a:latin typeface="Aptos Display" panose="020B0004020202020204" pitchFamily="34" charset="0"/>
+                </a:rPr>
+                <a:t>Learned to hunt according to prey</a:t>
+              </a:r>
+            </a:p>
+          </p:txBody>
+        </p:sp>
+        <p:sp>
+          <p:nvSpPr>
+            <p:cNvPr id="55" name="TextBox 54">
+              <a:extLst>
+                <a:ext uri="{FF2B5EF4-FFF2-40B4-BE49-F238E27FC236}">
+                  <a16:creationId xmlns:a16="http://schemas.microsoft.com/office/drawing/2014/main" id="{62B11523-2B60-ED2F-A737-F64A03219E97}"/>
+                </a:ext>
+              </a:extLst>
+            </p:cNvPr>
+            <p:cNvSpPr txBox="1"/>
+            <p:nvPr/>
+          </p:nvSpPr>
+          <p:spPr>
+            <a:xfrm>
+              <a:off x="7747758" y="5289977"/>
+              <a:ext cx="1225490" cy="646331"/>
+            </a:xfrm>
+            <a:prstGeom prst="rect">
+              <a:avLst/>
+            </a:prstGeom>
+            <a:noFill/>
+          </p:spPr>
+          <p:txBody>
+            <a:bodyPr wrap="square" rtlCol="0">
+              <a:spAutoFit/>
+            </a:bodyPr>
+            <a:lstStyle/>
+            <a:p>
+              <a:pPr algn="ctr"/>
+              <a:r>
+                <a:rPr lang="en-US" sz="1200" dirty="0">
+                  <a:latin typeface="Aptos Display" panose="020B0004020202020204" pitchFamily="34" charset="0"/>
+                </a:rPr>
+                <a:t>Did not learn to hunt according to prey</a:t>
+              </a:r>
+            </a:p>
+          </p:txBody>
+        </p:sp>
       </p:grpSp>
     </p:spTree>
   </p:cSld>

</xml_diff>

<commit_message>
Windows --> update fig.1
</commit_message>
<xml_diff>
--- a/outputs/04_outputs_figures/figure1-raw.pptx
+++ b/outputs/04_outputs_figures/figure1-raw.pptx
@@ -3529,10 +3529,10 @@
       </p:grpSpPr>
       <p:grpSp>
         <p:nvGrpSpPr>
-          <p:cNvPr id="59" name="Group 58">
+          <p:cNvPr id="6" name="Group 5">
             <a:extLst>
               <a:ext uri="{FF2B5EF4-FFF2-40B4-BE49-F238E27FC236}">
-                <a16:creationId xmlns:a16="http://schemas.microsoft.com/office/drawing/2014/main" id="{49CF956D-1F29-85C4-5B60-2B2207331138}"/>
+                <a16:creationId xmlns:a16="http://schemas.microsoft.com/office/drawing/2014/main" id="{779C0222-9749-52EC-E0E1-7652CAD150AE}"/>
               </a:ext>
             </a:extLst>
           </p:cNvPr>
@@ -3547,994 +3547,952 @@
             <a:chExt cx="8869680" cy="6991949"/>
           </a:xfrm>
         </p:grpSpPr>
-        <p:grpSp>
-          <p:nvGrpSpPr>
-            <p:cNvPr id="34" name="Group 33">
+        <p:pic>
+          <p:nvPicPr>
+            <p:cNvPr id="11" name="Picture 10">
               <a:extLst>
                 <a:ext uri="{FF2B5EF4-FFF2-40B4-BE49-F238E27FC236}">
-                  <a16:creationId xmlns:a16="http://schemas.microsoft.com/office/drawing/2014/main" id="{22B80151-7076-1BDC-16A1-59A76E64E082}"/>
+                  <a16:creationId xmlns:a16="http://schemas.microsoft.com/office/drawing/2014/main" id="{8E418795-11AD-9440-5185-0E83D09D5595}"/>
                 </a:ext>
               </a:extLst>
             </p:cNvPr>
-            <p:cNvGrpSpPr/>
+            <p:cNvPicPr>
+              <a:picLocks noChangeAspect="1"/>
+            </p:cNvPicPr>
             <p:nvPr/>
-          </p:nvGrpSpPr>
-          <p:grpSpPr>
+          </p:nvPicPr>
+          <p:blipFill>
+            <a:blip r:embed="rId3"/>
+            <a:srcRect l="18791" t="5658" r="17758" b="7880"/>
+            <a:stretch/>
+          </p:blipFill>
+          <p:spPr>
+            <a:xfrm>
+              <a:off x="4653280" y="662893"/>
+              <a:ext cx="4409440" cy="1812416"/>
+            </a:xfrm>
+            <a:prstGeom prst="rect">
+              <a:avLst/>
+            </a:prstGeom>
+          </p:spPr>
+        </p:pic>
+        <p:pic>
+          <p:nvPicPr>
+            <p:cNvPr id="18" name="Picture 17">
+              <a:extLst>
+                <a:ext uri="{FF2B5EF4-FFF2-40B4-BE49-F238E27FC236}">
+                  <a16:creationId xmlns:a16="http://schemas.microsoft.com/office/drawing/2014/main" id="{EDF0C340-464C-587C-CB1A-5FBF6D6E683C}"/>
+                </a:ext>
+              </a:extLst>
+            </p:cNvPr>
+            <p:cNvPicPr>
+              <a:picLocks noChangeAspect="1"/>
+            </p:cNvPicPr>
+            <p:nvPr/>
+          </p:nvPicPr>
+          <p:blipFill>
+            <a:blip r:embed="rId3">
+              <a:duotone>
+                <a:prstClr val="black"/>
+                <a:schemeClr val="accent2">
+                  <a:tint val="45000"/>
+                  <a:satMod val="400000"/>
+                </a:schemeClr>
+              </a:duotone>
+            </a:blip>
+            <a:srcRect l="17621" t="5658" r="16588" b="7880"/>
+            <a:stretch/>
+          </p:blipFill>
+          <p:spPr>
+            <a:xfrm>
+              <a:off x="6350000" y="1535011"/>
+              <a:ext cx="2286000" cy="906207"/>
+            </a:xfrm>
+            <a:prstGeom prst="rect">
+              <a:avLst/>
+            </a:prstGeom>
+          </p:spPr>
+        </p:pic>
+        <p:sp>
+          <p:nvSpPr>
+            <p:cNvPr id="19" name="TextBox 18">
+              <a:extLst>
+                <a:ext uri="{FF2B5EF4-FFF2-40B4-BE49-F238E27FC236}">
+                  <a16:creationId xmlns:a16="http://schemas.microsoft.com/office/drawing/2014/main" id="{17439FFD-286E-89A1-5B48-58589713B64E}"/>
+                </a:ext>
+              </a:extLst>
+            </p:cNvPr>
+            <p:cNvSpPr txBox="1"/>
+            <p:nvPr/>
+          </p:nvSpPr>
+          <p:spPr>
             <a:xfrm>
               <a:off x="193040" y="-81280"/>
-              <a:ext cx="8869680" cy="3527389"/>
-              <a:chOff x="193040" y="264160"/>
-              <a:chExt cx="8869680" cy="3527389"/>
+              <a:ext cx="467360" cy="307777"/>
             </a:xfrm>
-          </p:grpSpPr>
-          <p:pic>
-            <p:nvPicPr>
-              <p:cNvPr id="11" name="Picture 10">
-                <a:extLst>
-                  <a:ext uri="{FF2B5EF4-FFF2-40B4-BE49-F238E27FC236}">
-                    <a16:creationId xmlns:a16="http://schemas.microsoft.com/office/drawing/2014/main" id="{8E418795-11AD-9440-5185-0E83D09D5595}"/>
-                  </a:ext>
-                </a:extLst>
-              </p:cNvPr>
-              <p:cNvPicPr>
-                <a:picLocks noChangeAspect="1"/>
-              </p:cNvPicPr>
-              <p:nvPr/>
-            </p:nvPicPr>
-            <p:blipFill>
-              <a:blip r:embed="rId3"/>
-              <a:srcRect l="18791" t="5658" r="17758" b="7880"/>
-              <a:stretch/>
-            </p:blipFill>
-            <p:spPr>
-              <a:xfrm>
-                <a:off x="4653280" y="1008333"/>
-                <a:ext cx="4409440" cy="1812416"/>
-              </a:xfrm>
-              <a:prstGeom prst="rect">
-                <a:avLst/>
-              </a:prstGeom>
-            </p:spPr>
-          </p:pic>
-          <p:sp>
-            <p:nvSpPr>
-              <p:cNvPr id="19" name="TextBox 18">
-                <a:extLst>
-                  <a:ext uri="{FF2B5EF4-FFF2-40B4-BE49-F238E27FC236}">
-                    <a16:creationId xmlns:a16="http://schemas.microsoft.com/office/drawing/2014/main" id="{17439FFD-286E-89A1-5B48-58589713B64E}"/>
-                  </a:ext>
-                </a:extLst>
-              </p:cNvPr>
-              <p:cNvSpPr txBox="1"/>
-              <p:nvPr/>
-            </p:nvSpPr>
-            <p:spPr>
-              <a:xfrm>
-                <a:off x="193040" y="264160"/>
-                <a:ext cx="467360" cy="307777"/>
-              </a:xfrm>
-              <a:prstGeom prst="rect">
-                <a:avLst/>
-              </a:prstGeom>
-              <a:noFill/>
-            </p:spPr>
-            <p:txBody>
-              <a:bodyPr wrap="square" rtlCol="0">
-                <a:spAutoFit/>
-              </a:bodyPr>
-              <a:lstStyle/>
-              <a:p>
-                <a:r>
-                  <a:rPr lang="en-US" sz="1400" b="1" dirty="0">
-                    <a:latin typeface="Aptos Display" panose="020B0004020202020204" pitchFamily="34" charset="0"/>
-                  </a:rPr>
-                  <a:t>A</a:t>
-                </a:r>
-                <a:endParaRPr lang="en-CA" sz="1400" b="1" dirty="0">
+            <a:prstGeom prst="rect">
+              <a:avLst/>
+            </a:prstGeom>
+            <a:noFill/>
+          </p:spPr>
+          <p:txBody>
+            <a:bodyPr wrap="square" rtlCol="0">
+              <a:spAutoFit/>
+            </a:bodyPr>
+            <a:lstStyle/>
+            <a:p>
+              <a:r>
+                <a:rPr lang="en-US" sz="1400" b="1" dirty="0">
                   <a:latin typeface="Aptos Display" panose="020B0004020202020204" pitchFamily="34" charset="0"/>
-                </a:endParaRPr>
-              </a:p>
-            </p:txBody>
-          </p:sp>
-          <p:sp>
-            <p:nvSpPr>
-              <p:cNvPr id="20" name="TextBox 19">
-                <a:extLst>
-                  <a:ext uri="{FF2B5EF4-FFF2-40B4-BE49-F238E27FC236}">
-                    <a16:creationId xmlns:a16="http://schemas.microsoft.com/office/drawing/2014/main" id="{6A8E238F-C766-55F9-5203-2A89085BD3D6}"/>
-                  </a:ext>
-                </a:extLst>
-              </p:cNvPr>
-              <p:cNvSpPr txBox="1"/>
-              <p:nvPr/>
-            </p:nvSpPr>
-            <p:spPr>
-              <a:xfrm>
-                <a:off x="4780649" y="264160"/>
-                <a:ext cx="467360" cy="307777"/>
-              </a:xfrm>
-              <a:prstGeom prst="rect">
-                <a:avLst/>
-              </a:prstGeom>
-              <a:noFill/>
-            </p:spPr>
-            <p:txBody>
-              <a:bodyPr wrap="square" rtlCol="0">
-                <a:spAutoFit/>
-              </a:bodyPr>
-              <a:lstStyle/>
-              <a:p>
-                <a:r>
-                  <a:rPr lang="en-US" sz="1400" b="1" dirty="0">
-                    <a:latin typeface="Aptos Display" panose="020B0004020202020204" pitchFamily="34" charset="0"/>
-                  </a:rPr>
-                  <a:t>B</a:t>
-                </a:r>
-                <a:endParaRPr lang="en-CA" sz="1400" b="1" dirty="0">
+                </a:rPr>
+                <a:t>A</a:t>
+              </a:r>
+              <a:endParaRPr lang="en-CA" sz="1400" b="1" dirty="0">
+                <a:latin typeface="Aptos Display" panose="020B0004020202020204" pitchFamily="34" charset="0"/>
+              </a:endParaRPr>
+            </a:p>
+          </p:txBody>
+        </p:sp>
+        <p:sp>
+          <p:nvSpPr>
+            <p:cNvPr id="20" name="TextBox 19">
+              <a:extLst>
+                <a:ext uri="{FF2B5EF4-FFF2-40B4-BE49-F238E27FC236}">
+                  <a16:creationId xmlns:a16="http://schemas.microsoft.com/office/drawing/2014/main" id="{6A8E238F-C766-55F9-5203-2A89085BD3D6}"/>
+                </a:ext>
+              </a:extLst>
+            </p:cNvPr>
+            <p:cNvSpPr txBox="1"/>
+            <p:nvPr/>
+          </p:nvSpPr>
+          <p:spPr>
+            <a:xfrm>
+              <a:off x="4780649" y="-81280"/>
+              <a:ext cx="467360" cy="307777"/>
+            </a:xfrm>
+            <a:prstGeom prst="rect">
+              <a:avLst/>
+            </a:prstGeom>
+            <a:noFill/>
+          </p:spPr>
+          <p:txBody>
+            <a:bodyPr wrap="square" rtlCol="0">
+              <a:spAutoFit/>
+            </a:bodyPr>
+            <a:lstStyle/>
+            <a:p>
+              <a:r>
+                <a:rPr lang="en-US" sz="1400" b="1" dirty="0">
                   <a:latin typeface="Aptos Display" panose="020B0004020202020204" pitchFamily="34" charset="0"/>
-                </a:endParaRPr>
-              </a:p>
-            </p:txBody>
-          </p:sp>
-          <p:grpSp>
-            <p:nvGrpSpPr>
-              <p:cNvPr id="26" name="Group 25">
-                <a:extLst>
-                  <a:ext uri="{FF2B5EF4-FFF2-40B4-BE49-F238E27FC236}">
-                    <a16:creationId xmlns:a16="http://schemas.microsoft.com/office/drawing/2014/main" id="{CDE7C73D-6260-7802-C850-CA45E90E93A8}"/>
-                  </a:ext>
-                </a:extLst>
-              </p:cNvPr>
-              <p:cNvGrpSpPr/>
-              <p:nvPr/>
-            </p:nvGrpSpPr>
-            <p:grpSpPr>
-              <a:xfrm>
-                <a:off x="877152" y="1008333"/>
-                <a:ext cx="2858335" cy="2781424"/>
-                <a:chOff x="877152" y="998173"/>
-                <a:chExt cx="2858335" cy="3738819"/>
-              </a:xfrm>
-            </p:grpSpPr>
-            <p:pic>
-              <p:nvPicPr>
-                <p:cNvPr id="9" name="Picture 8">
-                  <a:extLst>
-                    <a:ext uri="{FF2B5EF4-FFF2-40B4-BE49-F238E27FC236}">
-                      <a16:creationId xmlns:a16="http://schemas.microsoft.com/office/drawing/2014/main" id="{5D812663-9AE9-F98F-7B7E-820530A55A10}"/>
-                    </a:ext>
-                  </a:extLst>
-                </p:cNvPr>
-                <p:cNvPicPr>
-                  <a:picLocks noChangeAspect="1"/>
-                </p:cNvPicPr>
-                <p:nvPr/>
-              </p:nvPicPr>
-              <p:blipFill>
-                <a:blip r:embed="rId3"/>
-                <a:srcRect l="17412" t="5658" r="16163" b="7880"/>
-                <a:stretch/>
-              </p:blipFill>
-              <p:spPr>
-                <a:xfrm>
-                  <a:off x="1270000" y="998173"/>
-                  <a:ext cx="2052320" cy="2430828"/>
-                </a:xfrm>
-                <a:prstGeom prst="rect">
-                  <a:avLst/>
-                </a:prstGeom>
-              </p:spPr>
-            </p:pic>
-            <p:pic>
-              <p:nvPicPr>
-                <p:cNvPr id="12" name="Picture 11">
-                  <a:extLst>
-                    <a:ext uri="{FF2B5EF4-FFF2-40B4-BE49-F238E27FC236}">
-                      <a16:creationId xmlns:a16="http://schemas.microsoft.com/office/drawing/2014/main" id="{4F417F86-7720-29F4-E072-DCDB0E0E8CA9}"/>
-                    </a:ext>
-                  </a:extLst>
-                </p:cNvPr>
-                <p:cNvPicPr>
-                  <a:picLocks noChangeAspect="1"/>
-                </p:cNvPicPr>
-                <p:nvPr/>
-              </p:nvPicPr>
-              <p:blipFill>
-                <a:blip r:embed="rId3">
-                  <a:duotone>
-                    <a:prstClr val="black"/>
-                    <a:schemeClr val="accent1">
-                      <a:tint val="45000"/>
-                      <a:satMod val="400000"/>
-                    </a:schemeClr>
-                  </a:duotone>
-                </a:blip>
-                <a:srcRect l="17412" t="5658" r="16163" b="7880"/>
-                <a:stretch/>
-              </p:blipFill>
-              <p:spPr>
-                <a:xfrm>
-                  <a:off x="1524000" y="2311400"/>
-                  <a:ext cx="904977" cy="1071881"/>
-                </a:xfrm>
-                <a:prstGeom prst="rect">
-                  <a:avLst/>
-                </a:prstGeom>
-              </p:spPr>
-            </p:pic>
-            <p:pic>
-              <p:nvPicPr>
-                <p:cNvPr id="13" name="Picture 12">
-                  <a:extLst>
-                    <a:ext uri="{FF2B5EF4-FFF2-40B4-BE49-F238E27FC236}">
-                      <a16:creationId xmlns:a16="http://schemas.microsoft.com/office/drawing/2014/main" id="{D86D258D-2422-188A-AA04-AC0A06C2ACA5}"/>
-                    </a:ext>
-                  </a:extLst>
-                </p:cNvPr>
-                <p:cNvPicPr>
-                  <a:picLocks noChangeAspect="1"/>
-                </p:cNvPicPr>
-                <p:nvPr/>
-              </p:nvPicPr>
-              <p:blipFill>
-                <a:blip r:embed="rId3">
-                  <a:duotone>
-                    <a:prstClr val="black"/>
-                    <a:schemeClr val="accent4">
-                      <a:tint val="45000"/>
-                      <a:satMod val="400000"/>
-                    </a:schemeClr>
-                  </a:duotone>
-                </a:blip>
-                <a:srcRect l="17412" t="5658" r="16163" b="7880"/>
-                <a:stretch/>
-              </p:blipFill>
-              <p:spPr>
-                <a:xfrm>
-                  <a:off x="1823351" y="2311399"/>
-                  <a:ext cx="904977" cy="1071881"/>
-                </a:xfrm>
-                <a:prstGeom prst="rect">
-                  <a:avLst/>
-                </a:prstGeom>
-              </p:spPr>
-            </p:pic>
-            <p:pic>
-              <p:nvPicPr>
-                <p:cNvPr id="14" name="Picture 13">
-                  <a:extLst>
-                    <a:ext uri="{FF2B5EF4-FFF2-40B4-BE49-F238E27FC236}">
-                      <a16:creationId xmlns:a16="http://schemas.microsoft.com/office/drawing/2014/main" id="{D4493013-26A4-B90F-A000-D57C6A702CBF}"/>
-                    </a:ext>
-                  </a:extLst>
-                </p:cNvPr>
-                <p:cNvPicPr>
-                  <a:picLocks noChangeAspect="1"/>
-                </p:cNvPicPr>
-                <p:nvPr/>
-              </p:nvPicPr>
-              <p:blipFill>
-                <a:blip r:embed="rId3">
-                  <a:duotone>
-                    <a:prstClr val="black"/>
-                    <a:schemeClr val="accent2">
-                      <a:tint val="45000"/>
-                      <a:satMod val="400000"/>
-                    </a:schemeClr>
-                  </a:duotone>
-                </a:blip>
-                <a:srcRect l="17412" t="5658" r="16163" b="7880"/>
-                <a:stretch/>
-              </p:blipFill>
-              <p:spPr>
-                <a:xfrm>
-                  <a:off x="2139930" y="2311400"/>
-                  <a:ext cx="904977" cy="1071881"/>
-                </a:xfrm>
-                <a:prstGeom prst="rect">
-                  <a:avLst/>
-                </a:prstGeom>
-              </p:spPr>
-            </p:pic>
-            <p:sp>
-              <p:nvSpPr>
-                <p:cNvPr id="21" name="Right Brace 20">
-                  <a:extLst>
-                    <a:ext uri="{FF2B5EF4-FFF2-40B4-BE49-F238E27FC236}">
-                      <a16:creationId xmlns:a16="http://schemas.microsoft.com/office/drawing/2014/main" id="{10694201-DA9C-3721-BF39-2EE6A31CF584}"/>
-                    </a:ext>
-                  </a:extLst>
-                </p:cNvPr>
-                <p:cNvSpPr/>
-                <p:nvPr/>
-              </p:nvSpPr>
-              <p:spPr>
-                <a:xfrm rot="5400000">
-                  <a:off x="2142489" y="2621279"/>
-                  <a:ext cx="307341" cy="2052320"/>
-                </a:xfrm>
-                <a:prstGeom prst="rightBrace">
-                  <a:avLst>
-                    <a:gd name="adj1" fmla="val 0"/>
-                    <a:gd name="adj2" fmla="val 50000"/>
-                  </a:avLst>
-                </a:prstGeom>
-                <a:ln>
-                  <a:solidFill>
-                    <a:srgbClr val="7030A0"/>
-                  </a:solidFill>
-                </a:ln>
-              </p:spPr>
-              <p:style>
-                <a:lnRef idx="2">
-                  <a:schemeClr val="accent1"/>
-                </a:lnRef>
-                <a:fillRef idx="0">
-                  <a:schemeClr val="accent1"/>
-                </a:fillRef>
-                <a:effectRef idx="1">
-                  <a:schemeClr val="accent1"/>
-                </a:effectRef>
-                <a:fontRef idx="minor">
-                  <a:schemeClr val="tx1"/>
-                </a:fontRef>
-              </p:style>
-              <p:txBody>
-                <a:bodyPr rtlCol="0" anchor="ctr"/>
-                <a:lstStyle/>
-                <a:p>
-                  <a:pPr algn="ctr"/>
-                  <a:endParaRPr lang="en-CA" dirty="0"/>
-                </a:p>
-              </p:txBody>
-            </p:sp>
-            <p:sp>
-              <p:nvSpPr>
-                <p:cNvPr id="23" name="TextBox 22">
-                  <a:extLst>
-                    <a:ext uri="{FF2B5EF4-FFF2-40B4-BE49-F238E27FC236}">
-                      <a16:creationId xmlns:a16="http://schemas.microsoft.com/office/drawing/2014/main" id="{8EACD0A7-48EA-D19C-08D6-1A10035B5A06}"/>
-                    </a:ext>
-                  </a:extLst>
-                </p:cNvPr>
-                <p:cNvSpPr txBox="1"/>
-                <p:nvPr/>
-              </p:nvSpPr>
-              <p:spPr>
-                <a:xfrm>
-                  <a:off x="877152" y="3868187"/>
-                  <a:ext cx="2858335" cy="868805"/>
-                </a:xfrm>
-                <a:prstGeom prst="rect">
-                  <a:avLst/>
-                </a:prstGeom>
-                <a:noFill/>
-              </p:spPr>
-              <p:txBody>
-                <a:bodyPr wrap="square" rtlCol="0">
-                  <a:spAutoFit/>
-                </a:bodyPr>
-                <a:lstStyle/>
-                <a:p>
-                  <a:pPr algn="ctr"/>
-                  <a:r>
-                    <a:rPr lang="en-US" sz="1200" dirty="0">
-                      <a:latin typeface="Aptos Display" panose="020B0004020202020204" pitchFamily="34" charset="0"/>
-                    </a:rPr>
-                    <a:t>Narrow population variance</a:t>
-                  </a:r>
-                </a:p>
-                <a:p>
-                  <a:pPr algn="ctr"/>
-                  <a:r>
-                    <a:rPr lang="en-US" sz="1200" dirty="0">
-                      <a:latin typeface="Aptos Display" panose="020B0004020202020204" pitchFamily="34" charset="0"/>
-                    </a:rPr>
-                    <a:t>Different means (tactics)</a:t>
-                  </a:r>
-                </a:p>
-                <a:p>
-                  <a:pPr algn="ctr"/>
-                  <a:r>
-                    <a:rPr lang="en-US" sz="1200" dirty="0">
-                      <a:latin typeface="Aptos Display" panose="020B0004020202020204" pitchFamily="34" charset="0"/>
-                    </a:rPr>
-                    <a:t>Similar IIV (specialisation)</a:t>
-                  </a:r>
-                  <a:endParaRPr lang="en-CA" sz="1200" dirty="0">
-                    <a:latin typeface="Aptos Display" panose="020B0004020202020204" pitchFamily="34" charset="0"/>
-                  </a:endParaRPr>
-                </a:p>
-              </p:txBody>
-            </p:sp>
-          </p:grpSp>
-          <p:pic>
-            <p:nvPicPr>
-              <p:cNvPr id="15" name="Picture 14">
-                <a:extLst>
-                  <a:ext uri="{FF2B5EF4-FFF2-40B4-BE49-F238E27FC236}">
-                    <a16:creationId xmlns:a16="http://schemas.microsoft.com/office/drawing/2014/main" id="{57DBB4A8-5F5C-5C09-42C0-8F718B052C94}"/>
-                  </a:ext>
-                </a:extLst>
-              </p:cNvPr>
-              <p:cNvPicPr>
-                <a:picLocks noChangeAspect="1"/>
-              </p:cNvPicPr>
-              <p:nvPr/>
-            </p:nvPicPr>
-            <p:blipFill>
-              <a:blip r:embed="rId3">
-                <a:duotone>
-                  <a:prstClr val="black"/>
-                  <a:schemeClr val="accent1">
-                    <a:tint val="45000"/>
-                    <a:satMod val="400000"/>
-                  </a:schemeClr>
-                </a:duotone>
-              </a:blip>
-              <a:srcRect l="17621" t="5658" r="16588" b="7880"/>
-              <a:stretch/>
-            </p:blipFill>
-            <p:spPr>
-              <a:xfrm>
-                <a:off x="5034649" y="1880451"/>
-                <a:ext cx="2286000" cy="906207"/>
-              </a:xfrm>
-              <a:prstGeom prst="rect">
-                <a:avLst/>
-              </a:prstGeom>
-            </p:spPr>
-          </p:pic>
-          <p:pic>
-            <p:nvPicPr>
-              <p:cNvPr id="17" name="Picture 16">
-                <a:extLst>
-                  <a:ext uri="{FF2B5EF4-FFF2-40B4-BE49-F238E27FC236}">
-                    <a16:creationId xmlns:a16="http://schemas.microsoft.com/office/drawing/2014/main" id="{80412A94-F395-646F-7D1C-E82470B5A69F}"/>
-                  </a:ext>
-                </a:extLst>
-              </p:cNvPr>
-              <p:cNvPicPr>
-                <a:picLocks noChangeAspect="1"/>
-              </p:cNvPicPr>
-              <p:nvPr/>
-            </p:nvPicPr>
-            <p:blipFill>
-              <a:blip r:embed="rId3">
-                <a:duotone>
-                  <a:prstClr val="black"/>
-                  <a:schemeClr val="accent4">
-                    <a:tint val="45000"/>
-                    <a:satMod val="400000"/>
-                  </a:schemeClr>
-                </a:duotone>
-              </a:blip>
-              <a:srcRect l="17621" t="5658" r="16588" b="7880"/>
-              <a:stretch/>
-            </p:blipFill>
-            <p:spPr>
-              <a:xfrm>
-                <a:off x="5689600" y="1880451"/>
-                <a:ext cx="2286000" cy="906207"/>
-              </a:xfrm>
-              <a:prstGeom prst="rect">
-                <a:avLst/>
-              </a:prstGeom>
-            </p:spPr>
-          </p:pic>
-          <p:pic>
-            <p:nvPicPr>
-              <p:cNvPr id="18" name="Picture 17">
-                <a:extLst>
-                  <a:ext uri="{FF2B5EF4-FFF2-40B4-BE49-F238E27FC236}">
-                    <a16:creationId xmlns:a16="http://schemas.microsoft.com/office/drawing/2014/main" id="{EDF0C340-464C-587C-CB1A-5FBF6D6E683C}"/>
-                  </a:ext>
-                </a:extLst>
-              </p:cNvPr>
-              <p:cNvPicPr>
-                <a:picLocks noChangeAspect="1"/>
-              </p:cNvPicPr>
-              <p:nvPr/>
-            </p:nvPicPr>
-            <p:blipFill>
-              <a:blip r:embed="rId3">
-                <a:duotone>
-                  <a:prstClr val="black"/>
-                  <a:schemeClr val="accent2">
-                    <a:tint val="45000"/>
-                    <a:satMod val="400000"/>
-                  </a:schemeClr>
-                </a:duotone>
-              </a:blip>
-              <a:srcRect l="17621" t="5658" r="16588" b="7880"/>
-              <a:stretch/>
-            </p:blipFill>
-            <p:spPr>
-              <a:xfrm>
-                <a:off x="6350000" y="1880451"/>
-                <a:ext cx="2286000" cy="906207"/>
-              </a:xfrm>
-              <a:prstGeom prst="rect">
-                <a:avLst/>
-              </a:prstGeom>
-            </p:spPr>
-          </p:pic>
-          <p:sp>
-            <p:nvSpPr>
-              <p:cNvPr id="22" name="Right Brace 21">
-                <a:extLst>
-                  <a:ext uri="{FF2B5EF4-FFF2-40B4-BE49-F238E27FC236}">
-                    <a16:creationId xmlns:a16="http://schemas.microsoft.com/office/drawing/2014/main" id="{30D4FAC7-0193-1710-772D-69805F210EC1}"/>
-                  </a:ext>
-                </a:extLst>
-              </p:cNvPr>
-              <p:cNvSpPr/>
-              <p:nvPr/>
-            </p:nvSpPr>
-            <p:spPr>
-              <a:xfrm rot="5400000">
-                <a:off x="6718024" y="979328"/>
-                <a:ext cx="229152" cy="3999391"/>
-              </a:xfrm>
-              <a:prstGeom prst="rightBrace">
-                <a:avLst>
-                  <a:gd name="adj1" fmla="val 0"/>
-                  <a:gd name="adj2" fmla="val 50000"/>
-                </a:avLst>
-              </a:prstGeom>
-              <a:ln>
-                <a:solidFill>
-                  <a:srgbClr val="7030A0"/>
-                </a:solidFill>
-              </a:ln>
-            </p:spPr>
-            <p:style>
-              <a:lnRef idx="2">
-                <a:schemeClr val="accent1"/>
-              </a:lnRef>
-              <a:fillRef idx="0">
-                <a:schemeClr val="accent1"/>
-              </a:fillRef>
-              <a:effectRef idx="1">
-                <a:schemeClr val="accent1"/>
-              </a:effectRef>
-              <a:fontRef idx="minor">
-                <a:schemeClr val="tx1"/>
-              </a:fontRef>
-            </p:style>
-            <p:txBody>
-              <a:bodyPr rtlCol="0" anchor="ctr"/>
-              <a:lstStyle/>
-              <a:p>
-                <a:pPr algn="ctr"/>
-                <a:endParaRPr lang="en-CA"/>
-              </a:p>
-            </p:txBody>
-          </p:sp>
-          <p:sp>
-            <p:nvSpPr>
-              <p:cNvPr id="24" name="TextBox 23">
-                <a:extLst>
-                  <a:ext uri="{FF2B5EF4-FFF2-40B4-BE49-F238E27FC236}">
-                    <a16:creationId xmlns:a16="http://schemas.microsoft.com/office/drawing/2014/main" id="{02B2033F-9B60-C0C6-0DCB-2FDE000EFD21}"/>
-                  </a:ext>
-                </a:extLst>
-              </p:cNvPr>
-              <p:cNvSpPr txBox="1"/>
-              <p:nvPr/>
-            </p:nvSpPr>
-            <p:spPr>
-              <a:xfrm>
-                <a:off x="5418672" y="3145218"/>
-                <a:ext cx="2858335" cy="646331"/>
-              </a:xfrm>
-              <a:prstGeom prst="rect">
-                <a:avLst/>
-              </a:prstGeom>
-              <a:noFill/>
-            </p:spPr>
-            <p:txBody>
-              <a:bodyPr wrap="square" rtlCol="0">
-                <a:spAutoFit/>
-              </a:bodyPr>
-              <a:lstStyle/>
-              <a:p>
-                <a:pPr algn="ctr"/>
-                <a:r>
-                  <a:rPr lang="en-US" sz="1200" dirty="0">
-                    <a:latin typeface="Aptos Display" panose="020B0004020202020204" pitchFamily="34" charset="0"/>
-                  </a:rPr>
-                  <a:t>Wide population variance</a:t>
-                </a:r>
-              </a:p>
-              <a:p>
-                <a:pPr algn="ctr"/>
-                <a:r>
-                  <a:rPr lang="en-US" sz="1200" dirty="0">
-                    <a:latin typeface="Aptos Display" panose="020B0004020202020204" pitchFamily="34" charset="0"/>
-                  </a:rPr>
-                  <a:t>Different means (tactics)</a:t>
-                </a:r>
-              </a:p>
-              <a:p>
-                <a:pPr algn="ctr"/>
-                <a:r>
-                  <a:rPr lang="en-US" sz="1200" dirty="0">
-                    <a:latin typeface="Aptos Display" panose="020B0004020202020204" pitchFamily="34" charset="0"/>
-                  </a:rPr>
-                  <a:t>Similar IIV (specialisation)</a:t>
-                </a:r>
-                <a:endParaRPr lang="en-CA" sz="1200" dirty="0">
+                </a:rPr>
+                <a:t>B</a:t>
+              </a:r>
+              <a:endParaRPr lang="en-CA" sz="1400" b="1" dirty="0">
+                <a:latin typeface="Aptos Display" panose="020B0004020202020204" pitchFamily="34" charset="0"/>
+              </a:endParaRPr>
+            </a:p>
+          </p:txBody>
+        </p:sp>
+        <p:pic>
+          <p:nvPicPr>
+            <p:cNvPr id="9" name="Picture 8">
+              <a:extLst>
+                <a:ext uri="{FF2B5EF4-FFF2-40B4-BE49-F238E27FC236}">
+                  <a16:creationId xmlns:a16="http://schemas.microsoft.com/office/drawing/2014/main" id="{5D812663-9AE9-F98F-7B7E-820530A55A10}"/>
+                </a:ext>
+              </a:extLst>
+            </p:cNvPr>
+            <p:cNvPicPr>
+              <a:picLocks noChangeAspect="1"/>
+            </p:cNvPicPr>
+            <p:nvPr/>
+          </p:nvPicPr>
+          <p:blipFill>
+            <a:blip r:embed="rId3"/>
+            <a:srcRect l="17412" t="5658" r="16163" b="7880"/>
+            <a:stretch/>
+          </p:blipFill>
+          <p:spPr>
+            <a:xfrm>
+              <a:off x="1270000" y="662893"/>
+              <a:ext cx="2052320" cy="1808369"/>
+            </a:xfrm>
+            <a:prstGeom prst="rect">
+              <a:avLst/>
+            </a:prstGeom>
+          </p:spPr>
+        </p:pic>
+        <p:pic>
+          <p:nvPicPr>
+            <p:cNvPr id="12" name="Picture 11">
+              <a:extLst>
+                <a:ext uri="{FF2B5EF4-FFF2-40B4-BE49-F238E27FC236}">
+                  <a16:creationId xmlns:a16="http://schemas.microsoft.com/office/drawing/2014/main" id="{4F417F86-7720-29F4-E072-DCDB0E0E8CA9}"/>
+                </a:ext>
+              </a:extLst>
+            </p:cNvPr>
+            <p:cNvPicPr>
+              <a:picLocks noChangeAspect="1"/>
+            </p:cNvPicPr>
+            <p:nvPr/>
+          </p:nvPicPr>
+          <p:blipFill>
+            <a:blip r:embed="rId3">
+              <a:duotone>
+                <a:prstClr val="black"/>
+                <a:schemeClr val="accent1">
+                  <a:tint val="45000"/>
+                  <a:satMod val="400000"/>
+                </a:schemeClr>
+              </a:duotone>
+            </a:blip>
+            <a:srcRect l="17412" t="5658" r="16163" b="7880"/>
+            <a:stretch/>
+          </p:blipFill>
+          <p:spPr>
+            <a:xfrm>
+              <a:off x="1838960" y="1639844"/>
+              <a:ext cx="904977" cy="797406"/>
+            </a:xfrm>
+            <a:prstGeom prst="rect">
+              <a:avLst/>
+            </a:prstGeom>
+          </p:spPr>
+        </p:pic>
+        <p:pic>
+          <p:nvPicPr>
+            <p:cNvPr id="13" name="Picture 12">
+              <a:extLst>
+                <a:ext uri="{FF2B5EF4-FFF2-40B4-BE49-F238E27FC236}">
+                  <a16:creationId xmlns:a16="http://schemas.microsoft.com/office/drawing/2014/main" id="{D86D258D-2422-188A-AA04-AC0A06C2ACA5}"/>
+                </a:ext>
+              </a:extLst>
+            </p:cNvPr>
+            <p:cNvPicPr>
+              <a:picLocks noChangeAspect="1"/>
+            </p:cNvPicPr>
+            <p:nvPr/>
+          </p:nvPicPr>
+          <p:blipFill>
+            <a:blip r:embed="rId3">
+              <a:duotone>
+                <a:prstClr val="black"/>
+                <a:schemeClr val="accent4">
+                  <a:tint val="45000"/>
+                  <a:satMod val="400000"/>
+                </a:schemeClr>
+              </a:duotone>
+            </a:blip>
+            <a:srcRect l="17412" t="5658" r="16163" b="7880"/>
+            <a:stretch/>
+          </p:blipFill>
+          <p:spPr>
+            <a:xfrm>
+              <a:off x="1528711" y="1639843"/>
+              <a:ext cx="904977" cy="797406"/>
+            </a:xfrm>
+            <a:prstGeom prst="rect">
+              <a:avLst/>
+            </a:prstGeom>
+          </p:spPr>
+        </p:pic>
+        <p:pic>
+          <p:nvPicPr>
+            <p:cNvPr id="14" name="Picture 13">
+              <a:extLst>
+                <a:ext uri="{FF2B5EF4-FFF2-40B4-BE49-F238E27FC236}">
+                  <a16:creationId xmlns:a16="http://schemas.microsoft.com/office/drawing/2014/main" id="{D4493013-26A4-B90F-A000-D57C6A702CBF}"/>
+                </a:ext>
+              </a:extLst>
+            </p:cNvPr>
+            <p:cNvPicPr>
+              <a:picLocks noChangeAspect="1"/>
+            </p:cNvPicPr>
+            <p:nvPr/>
+          </p:nvPicPr>
+          <p:blipFill>
+            <a:blip r:embed="rId3">
+              <a:duotone>
+                <a:prstClr val="black"/>
+                <a:schemeClr val="accent2">
+                  <a:tint val="45000"/>
+                  <a:satMod val="400000"/>
+                </a:schemeClr>
+              </a:duotone>
+            </a:blip>
+            <a:srcRect l="17412" t="5658" r="16163" b="7880"/>
+            <a:stretch/>
+          </p:blipFill>
+          <p:spPr>
+            <a:xfrm>
+              <a:off x="2139930" y="1639844"/>
+              <a:ext cx="904977" cy="797406"/>
+            </a:xfrm>
+            <a:prstGeom prst="rect">
+              <a:avLst/>
+            </a:prstGeom>
+          </p:spPr>
+        </p:pic>
+        <p:sp>
+          <p:nvSpPr>
+            <p:cNvPr id="21" name="Right Brace 20">
+              <a:extLst>
+                <a:ext uri="{FF2B5EF4-FFF2-40B4-BE49-F238E27FC236}">
+                  <a16:creationId xmlns:a16="http://schemas.microsoft.com/office/drawing/2014/main" id="{10694201-DA9C-3721-BF39-2EE6A31CF584}"/>
+                </a:ext>
+              </a:extLst>
+            </p:cNvPr>
+            <p:cNvSpPr/>
+            <p:nvPr/>
+          </p:nvSpPr>
+          <p:spPr>
+            <a:xfrm rot="5400000">
+              <a:off x="2181839" y="1607605"/>
+              <a:ext cx="228641" cy="2052320"/>
+            </a:xfrm>
+            <a:prstGeom prst="rightBrace">
+              <a:avLst>
+                <a:gd name="adj1" fmla="val 0"/>
+                <a:gd name="adj2" fmla="val 50000"/>
+              </a:avLst>
+            </a:prstGeom>
+            <a:ln>
+              <a:solidFill>
+                <a:srgbClr val="7030A0"/>
+              </a:solidFill>
+            </a:ln>
+          </p:spPr>
+          <p:style>
+            <a:lnRef idx="2">
+              <a:schemeClr val="accent1"/>
+            </a:lnRef>
+            <a:fillRef idx="0">
+              <a:schemeClr val="accent1"/>
+            </a:fillRef>
+            <a:effectRef idx="1">
+              <a:schemeClr val="accent1"/>
+            </a:effectRef>
+            <a:fontRef idx="minor">
+              <a:schemeClr val="tx1"/>
+            </a:fontRef>
+          </p:style>
+          <p:txBody>
+            <a:bodyPr rtlCol="0" anchor="ctr"/>
+            <a:lstStyle/>
+            <a:p>
+              <a:pPr algn="ctr"/>
+              <a:endParaRPr lang="en-CA" dirty="0"/>
+            </a:p>
+          </p:txBody>
+        </p:sp>
+        <p:sp>
+          <p:nvSpPr>
+            <p:cNvPr id="23" name="TextBox 22">
+              <a:extLst>
+                <a:ext uri="{FF2B5EF4-FFF2-40B4-BE49-F238E27FC236}">
+                  <a16:creationId xmlns:a16="http://schemas.microsoft.com/office/drawing/2014/main" id="{8EACD0A7-48EA-D19C-08D6-1A10035B5A06}"/>
+                </a:ext>
+              </a:extLst>
+            </p:cNvPr>
+            <p:cNvSpPr txBox="1"/>
+            <p:nvPr/>
+          </p:nvSpPr>
+          <p:spPr>
+            <a:xfrm>
+              <a:off x="877152" y="2797986"/>
+              <a:ext cx="2858335" cy="646331"/>
+            </a:xfrm>
+            <a:prstGeom prst="rect">
+              <a:avLst/>
+            </a:prstGeom>
+            <a:noFill/>
+          </p:spPr>
+          <p:txBody>
+            <a:bodyPr wrap="square" rtlCol="0">
+              <a:spAutoFit/>
+            </a:bodyPr>
+            <a:lstStyle/>
+            <a:p>
+              <a:pPr algn="ctr"/>
+              <a:r>
+                <a:rPr lang="en-US" sz="1200" dirty="0">
                   <a:latin typeface="Aptos Display" panose="020B0004020202020204" pitchFamily="34" charset="0"/>
-                </a:endParaRPr>
-              </a:p>
-            </p:txBody>
-          </p:sp>
-          <p:sp>
-            <p:nvSpPr>
-              <p:cNvPr id="28" name="TextBox 27">
-                <a:extLst>
-                  <a:ext uri="{FF2B5EF4-FFF2-40B4-BE49-F238E27FC236}">
-                    <a16:creationId xmlns:a16="http://schemas.microsoft.com/office/drawing/2014/main" id="{2E8CF036-F568-BF99-F996-37B9CCFE3B0E}"/>
-                  </a:ext>
-                </a:extLst>
-              </p:cNvPr>
-              <p:cNvSpPr txBox="1"/>
-              <p:nvPr/>
-            </p:nvSpPr>
-            <p:spPr>
-              <a:xfrm>
-                <a:off x="374354" y="601395"/>
-                <a:ext cx="3804445" cy="307777"/>
-              </a:xfrm>
-              <a:prstGeom prst="rect">
-                <a:avLst/>
-              </a:prstGeom>
-              <a:noFill/>
-            </p:spPr>
-            <p:txBody>
-              <a:bodyPr wrap="square" rtlCol="0">
-                <a:spAutoFit/>
-              </a:bodyPr>
-              <a:lstStyle/>
-              <a:p>
-                <a:pPr algn="ctr"/>
-                <a:r>
-                  <a:rPr lang="en-US" sz="1400" b="1" dirty="0">
-                    <a:latin typeface="Aptos Display" panose="020B0004020202020204" pitchFamily="34" charset="0"/>
-                  </a:rPr>
-                  <a:t>All predators encounter similar prey</a:t>
-                </a:r>
-                <a:endParaRPr lang="en-CA" sz="1400" b="1" dirty="0">
+                </a:rPr>
+                <a:t>Narrow population variance</a:t>
+              </a:r>
+            </a:p>
+            <a:p>
+              <a:pPr algn="ctr"/>
+              <a:r>
+                <a:rPr lang="en-US" sz="1200" dirty="0">
                   <a:latin typeface="Aptos Display" panose="020B0004020202020204" pitchFamily="34" charset="0"/>
-                </a:endParaRPr>
-              </a:p>
-            </p:txBody>
-          </p:sp>
-          <p:sp>
-            <p:nvSpPr>
-              <p:cNvPr id="29" name="TextBox 28">
-                <a:extLst>
-                  <a:ext uri="{FF2B5EF4-FFF2-40B4-BE49-F238E27FC236}">
-                    <a16:creationId xmlns:a16="http://schemas.microsoft.com/office/drawing/2014/main" id="{BBE0C67D-1769-FBD9-608C-27E9F129AD6A}"/>
-                  </a:ext>
-                </a:extLst>
-              </p:cNvPr>
-              <p:cNvSpPr txBox="1"/>
-              <p:nvPr/>
-            </p:nvSpPr>
-            <p:spPr>
-              <a:xfrm>
-                <a:off x="4930377" y="602642"/>
-                <a:ext cx="3804445" cy="307777"/>
-              </a:xfrm>
-              <a:prstGeom prst="rect">
-                <a:avLst/>
-              </a:prstGeom>
-              <a:noFill/>
-            </p:spPr>
-            <p:txBody>
-              <a:bodyPr wrap="square" rtlCol="0">
-                <a:spAutoFit/>
-              </a:bodyPr>
-              <a:lstStyle/>
-              <a:p>
-                <a:pPr algn="ctr"/>
-                <a:r>
-                  <a:rPr lang="en-US" sz="1400" b="1" dirty="0">
-                    <a:latin typeface="Aptos Display" panose="020B0004020202020204" pitchFamily="34" charset="0"/>
-                  </a:rPr>
-                  <a:t>All predators encounter diverse prey</a:t>
-                </a:r>
-                <a:endParaRPr lang="en-CA" sz="1400" b="1" dirty="0">
+                </a:rPr>
+                <a:t>Different means (tactics)</a:t>
+              </a:r>
+            </a:p>
+            <a:p>
+              <a:pPr algn="ctr"/>
+              <a:r>
+                <a:rPr lang="en-US" sz="1200" dirty="0">
                   <a:latin typeface="Aptos Display" panose="020B0004020202020204" pitchFamily="34" charset="0"/>
-                </a:endParaRPr>
-              </a:p>
-            </p:txBody>
-          </p:sp>
-          <p:cxnSp>
-            <p:nvCxnSpPr>
-              <p:cNvPr id="5" name="Straight Connector 4">
-                <a:extLst>
-                  <a:ext uri="{FF2B5EF4-FFF2-40B4-BE49-F238E27FC236}">
-                    <a16:creationId xmlns:a16="http://schemas.microsoft.com/office/drawing/2014/main" id="{D51DCA8D-6C1D-BE8B-CBF3-45F83305C1FC}"/>
-                  </a:ext>
-                </a:extLst>
-              </p:cNvPr>
-              <p:cNvCxnSpPr>
-                <a:cxnSpLocks/>
-              </p:cNvCxnSpPr>
-              <p:nvPr/>
-            </p:nvCxnSpPr>
-            <p:spPr>
-              <a:xfrm>
-                <a:off x="1966328" y="2006276"/>
-                <a:ext cx="0" cy="766254"/>
-              </a:xfrm>
-              <a:prstGeom prst="line">
-                <a:avLst/>
-              </a:prstGeom>
-              <a:ln w="19050">
-                <a:solidFill>
-                  <a:schemeClr val="tx2">
-                    <a:lumMod val="60000"/>
-                    <a:lumOff val="40000"/>
-                  </a:schemeClr>
-                </a:solidFill>
-                <a:prstDash val="sysDash"/>
-              </a:ln>
-            </p:spPr>
-            <p:style>
-              <a:lnRef idx="2">
-                <a:schemeClr val="accent1"/>
-              </a:lnRef>
-              <a:fillRef idx="0">
-                <a:schemeClr val="accent1"/>
-              </a:fillRef>
-              <a:effectRef idx="1">
-                <a:schemeClr val="accent1"/>
-              </a:effectRef>
-              <a:fontRef idx="minor">
-                <a:schemeClr val="tx1"/>
-              </a:fontRef>
-            </p:style>
-          </p:cxnSp>
-          <p:cxnSp>
-            <p:nvCxnSpPr>
-              <p:cNvPr id="7" name="Straight Connector 6">
-                <a:extLst>
-                  <a:ext uri="{FF2B5EF4-FFF2-40B4-BE49-F238E27FC236}">
-                    <a16:creationId xmlns:a16="http://schemas.microsoft.com/office/drawing/2014/main" id="{B4E4EC2D-3E1C-3393-CEEB-9FE0B1B590F8}"/>
-                  </a:ext>
-                </a:extLst>
-              </p:cNvPr>
-              <p:cNvCxnSpPr>
-                <a:cxnSpLocks/>
-              </p:cNvCxnSpPr>
-              <p:nvPr/>
-            </p:nvCxnSpPr>
-            <p:spPr>
-              <a:xfrm>
-                <a:off x="2275839" y="2006276"/>
-                <a:ext cx="0" cy="766254"/>
-              </a:xfrm>
-              <a:prstGeom prst="line">
-                <a:avLst/>
-              </a:prstGeom>
-              <a:ln w="19050">
-                <a:solidFill>
-                  <a:schemeClr val="accent4">
-                    <a:lumMod val="60000"/>
-                    <a:lumOff val="40000"/>
-                  </a:schemeClr>
-                </a:solidFill>
-                <a:prstDash val="sysDash"/>
-              </a:ln>
-            </p:spPr>
-            <p:style>
-              <a:lnRef idx="2">
-                <a:schemeClr val="accent1"/>
-              </a:lnRef>
-              <a:fillRef idx="0">
-                <a:schemeClr val="accent1"/>
-              </a:fillRef>
-              <a:effectRef idx="1">
-                <a:schemeClr val="accent1"/>
-              </a:effectRef>
-              <a:fontRef idx="minor">
-                <a:schemeClr val="tx1"/>
-              </a:fontRef>
-            </p:style>
-          </p:cxnSp>
-          <p:cxnSp>
-            <p:nvCxnSpPr>
-              <p:cNvPr id="8" name="Straight Connector 7">
-                <a:extLst>
-                  <a:ext uri="{FF2B5EF4-FFF2-40B4-BE49-F238E27FC236}">
-                    <a16:creationId xmlns:a16="http://schemas.microsoft.com/office/drawing/2014/main" id="{0DE82DF5-A5EB-7771-07A7-008A93314E8A}"/>
-                  </a:ext>
-                </a:extLst>
-              </p:cNvPr>
-              <p:cNvCxnSpPr>
-                <a:cxnSpLocks/>
-              </p:cNvCxnSpPr>
-              <p:nvPr/>
-            </p:nvCxnSpPr>
-            <p:spPr>
-              <a:xfrm>
-                <a:off x="2593873" y="2020404"/>
-                <a:ext cx="0" cy="766254"/>
-              </a:xfrm>
-              <a:prstGeom prst="line">
-                <a:avLst/>
-              </a:prstGeom>
-              <a:ln w="19050">
-                <a:solidFill>
-                  <a:schemeClr val="accent2">
-                    <a:lumMod val="60000"/>
-                    <a:lumOff val="40000"/>
-                  </a:schemeClr>
-                </a:solidFill>
-                <a:prstDash val="sysDash"/>
-              </a:ln>
-            </p:spPr>
-            <p:style>
-              <a:lnRef idx="2">
-                <a:schemeClr val="accent1"/>
-              </a:lnRef>
-              <a:fillRef idx="0">
-                <a:schemeClr val="accent1"/>
-              </a:fillRef>
-              <a:effectRef idx="1">
-                <a:schemeClr val="accent1"/>
-              </a:effectRef>
-              <a:fontRef idx="minor">
-                <a:schemeClr val="tx1"/>
-              </a:fontRef>
-            </p:style>
-          </p:cxnSp>
-          <p:cxnSp>
-            <p:nvCxnSpPr>
-              <p:cNvPr id="10" name="Straight Connector 9">
-                <a:extLst>
-                  <a:ext uri="{FF2B5EF4-FFF2-40B4-BE49-F238E27FC236}">
-                    <a16:creationId xmlns:a16="http://schemas.microsoft.com/office/drawing/2014/main" id="{5D85A6F3-3851-2C39-AC72-C73FEBAF681C}"/>
-                  </a:ext>
-                </a:extLst>
-              </p:cNvPr>
-              <p:cNvCxnSpPr>
-                <a:cxnSpLocks/>
-              </p:cNvCxnSpPr>
-              <p:nvPr/>
-            </p:nvCxnSpPr>
-            <p:spPr>
-              <a:xfrm>
-                <a:off x="6164414" y="1913550"/>
-                <a:ext cx="0" cy="842879"/>
-              </a:xfrm>
-              <a:prstGeom prst="line">
-                <a:avLst/>
-              </a:prstGeom>
-              <a:ln w="19050">
-                <a:solidFill>
-                  <a:schemeClr val="tx2">
-                    <a:lumMod val="60000"/>
-                    <a:lumOff val="40000"/>
-                  </a:schemeClr>
-                </a:solidFill>
-                <a:prstDash val="sysDash"/>
-              </a:ln>
-            </p:spPr>
-            <p:style>
-              <a:lnRef idx="2">
-                <a:schemeClr val="accent1"/>
-              </a:lnRef>
-              <a:fillRef idx="0">
-                <a:schemeClr val="accent1"/>
-              </a:fillRef>
-              <a:effectRef idx="1">
-                <a:schemeClr val="accent1"/>
-              </a:effectRef>
-              <a:fontRef idx="minor">
-                <a:schemeClr val="tx1"/>
-              </a:fontRef>
-            </p:style>
-          </p:cxnSp>
-          <p:cxnSp>
-            <p:nvCxnSpPr>
-              <p:cNvPr id="16" name="Straight Connector 15">
-                <a:extLst>
-                  <a:ext uri="{FF2B5EF4-FFF2-40B4-BE49-F238E27FC236}">
-                    <a16:creationId xmlns:a16="http://schemas.microsoft.com/office/drawing/2014/main" id="{37D0713A-13E5-F806-5E55-EDC1CDFDBFE6}"/>
-                  </a:ext>
-                </a:extLst>
-              </p:cNvPr>
-              <p:cNvCxnSpPr>
-                <a:cxnSpLocks/>
-              </p:cNvCxnSpPr>
-              <p:nvPr/>
-            </p:nvCxnSpPr>
-            <p:spPr>
-              <a:xfrm>
-                <a:off x="6819365" y="1913550"/>
-                <a:ext cx="0" cy="842879"/>
-              </a:xfrm>
-              <a:prstGeom prst="line">
-                <a:avLst/>
-              </a:prstGeom>
-              <a:ln w="19050">
-                <a:solidFill>
-                  <a:schemeClr val="accent4">
-                    <a:lumMod val="60000"/>
-                    <a:lumOff val="40000"/>
-                  </a:schemeClr>
-                </a:solidFill>
-                <a:prstDash val="sysDash"/>
-              </a:ln>
-            </p:spPr>
-            <p:style>
-              <a:lnRef idx="2">
-                <a:schemeClr val="accent1"/>
-              </a:lnRef>
-              <a:fillRef idx="0">
-                <a:schemeClr val="accent1"/>
-              </a:fillRef>
-              <a:effectRef idx="1">
-                <a:schemeClr val="accent1"/>
-              </a:effectRef>
-              <a:fontRef idx="minor">
-                <a:schemeClr val="tx1"/>
-              </a:fontRef>
-            </p:style>
-          </p:cxnSp>
-          <p:cxnSp>
-            <p:nvCxnSpPr>
-              <p:cNvPr id="25" name="Straight Connector 24">
-                <a:extLst>
-                  <a:ext uri="{FF2B5EF4-FFF2-40B4-BE49-F238E27FC236}">
-                    <a16:creationId xmlns:a16="http://schemas.microsoft.com/office/drawing/2014/main" id="{7DA5DFF3-4206-B81B-2FE1-072BEDEAB7B8}"/>
-                  </a:ext>
-                </a:extLst>
-              </p:cNvPr>
-              <p:cNvCxnSpPr>
-                <a:cxnSpLocks/>
-              </p:cNvCxnSpPr>
-              <p:nvPr/>
-            </p:nvCxnSpPr>
-            <p:spPr>
-              <a:xfrm>
-                <a:off x="7492999" y="1927678"/>
-                <a:ext cx="0" cy="842879"/>
-              </a:xfrm>
-              <a:prstGeom prst="line">
-                <a:avLst/>
-              </a:prstGeom>
-              <a:ln w="19050">
-                <a:solidFill>
-                  <a:schemeClr val="accent2">
-                    <a:lumMod val="60000"/>
-                    <a:lumOff val="40000"/>
-                  </a:schemeClr>
-                </a:solidFill>
-                <a:prstDash val="sysDash"/>
-              </a:ln>
-            </p:spPr>
-            <p:style>
-              <a:lnRef idx="2">
-                <a:schemeClr val="accent1"/>
-              </a:lnRef>
-              <a:fillRef idx="0">
-                <a:schemeClr val="accent1"/>
-              </a:fillRef>
-              <a:effectRef idx="1">
-                <a:schemeClr val="accent1"/>
-              </a:effectRef>
-              <a:fontRef idx="minor">
-                <a:schemeClr val="tx1"/>
-              </a:fontRef>
-            </p:style>
-          </p:cxnSp>
-        </p:grpSp>
+                </a:rPr>
+                <a:t>Similar IIV (specialisation)</a:t>
+              </a:r>
+              <a:endParaRPr lang="en-CA" sz="1200" dirty="0">
+                <a:latin typeface="Aptos Display" panose="020B0004020202020204" pitchFamily="34" charset="0"/>
+              </a:endParaRPr>
+            </a:p>
+          </p:txBody>
+        </p:sp>
+        <p:pic>
+          <p:nvPicPr>
+            <p:cNvPr id="15" name="Picture 14">
+              <a:extLst>
+                <a:ext uri="{FF2B5EF4-FFF2-40B4-BE49-F238E27FC236}">
+                  <a16:creationId xmlns:a16="http://schemas.microsoft.com/office/drawing/2014/main" id="{57DBB4A8-5F5C-5C09-42C0-8F718B052C94}"/>
+                </a:ext>
+              </a:extLst>
+            </p:cNvPr>
+            <p:cNvPicPr>
+              <a:picLocks noChangeAspect="1"/>
+            </p:cNvPicPr>
+            <p:nvPr/>
+          </p:nvPicPr>
+          <p:blipFill>
+            <a:blip r:embed="rId3">
+              <a:duotone>
+                <a:prstClr val="black"/>
+                <a:schemeClr val="accent4">
+                  <a:tint val="45000"/>
+                  <a:satMod val="400000"/>
+                </a:schemeClr>
+              </a:duotone>
+            </a:blip>
+            <a:srcRect l="17621" t="5658" r="16588" b="7880"/>
+            <a:stretch/>
+          </p:blipFill>
+          <p:spPr>
+            <a:xfrm>
+              <a:off x="5034649" y="1535011"/>
+              <a:ext cx="2286000" cy="906207"/>
+            </a:xfrm>
+            <a:prstGeom prst="rect">
+              <a:avLst/>
+            </a:prstGeom>
+          </p:spPr>
+        </p:pic>
+        <p:pic>
+          <p:nvPicPr>
+            <p:cNvPr id="17" name="Picture 16">
+              <a:extLst>
+                <a:ext uri="{FF2B5EF4-FFF2-40B4-BE49-F238E27FC236}">
+                  <a16:creationId xmlns:a16="http://schemas.microsoft.com/office/drawing/2014/main" id="{80412A94-F395-646F-7D1C-E82470B5A69F}"/>
+                </a:ext>
+              </a:extLst>
+            </p:cNvPr>
+            <p:cNvPicPr>
+              <a:picLocks noChangeAspect="1"/>
+            </p:cNvPicPr>
+            <p:nvPr/>
+          </p:nvPicPr>
+          <p:blipFill>
+            <a:blip r:embed="rId3">
+              <a:duotone>
+                <a:prstClr val="black"/>
+                <a:schemeClr val="accent1">
+                  <a:tint val="45000"/>
+                  <a:satMod val="400000"/>
+                </a:schemeClr>
+              </a:duotone>
+            </a:blip>
+            <a:srcRect l="17621" t="5658" r="16588" b="7880"/>
+            <a:stretch/>
+          </p:blipFill>
+          <p:spPr>
+            <a:xfrm>
+              <a:off x="5689600" y="1535011"/>
+              <a:ext cx="2286000" cy="906207"/>
+            </a:xfrm>
+            <a:prstGeom prst="rect">
+              <a:avLst/>
+            </a:prstGeom>
+          </p:spPr>
+        </p:pic>
+        <p:sp>
+          <p:nvSpPr>
+            <p:cNvPr id="22" name="Right Brace 21">
+              <a:extLst>
+                <a:ext uri="{FF2B5EF4-FFF2-40B4-BE49-F238E27FC236}">
+                  <a16:creationId xmlns:a16="http://schemas.microsoft.com/office/drawing/2014/main" id="{30D4FAC7-0193-1710-772D-69805F210EC1}"/>
+                </a:ext>
+              </a:extLst>
+            </p:cNvPr>
+            <p:cNvSpPr/>
+            <p:nvPr/>
+          </p:nvSpPr>
+          <p:spPr>
+            <a:xfrm rot="5400000">
+              <a:off x="6718024" y="633888"/>
+              <a:ext cx="229152" cy="3999391"/>
+            </a:xfrm>
+            <a:prstGeom prst="rightBrace">
+              <a:avLst>
+                <a:gd name="adj1" fmla="val 0"/>
+                <a:gd name="adj2" fmla="val 50000"/>
+              </a:avLst>
+            </a:prstGeom>
+            <a:ln>
+              <a:solidFill>
+                <a:srgbClr val="7030A0"/>
+              </a:solidFill>
+            </a:ln>
+          </p:spPr>
+          <p:style>
+            <a:lnRef idx="2">
+              <a:schemeClr val="accent1"/>
+            </a:lnRef>
+            <a:fillRef idx="0">
+              <a:schemeClr val="accent1"/>
+            </a:fillRef>
+            <a:effectRef idx="1">
+              <a:schemeClr val="accent1"/>
+            </a:effectRef>
+            <a:fontRef idx="minor">
+              <a:schemeClr val="tx1"/>
+            </a:fontRef>
+          </p:style>
+          <p:txBody>
+            <a:bodyPr rtlCol="0" anchor="ctr"/>
+            <a:lstStyle/>
+            <a:p>
+              <a:pPr algn="ctr"/>
+              <a:endParaRPr lang="en-CA"/>
+            </a:p>
+          </p:txBody>
+        </p:sp>
+        <p:sp>
+          <p:nvSpPr>
+            <p:cNvPr id="24" name="TextBox 23">
+              <a:extLst>
+                <a:ext uri="{FF2B5EF4-FFF2-40B4-BE49-F238E27FC236}">
+                  <a16:creationId xmlns:a16="http://schemas.microsoft.com/office/drawing/2014/main" id="{02B2033F-9B60-C0C6-0DCB-2FDE000EFD21}"/>
+                </a:ext>
+              </a:extLst>
+            </p:cNvPr>
+            <p:cNvSpPr txBox="1"/>
+            <p:nvPr/>
+          </p:nvSpPr>
+          <p:spPr>
+            <a:xfrm>
+              <a:off x="5418672" y="2799778"/>
+              <a:ext cx="2858335" cy="646331"/>
+            </a:xfrm>
+            <a:prstGeom prst="rect">
+              <a:avLst/>
+            </a:prstGeom>
+            <a:noFill/>
+          </p:spPr>
+          <p:txBody>
+            <a:bodyPr wrap="square" rtlCol="0">
+              <a:spAutoFit/>
+            </a:bodyPr>
+            <a:lstStyle/>
+            <a:p>
+              <a:pPr algn="ctr"/>
+              <a:r>
+                <a:rPr lang="en-US" sz="1200" dirty="0">
+                  <a:latin typeface="Aptos Display" panose="020B0004020202020204" pitchFamily="34" charset="0"/>
+                </a:rPr>
+                <a:t>Wide population variance</a:t>
+              </a:r>
+            </a:p>
+            <a:p>
+              <a:pPr algn="ctr"/>
+              <a:r>
+                <a:rPr lang="en-US" sz="1200" dirty="0">
+                  <a:latin typeface="Aptos Display" panose="020B0004020202020204" pitchFamily="34" charset="0"/>
+                </a:rPr>
+                <a:t>Different means (tactics)</a:t>
+              </a:r>
+            </a:p>
+            <a:p>
+              <a:pPr algn="ctr"/>
+              <a:r>
+                <a:rPr lang="en-US" sz="1200" dirty="0">
+                  <a:latin typeface="Aptos Display" panose="020B0004020202020204" pitchFamily="34" charset="0"/>
+                </a:rPr>
+                <a:t>Similar IIV (specialisation)</a:t>
+              </a:r>
+              <a:endParaRPr lang="en-CA" sz="1200" dirty="0">
+                <a:latin typeface="Aptos Display" panose="020B0004020202020204" pitchFamily="34" charset="0"/>
+              </a:endParaRPr>
+            </a:p>
+          </p:txBody>
+        </p:sp>
+        <p:sp>
+          <p:nvSpPr>
+            <p:cNvPr id="28" name="TextBox 27">
+              <a:extLst>
+                <a:ext uri="{FF2B5EF4-FFF2-40B4-BE49-F238E27FC236}">
+                  <a16:creationId xmlns:a16="http://schemas.microsoft.com/office/drawing/2014/main" id="{2E8CF036-F568-BF99-F996-37B9CCFE3B0E}"/>
+                </a:ext>
+              </a:extLst>
+            </p:cNvPr>
+            <p:cNvSpPr txBox="1"/>
+            <p:nvPr/>
+          </p:nvSpPr>
+          <p:spPr>
+            <a:xfrm>
+              <a:off x="374354" y="255955"/>
+              <a:ext cx="3804445" cy="307777"/>
+            </a:xfrm>
+            <a:prstGeom prst="rect">
+              <a:avLst/>
+            </a:prstGeom>
+            <a:noFill/>
+          </p:spPr>
+          <p:txBody>
+            <a:bodyPr wrap="square" rtlCol="0">
+              <a:spAutoFit/>
+            </a:bodyPr>
+            <a:lstStyle/>
+            <a:p>
+              <a:pPr algn="ctr"/>
+              <a:r>
+                <a:rPr lang="en-US" sz="1400" b="1" dirty="0">
+                  <a:latin typeface="Aptos Display" panose="020B0004020202020204" pitchFamily="34" charset="0"/>
+                </a:rPr>
+                <a:t>All predators encounter similar prey</a:t>
+              </a:r>
+              <a:endParaRPr lang="en-CA" sz="1400" b="1" dirty="0">
+                <a:latin typeface="Aptos Display" panose="020B0004020202020204" pitchFamily="34" charset="0"/>
+              </a:endParaRPr>
+            </a:p>
+          </p:txBody>
+        </p:sp>
+        <p:sp>
+          <p:nvSpPr>
+            <p:cNvPr id="29" name="TextBox 28">
+              <a:extLst>
+                <a:ext uri="{FF2B5EF4-FFF2-40B4-BE49-F238E27FC236}">
+                  <a16:creationId xmlns:a16="http://schemas.microsoft.com/office/drawing/2014/main" id="{BBE0C67D-1769-FBD9-608C-27E9F129AD6A}"/>
+                </a:ext>
+              </a:extLst>
+            </p:cNvPr>
+            <p:cNvSpPr txBox="1"/>
+            <p:nvPr/>
+          </p:nvSpPr>
+          <p:spPr>
+            <a:xfrm>
+              <a:off x="4930377" y="257202"/>
+              <a:ext cx="3804445" cy="307777"/>
+            </a:xfrm>
+            <a:prstGeom prst="rect">
+              <a:avLst/>
+            </a:prstGeom>
+            <a:noFill/>
+          </p:spPr>
+          <p:txBody>
+            <a:bodyPr wrap="square" rtlCol="0">
+              <a:spAutoFit/>
+            </a:bodyPr>
+            <a:lstStyle/>
+            <a:p>
+              <a:pPr algn="ctr"/>
+              <a:r>
+                <a:rPr lang="en-US" sz="1400" b="1" dirty="0">
+                  <a:latin typeface="Aptos Display" panose="020B0004020202020204" pitchFamily="34" charset="0"/>
+                </a:rPr>
+                <a:t>All predators encounter diverse prey</a:t>
+              </a:r>
+              <a:endParaRPr lang="en-CA" sz="1400" b="1" dirty="0">
+                <a:latin typeface="Aptos Display" panose="020B0004020202020204" pitchFamily="34" charset="0"/>
+              </a:endParaRPr>
+            </a:p>
+          </p:txBody>
+        </p:sp>
+        <p:cxnSp>
+          <p:nvCxnSpPr>
+            <p:cNvPr id="5" name="Straight Connector 4">
+              <a:extLst>
+                <a:ext uri="{FF2B5EF4-FFF2-40B4-BE49-F238E27FC236}">
+                  <a16:creationId xmlns:a16="http://schemas.microsoft.com/office/drawing/2014/main" id="{D51DCA8D-6C1D-BE8B-CBF3-45F83305C1FC}"/>
+                </a:ext>
+              </a:extLst>
+            </p:cNvPr>
+            <p:cNvCxnSpPr>
+              <a:cxnSpLocks/>
+            </p:cNvCxnSpPr>
+            <p:nvPr/>
+          </p:nvCxnSpPr>
+          <p:spPr>
+            <a:xfrm>
+              <a:off x="2281288" y="1660836"/>
+              <a:ext cx="0" cy="766254"/>
+            </a:xfrm>
+            <a:prstGeom prst="line">
+              <a:avLst/>
+            </a:prstGeom>
+            <a:ln w="19050">
+              <a:solidFill>
+                <a:schemeClr val="tx2">
+                  <a:lumMod val="60000"/>
+                  <a:lumOff val="40000"/>
+                </a:schemeClr>
+              </a:solidFill>
+              <a:prstDash val="sysDash"/>
+            </a:ln>
+          </p:spPr>
+          <p:style>
+            <a:lnRef idx="2">
+              <a:schemeClr val="accent1"/>
+            </a:lnRef>
+            <a:fillRef idx="0">
+              <a:schemeClr val="accent1"/>
+            </a:fillRef>
+            <a:effectRef idx="1">
+              <a:schemeClr val="accent1"/>
+            </a:effectRef>
+            <a:fontRef idx="minor">
+              <a:schemeClr val="tx1"/>
+            </a:fontRef>
+          </p:style>
+        </p:cxnSp>
+        <p:cxnSp>
+          <p:nvCxnSpPr>
+            <p:cNvPr id="7" name="Straight Connector 6">
+              <a:extLst>
+                <a:ext uri="{FF2B5EF4-FFF2-40B4-BE49-F238E27FC236}">
+                  <a16:creationId xmlns:a16="http://schemas.microsoft.com/office/drawing/2014/main" id="{B4E4EC2D-3E1C-3393-CEEB-9FE0B1B590F8}"/>
+                </a:ext>
+              </a:extLst>
+            </p:cNvPr>
+            <p:cNvCxnSpPr>
+              <a:cxnSpLocks/>
+            </p:cNvCxnSpPr>
+            <p:nvPr/>
+          </p:nvCxnSpPr>
+          <p:spPr>
+            <a:xfrm>
+              <a:off x="1981199" y="1660836"/>
+              <a:ext cx="0" cy="766254"/>
+            </a:xfrm>
+            <a:prstGeom prst="line">
+              <a:avLst/>
+            </a:prstGeom>
+            <a:ln w="19050">
+              <a:solidFill>
+                <a:schemeClr val="accent4">
+                  <a:lumMod val="60000"/>
+                  <a:lumOff val="40000"/>
+                </a:schemeClr>
+              </a:solidFill>
+              <a:prstDash val="sysDash"/>
+            </a:ln>
+          </p:spPr>
+          <p:style>
+            <a:lnRef idx="2">
+              <a:schemeClr val="accent1"/>
+            </a:lnRef>
+            <a:fillRef idx="0">
+              <a:schemeClr val="accent1"/>
+            </a:fillRef>
+            <a:effectRef idx="1">
+              <a:schemeClr val="accent1"/>
+            </a:effectRef>
+            <a:fontRef idx="minor">
+              <a:schemeClr val="tx1"/>
+            </a:fontRef>
+          </p:style>
+        </p:cxnSp>
+        <p:cxnSp>
+          <p:nvCxnSpPr>
+            <p:cNvPr id="8" name="Straight Connector 7">
+              <a:extLst>
+                <a:ext uri="{FF2B5EF4-FFF2-40B4-BE49-F238E27FC236}">
+                  <a16:creationId xmlns:a16="http://schemas.microsoft.com/office/drawing/2014/main" id="{0DE82DF5-A5EB-7771-07A7-008A93314E8A}"/>
+                </a:ext>
+              </a:extLst>
+            </p:cNvPr>
+            <p:cNvCxnSpPr>
+              <a:cxnSpLocks/>
+            </p:cNvCxnSpPr>
+            <p:nvPr/>
+          </p:nvCxnSpPr>
+          <p:spPr>
+            <a:xfrm>
+              <a:off x="2593873" y="1674964"/>
+              <a:ext cx="0" cy="766254"/>
+            </a:xfrm>
+            <a:prstGeom prst="line">
+              <a:avLst/>
+            </a:prstGeom>
+            <a:ln w="19050">
+              <a:solidFill>
+                <a:schemeClr val="accent2">
+                  <a:lumMod val="60000"/>
+                  <a:lumOff val="40000"/>
+                </a:schemeClr>
+              </a:solidFill>
+              <a:prstDash val="sysDash"/>
+            </a:ln>
+          </p:spPr>
+          <p:style>
+            <a:lnRef idx="2">
+              <a:schemeClr val="accent1"/>
+            </a:lnRef>
+            <a:fillRef idx="0">
+              <a:schemeClr val="accent1"/>
+            </a:fillRef>
+            <a:effectRef idx="1">
+              <a:schemeClr val="accent1"/>
+            </a:effectRef>
+            <a:fontRef idx="minor">
+              <a:schemeClr val="tx1"/>
+            </a:fontRef>
+          </p:style>
+        </p:cxnSp>
+        <p:cxnSp>
+          <p:nvCxnSpPr>
+            <p:cNvPr id="10" name="Straight Connector 9">
+              <a:extLst>
+                <a:ext uri="{FF2B5EF4-FFF2-40B4-BE49-F238E27FC236}">
+                  <a16:creationId xmlns:a16="http://schemas.microsoft.com/office/drawing/2014/main" id="{5D85A6F3-3851-2C39-AC72-C73FEBAF681C}"/>
+                </a:ext>
+              </a:extLst>
+            </p:cNvPr>
+            <p:cNvCxnSpPr>
+              <a:cxnSpLocks/>
+            </p:cNvCxnSpPr>
+            <p:nvPr/>
+          </p:nvCxnSpPr>
+          <p:spPr>
+            <a:xfrm>
+              <a:off x="6164414" y="1568110"/>
+              <a:ext cx="0" cy="842879"/>
+            </a:xfrm>
+            <a:prstGeom prst="line">
+              <a:avLst/>
+            </a:prstGeom>
+            <a:ln w="19050">
+              <a:solidFill>
+                <a:schemeClr val="accent4">
+                  <a:lumMod val="60000"/>
+                  <a:lumOff val="40000"/>
+                </a:schemeClr>
+              </a:solidFill>
+              <a:prstDash val="sysDash"/>
+            </a:ln>
+          </p:spPr>
+          <p:style>
+            <a:lnRef idx="2">
+              <a:schemeClr val="accent1"/>
+            </a:lnRef>
+            <a:fillRef idx="0">
+              <a:schemeClr val="accent1"/>
+            </a:fillRef>
+            <a:effectRef idx="1">
+              <a:schemeClr val="accent1"/>
+            </a:effectRef>
+            <a:fontRef idx="minor">
+              <a:schemeClr val="tx1"/>
+            </a:fontRef>
+          </p:style>
+        </p:cxnSp>
+        <p:cxnSp>
+          <p:nvCxnSpPr>
+            <p:cNvPr id="25" name="Straight Connector 24">
+              <a:extLst>
+                <a:ext uri="{FF2B5EF4-FFF2-40B4-BE49-F238E27FC236}">
+                  <a16:creationId xmlns:a16="http://schemas.microsoft.com/office/drawing/2014/main" id="{7DA5DFF3-4206-B81B-2FE1-072BEDEAB7B8}"/>
+                </a:ext>
+              </a:extLst>
+            </p:cNvPr>
+            <p:cNvCxnSpPr>
+              <a:cxnSpLocks/>
+            </p:cNvCxnSpPr>
+            <p:nvPr/>
+          </p:nvCxnSpPr>
+          <p:spPr>
+            <a:xfrm>
+              <a:off x="7492999" y="1582238"/>
+              <a:ext cx="0" cy="842879"/>
+            </a:xfrm>
+            <a:prstGeom prst="line">
+              <a:avLst/>
+            </a:prstGeom>
+            <a:ln w="19050">
+              <a:solidFill>
+                <a:schemeClr val="accent2">
+                  <a:lumMod val="60000"/>
+                  <a:lumOff val="40000"/>
+                </a:schemeClr>
+              </a:solidFill>
+              <a:prstDash val="sysDash"/>
+            </a:ln>
+          </p:spPr>
+          <p:style>
+            <a:lnRef idx="2">
+              <a:schemeClr val="accent1"/>
+            </a:lnRef>
+            <a:fillRef idx="0">
+              <a:schemeClr val="accent1"/>
+            </a:fillRef>
+            <a:effectRef idx="1">
+              <a:schemeClr val="accent1"/>
+            </a:effectRef>
+            <a:fontRef idx="minor">
+              <a:schemeClr val="tx1"/>
+            </a:fontRef>
+          </p:style>
+        </p:cxnSp>
+        <p:cxnSp>
+          <p:nvCxnSpPr>
+            <p:cNvPr id="16" name="Straight Connector 15">
+              <a:extLst>
+                <a:ext uri="{FF2B5EF4-FFF2-40B4-BE49-F238E27FC236}">
+                  <a16:creationId xmlns:a16="http://schemas.microsoft.com/office/drawing/2014/main" id="{37D0713A-13E5-F806-5E55-EDC1CDFDBFE6}"/>
+                </a:ext>
+              </a:extLst>
+            </p:cNvPr>
+            <p:cNvCxnSpPr>
+              <a:cxnSpLocks/>
+            </p:cNvCxnSpPr>
+            <p:nvPr/>
+          </p:nvCxnSpPr>
+          <p:spPr>
+            <a:xfrm>
+              <a:off x="6819365" y="1568110"/>
+              <a:ext cx="0" cy="842879"/>
+            </a:xfrm>
+            <a:prstGeom prst="line">
+              <a:avLst/>
+            </a:prstGeom>
+            <a:ln w="19050">
+              <a:solidFill>
+                <a:schemeClr val="tx2">
+                  <a:lumMod val="60000"/>
+                  <a:lumOff val="40000"/>
+                </a:schemeClr>
+              </a:solidFill>
+              <a:prstDash val="sysDash"/>
+            </a:ln>
+          </p:spPr>
+          <p:style>
+            <a:lnRef idx="2">
+              <a:schemeClr val="accent1"/>
+            </a:lnRef>
+            <a:fillRef idx="0">
+              <a:schemeClr val="accent1"/>
+            </a:fillRef>
+            <a:effectRef idx="1">
+              <a:schemeClr val="accent1"/>
+            </a:effectRef>
+            <a:fontRef idx="minor">
+              <a:schemeClr val="tx1"/>
+            </a:fontRef>
+          </p:style>
+        </p:cxnSp>
         <p:sp>
           <p:nvSpPr>
             <p:cNvPr id="47" name="TextBox 46">
@@ -4683,7 +4641,7 @@
               <a:blip r:embed="rId3">
                 <a:duotone>
                   <a:prstClr val="black"/>
-                  <a:schemeClr val="accent4">
+                  <a:schemeClr val="accent1">
                     <a:tint val="45000"/>
                     <a:satMod val="400000"/>
                   </a:schemeClr>
@@ -4720,7 +4678,7 @@
               <a:blip r:embed="rId3">
                 <a:duotone>
                   <a:prstClr val="black"/>
-                  <a:schemeClr val="accent1">
+                  <a:schemeClr val="accent4">
                     <a:tint val="45000"/>
                     <a:satMod val="400000"/>
                   </a:schemeClr>
@@ -4911,7 +4869,7 @@
               </a:prstGeom>
               <a:ln w="19050">
                 <a:solidFill>
-                  <a:schemeClr val="tx2">
+                  <a:schemeClr val="accent4">
                     <a:lumMod val="60000"/>
                     <a:lumOff val="40000"/>
                   </a:schemeClr>
@@ -4958,7 +4916,7 @@
               </a:prstGeom>
               <a:ln w="19050">
                 <a:solidFill>
-                  <a:schemeClr val="accent4">
+                  <a:schemeClr val="tx2">
                     <a:lumMod val="60000"/>
                     <a:lumOff val="40000"/>
                   </a:schemeClr>

</xml_diff>